<commit_message>
Added ALU and fixed register
</commit_message>
<xml_diff>
--- a/CircuitFigures.pptx
+++ b/CircuitFigures.pptx
@@ -5,15 +5,17 @@
     <p:sldMasterId id="2147483648" r:id="rId1"/>
   </p:sldMasterIdLst>
   <p:notesMasterIdLst>
-    <p:notesMasterId r:id="rId8"/>
+    <p:notesMasterId r:id="rId10"/>
   </p:notesMasterIdLst>
   <p:sldIdLst>
-    <p:sldId id="258" r:id="rId2"/>
-    <p:sldId id="260" r:id="rId3"/>
-    <p:sldId id="261" r:id="rId4"/>
-    <p:sldId id="257" r:id="rId5"/>
-    <p:sldId id="259" r:id="rId6"/>
-    <p:sldId id="307" r:id="rId7"/>
+    <p:sldId id="260" r:id="rId2"/>
+    <p:sldId id="309" r:id="rId3"/>
+    <p:sldId id="308" r:id="rId4"/>
+    <p:sldId id="261" r:id="rId5"/>
+    <p:sldId id="258" r:id="rId6"/>
+    <p:sldId id="257" r:id="rId7"/>
+    <p:sldId id="259" r:id="rId8"/>
+    <p:sldId id="307" r:id="rId9"/>
   </p:sldIdLst>
   <p:sldSz cx="12192000" cy="6858000"/>
   <p:notesSz cx="6858000" cy="9144000"/>
@@ -112,6 +114,11 @@
       </a:defRPr>
     </a:lvl9pPr>
   </p:defaultTextStyle>
+  <p:extLst>
+    <p:ext uri="{EFAFB233-063F-42B5-8137-9DF3F51BA10A}">
+      <p15:sldGuideLst xmlns:p15="http://schemas.microsoft.com/office/powerpoint/2012/main"/>
+    </p:ext>
+  </p:extLst>
 </p:presentation>
 </file>
 
@@ -197,7 +204,7 @@
           <a:p>
             <a:fld id="{49E6E53C-763C-F645-B62E-88CCF4DB6A8A}" type="datetimeFigureOut">
               <a:rPr lang="en-US" smtClean="0"/>
-              <a:t>8/23/18</a:t>
+              <a:t>8/26/18</a:t>
             </a:fld>
             <a:endParaRPr lang="en-US"/>
           </a:p>
@@ -529,7 +536,7 @@
           <a:p>
             <a:fld id="{48F1FCDE-EEBA-F24C-8564-2A74ACFDFD81}" type="slidenum">
               <a:rPr lang="en-US" smtClean="0"/>
-              <a:t>6</a:t>
+              <a:t>8</a:t>
             </a:fld>
             <a:endParaRPr lang="en-US"/>
           </a:p>
@@ -695,7 +702,7 @@
           <a:p>
             <a:fld id="{D8A81409-9130-6E4D-944D-162DD4ECF258}" type="datetimeFigureOut">
               <a:rPr lang="en-US" smtClean="0"/>
-              <a:t>8/23/18</a:t>
+              <a:t>8/26/18</a:t>
             </a:fld>
             <a:endParaRPr lang="en-US"/>
           </a:p>
@@ -893,7 +900,7 @@
           <a:p>
             <a:fld id="{D8A81409-9130-6E4D-944D-162DD4ECF258}" type="datetimeFigureOut">
               <a:rPr lang="en-US" smtClean="0"/>
-              <a:t>8/23/18</a:t>
+              <a:t>8/26/18</a:t>
             </a:fld>
             <a:endParaRPr lang="en-US"/>
           </a:p>
@@ -1101,7 +1108,7 @@
           <a:p>
             <a:fld id="{D8A81409-9130-6E4D-944D-162DD4ECF258}" type="datetimeFigureOut">
               <a:rPr lang="en-US" smtClean="0"/>
-              <a:t>8/23/18</a:t>
+              <a:t>8/26/18</a:t>
             </a:fld>
             <a:endParaRPr lang="en-US"/>
           </a:p>
@@ -1299,7 +1306,7 @@
           <a:p>
             <a:fld id="{D8A81409-9130-6E4D-944D-162DD4ECF258}" type="datetimeFigureOut">
               <a:rPr lang="en-US" smtClean="0"/>
-              <a:t>8/23/18</a:t>
+              <a:t>8/26/18</a:t>
             </a:fld>
             <a:endParaRPr lang="en-US"/>
           </a:p>
@@ -1574,7 +1581,7 @@
           <a:p>
             <a:fld id="{D8A81409-9130-6E4D-944D-162DD4ECF258}" type="datetimeFigureOut">
               <a:rPr lang="en-US" smtClean="0"/>
-              <a:t>8/23/18</a:t>
+              <a:t>8/26/18</a:t>
             </a:fld>
             <a:endParaRPr lang="en-US"/>
           </a:p>
@@ -1839,7 +1846,7 @@
           <a:p>
             <a:fld id="{D8A81409-9130-6E4D-944D-162DD4ECF258}" type="datetimeFigureOut">
               <a:rPr lang="en-US" smtClean="0"/>
-              <a:t>8/23/18</a:t>
+              <a:t>8/26/18</a:t>
             </a:fld>
             <a:endParaRPr lang="en-US"/>
           </a:p>
@@ -2251,7 +2258,7 @@
           <a:p>
             <a:fld id="{D8A81409-9130-6E4D-944D-162DD4ECF258}" type="datetimeFigureOut">
               <a:rPr lang="en-US" smtClean="0"/>
-              <a:t>8/23/18</a:t>
+              <a:t>8/26/18</a:t>
             </a:fld>
             <a:endParaRPr lang="en-US"/>
           </a:p>
@@ -2392,7 +2399,7 @@
           <a:p>
             <a:fld id="{D8A81409-9130-6E4D-944D-162DD4ECF258}" type="datetimeFigureOut">
               <a:rPr lang="en-US" smtClean="0"/>
-              <a:t>8/23/18</a:t>
+              <a:t>8/26/18</a:t>
             </a:fld>
             <a:endParaRPr lang="en-US"/>
           </a:p>
@@ -2505,7 +2512,7 @@
           <a:p>
             <a:fld id="{D8A81409-9130-6E4D-944D-162DD4ECF258}" type="datetimeFigureOut">
               <a:rPr lang="en-US" smtClean="0"/>
-              <a:t>8/23/18</a:t>
+              <a:t>8/26/18</a:t>
             </a:fld>
             <a:endParaRPr lang="en-US"/>
           </a:p>
@@ -2816,7 +2823,7 @@
           <a:p>
             <a:fld id="{D8A81409-9130-6E4D-944D-162DD4ECF258}" type="datetimeFigureOut">
               <a:rPr lang="en-US" smtClean="0"/>
-              <a:t>8/23/18</a:t>
+              <a:t>8/26/18</a:t>
             </a:fld>
             <a:endParaRPr lang="en-US"/>
           </a:p>
@@ -3104,7 +3111,7 @@
           <a:p>
             <a:fld id="{D8A81409-9130-6E4D-944D-162DD4ECF258}" type="datetimeFigureOut">
               <a:rPr lang="en-US" smtClean="0"/>
-              <a:t>8/23/18</a:t>
+              <a:t>8/26/18</a:t>
             </a:fld>
             <a:endParaRPr lang="en-US"/>
           </a:p>
@@ -3345,7 +3352,7 @@
           <a:p>
             <a:fld id="{D8A81409-9130-6E4D-944D-162DD4ECF258}" type="datetimeFigureOut">
               <a:rPr lang="en-US" smtClean="0"/>
-              <a:t>8/23/18</a:t>
+              <a:t>8/26/18</a:t>
             </a:fld>
             <a:endParaRPr lang="en-US"/>
           </a:p>
@@ -3767,430 +3774,6 @@
           <p:cNvPr id="2" name="Title 1">
             <a:extLst>
               <a:ext uri="{FF2B5EF4-FFF2-40B4-BE49-F238E27FC236}">
-                <a16:creationId xmlns:a16="http://schemas.microsoft.com/office/drawing/2014/main" id="{BD6336BC-F2C5-7549-BB6E-BDD45E8BB60C}"/>
-              </a:ext>
-            </a:extLst>
-          </p:cNvPr>
-          <p:cNvSpPr>
-            <a:spLocks noGrp="1"/>
-          </p:cNvSpPr>
-          <p:nvPr>
-            <p:ph type="title"/>
-          </p:nvPr>
-        </p:nvSpPr>
-        <p:spPr/>
-        <p:txBody>
-          <a:bodyPr/>
-          <a:lstStyle/>
-          <a:p>
-            <a:r>
-              <a:rPr lang="en-US" dirty="0"/>
-              <a:t>Ellipses</a:t>
-            </a:r>
-          </a:p>
-        </p:txBody>
-      </p:sp>
-      <p:grpSp>
-        <p:nvGrpSpPr>
-          <p:cNvPr id="16" name="Group 15">
-            <a:extLst>
-              <a:ext uri="{FF2B5EF4-FFF2-40B4-BE49-F238E27FC236}">
-                <a16:creationId xmlns:a16="http://schemas.microsoft.com/office/drawing/2014/main" id="{FFBFFBE5-70EC-FE45-B684-9C1D741FA81F}"/>
-              </a:ext>
-            </a:extLst>
-          </p:cNvPr>
-          <p:cNvGrpSpPr/>
-          <p:nvPr/>
-        </p:nvGrpSpPr>
-        <p:grpSpPr>
-          <a:xfrm>
-            <a:off x="2757664" y="2684155"/>
-            <a:ext cx="107426" cy="500523"/>
-            <a:chOff x="7940825" y="3161211"/>
-            <a:chExt cx="107426" cy="500523"/>
-          </a:xfrm>
-        </p:grpSpPr>
-        <p:sp>
-          <p:nvSpPr>
-            <p:cNvPr id="17" name="Oval 16">
-              <a:extLst>
-                <a:ext uri="{FF2B5EF4-FFF2-40B4-BE49-F238E27FC236}">
-                  <a16:creationId xmlns:a16="http://schemas.microsoft.com/office/drawing/2014/main" id="{FEE2CA01-4E09-4845-97B2-C74BD4012C24}"/>
-                </a:ext>
-              </a:extLst>
-            </p:cNvPr>
-            <p:cNvSpPr/>
-            <p:nvPr/>
-          </p:nvSpPr>
-          <p:spPr>
-            <a:xfrm>
-              <a:off x="7942419" y="3161211"/>
-              <a:ext cx="104301" cy="109617"/>
-            </a:xfrm>
-            <a:prstGeom prst="ellipse">
-              <a:avLst/>
-            </a:prstGeom>
-            <a:solidFill>
-              <a:schemeClr val="tx1"/>
-            </a:solidFill>
-            <a:ln>
-              <a:solidFill>
-                <a:schemeClr val="tx1"/>
-              </a:solidFill>
-            </a:ln>
-          </p:spPr>
-          <p:style>
-            <a:lnRef idx="2">
-              <a:schemeClr val="accent1">
-                <a:shade val="50000"/>
-              </a:schemeClr>
-            </a:lnRef>
-            <a:fillRef idx="1">
-              <a:schemeClr val="accent1"/>
-            </a:fillRef>
-            <a:effectRef idx="0">
-              <a:schemeClr val="accent1"/>
-            </a:effectRef>
-            <a:fontRef idx="minor">
-              <a:schemeClr val="lt1"/>
-            </a:fontRef>
-          </p:style>
-          <p:txBody>
-            <a:bodyPr rtlCol="0" anchor="ctr"/>
-            <a:lstStyle/>
-            <a:p>
-              <a:pPr algn="ctr"/>
-              <a:endParaRPr lang="en-US"/>
-            </a:p>
-          </p:txBody>
-        </p:sp>
-        <p:sp>
-          <p:nvSpPr>
-            <p:cNvPr id="18" name="Oval 17">
-              <a:extLst>
-                <a:ext uri="{FF2B5EF4-FFF2-40B4-BE49-F238E27FC236}">
-                  <a16:creationId xmlns:a16="http://schemas.microsoft.com/office/drawing/2014/main" id="{9109F35A-83FE-1543-9D9A-6C7A9C9B0102}"/>
-                </a:ext>
-              </a:extLst>
-            </p:cNvPr>
-            <p:cNvSpPr/>
-            <p:nvPr/>
-          </p:nvSpPr>
-          <p:spPr>
-            <a:xfrm>
-              <a:off x="7940825" y="3356664"/>
-              <a:ext cx="104301" cy="109617"/>
-            </a:xfrm>
-            <a:prstGeom prst="ellipse">
-              <a:avLst/>
-            </a:prstGeom>
-            <a:solidFill>
-              <a:schemeClr val="tx1"/>
-            </a:solidFill>
-            <a:ln>
-              <a:solidFill>
-                <a:schemeClr val="tx1"/>
-              </a:solidFill>
-            </a:ln>
-          </p:spPr>
-          <p:style>
-            <a:lnRef idx="2">
-              <a:schemeClr val="accent1">
-                <a:shade val="50000"/>
-              </a:schemeClr>
-            </a:lnRef>
-            <a:fillRef idx="1">
-              <a:schemeClr val="accent1"/>
-            </a:fillRef>
-            <a:effectRef idx="0">
-              <a:schemeClr val="accent1"/>
-            </a:effectRef>
-            <a:fontRef idx="minor">
-              <a:schemeClr val="lt1"/>
-            </a:fontRef>
-          </p:style>
-          <p:txBody>
-            <a:bodyPr rtlCol="0" anchor="ctr"/>
-            <a:lstStyle/>
-            <a:p>
-              <a:pPr algn="ctr"/>
-              <a:endParaRPr lang="en-US" dirty="0"/>
-            </a:p>
-          </p:txBody>
-        </p:sp>
-        <p:sp>
-          <p:nvSpPr>
-            <p:cNvPr id="19" name="Oval 18">
-              <a:extLst>
-                <a:ext uri="{FF2B5EF4-FFF2-40B4-BE49-F238E27FC236}">
-                  <a16:creationId xmlns:a16="http://schemas.microsoft.com/office/drawing/2014/main" id="{B2207441-D021-984A-A0EB-F8C552B90411}"/>
-                </a:ext>
-              </a:extLst>
-            </p:cNvPr>
-            <p:cNvSpPr/>
-            <p:nvPr/>
-          </p:nvSpPr>
-          <p:spPr>
-            <a:xfrm>
-              <a:off x="7943950" y="3552117"/>
-              <a:ext cx="104301" cy="109617"/>
-            </a:xfrm>
-            <a:prstGeom prst="ellipse">
-              <a:avLst/>
-            </a:prstGeom>
-            <a:solidFill>
-              <a:schemeClr val="tx1"/>
-            </a:solidFill>
-            <a:ln>
-              <a:solidFill>
-                <a:schemeClr val="tx1"/>
-              </a:solidFill>
-            </a:ln>
-          </p:spPr>
-          <p:style>
-            <a:lnRef idx="2">
-              <a:schemeClr val="accent1">
-                <a:shade val="50000"/>
-              </a:schemeClr>
-            </a:lnRef>
-            <a:fillRef idx="1">
-              <a:schemeClr val="accent1"/>
-            </a:fillRef>
-            <a:effectRef idx="0">
-              <a:schemeClr val="accent1"/>
-            </a:effectRef>
-            <a:fontRef idx="minor">
-              <a:schemeClr val="lt1"/>
-            </a:fontRef>
-          </p:style>
-          <p:txBody>
-            <a:bodyPr rtlCol="0" anchor="ctr"/>
-            <a:lstStyle/>
-            <a:p>
-              <a:pPr algn="ctr"/>
-              <a:endParaRPr lang="en-US"/>
-            </a:p>
-          </p:txBody>
-        </p:sp>
-      </p:grpSp>
-      <p:grpSp>
-        <p:nvGrpSpPr>
-          <p:cNvPr id="24" name="Group 23">
-            <a:extLst>
-              <a:ext uri="{FF2B5EF4-FFF2-40B4-BE49-F238E27FC236}">
-                <a16:creationId xmlns:a16="http://schemas.microsoft.com/office/drawing/2014/main" id="{419C95AD-AF33-B24E-AA1A-3A422AB18F44}"/>
-              </a:ext>
-            </a:extLst>
-          </p:cNvPr>
-          <p:cNvGrpSpPr/>
-          <p:nvPr/>
-        </p:nvGrpSpPr>
-        <p:grpSpPr>
-          <a:xfrm rot="16200000">
-            <a:off x="4975169" y="2515775"/>
-            <a:ext cx="107426" cy="500523"/>
-            <a:chOff x="7940825" y="3161211"/>
-            <a:chExt cx="107426" cy="500523"/>
-          </a:xfrm>
-        </p:grpSpPr>
-        <p:sp>
-          <p:nvSpPr>
-            <p:cNvPr id="25" name="Oval 24">
-              <a:extLst>
-                <a:ext uri="{FF2B5EF4-FFF2-40B4-BE49-F238E27FC236}">
-                  <a16:creationId xmlns:a16="http://schemas.microsoft.com/office/drawing/2014/main" id="{B457740C-B336-B240-9D43-B24C64194C4A}"/>
-                </a:ext>
-              </a:extLst>
-            </p:cNvPr>
-            <p:cNvSpPr/>
-            <p:nvPr/>
-          </p:nvSpPr>
-          <p:spPr>
-            <a:xfrm>
-              <a:off x="7942419" y="3161211"/>
-              <a:ext cx="104301" cy="109617"/>
-            </a:xfrm>
-            <a:prstGeom prst="ellipse">
-              <a:avLst/>
-            </a:prstGeom>
-            <a:solidFill>
-              <a:schemeClr val="tx1"/>
-            </a:solidFill>
-            <a:ln>
-              <a:solidFill>
-                <a:schemeClr val="tx1"/>
-              </a:solidFill>
-            </a:ln>
-          </p:spPr>
-          <p:style>
-            <a:lnRef idx="2">
-              <a:schemeClr val="accent1">
-                <a:shade val="50000"/>
-              </a:schemeClr>
-            </a:lnRef>
-            <a:fillRef idx="1">
-              <a:schemeClr val="accent1"/>
-            </a:fillRef>
-            <a:effectRef idx="0">
-              <a:schemeClr val="accent1"/>
-            </a:effectRef>
-            <a:fontRef idx="minor">
-              <a:schemeClr val="lt1"/>
-            </a:fontRef>
-          </p:style>
-          <p:txBody>
-            <a:bodyPr rtlCol="0" anchor="ctr"/>
-            <a:lstStyle/>
-            <a:p>
-              <a:pPr algn="ctr"/>
-              <a:endParaRPr lang="en-US"/>
-            </a:p>
-          </p:txBody>
-        </p:sp>
-        <p:sp>
-          <p:nvSpPr>
-            <p:cNvPr id="26" name="Oval 25">
-              <a:extLst>
-                <a:ext uri="{FF2B5EF4-FFF2-40B4-BE49-F238E27FC236}">
-                  <a16:creationId xmlns:a16="http://schemas.microsoft.com/office/drawing/2014/main" id="{CD5AA14C-FFC9-2145-8BD7-3F3DF9CBBD39}"/>
-                </a:ext>
-              </a:extLst>
-            </p:cNvPr>
-            <p:cNvSpPr/>
-            <p:nvPr/>
-          </p:nvSpPr>
-          <p:spPr>
-            <a:xfrm>
-              <a:off x="7940825" y="3356664"/>
-              <a:ext cx="104301" cy="109617"/>
-            </a:xfrm>
-            <a:prstGeom prst="ellipse">
-              <a:avLst/>
-            </a:prstGeom>
-            <a:solidFill>
-              <a:schemeClr val="tx1"/>
-            </a:solidFill>
-            <a:ln>
-              <a:solidFill>
-                <a:schemeClr val="tx1"/>
-              </a:solidFill>
-            </a:ln>
-          </p:spPr>
-          <p:style>
-            <a:lnRef idx="2">
-              <a:schemeClr val="accent1">
-                <a:shade val="50000"/>
-              </a:schemeClr>
-            </a:lnRef>
-            <a:fillRef idx="1">
-              <a:schemeClr val="accent1"/>
-            </a:fillRef>
-            <a:effectRef idx="0">
-              <a:schemeClr val="accent1"/>
-            </a:effectRef>
-            <a:fontRef idx="minor">
-              <a:schemeClr val="lt1"/>
-            </a:fontRef>
-          </p:style>
-          <p:txBody>
-            <a:bodyPr rtlCol="0" anchor="ctr"/>
-            <a:lstStyle/>
-            <a:p>
-              <a:pPr algn="ctr"/>
-              <a:endParaRPr lang="en-US" dirty="0"/>
-            </a:p>
-          </p:txBody>
-        </p:sp>
-        <p:sp>
-          <p:nvSpPr>
-            <p:cNvPr id="27" name="Oval 26">
-              <a:extLst>
-                <a:ext uri="{FF2B5EF4-FFF2-40B4-BE49-F238E27FC236}">
-                  <a16:creationId xmlns:a16="http://schemas.microsoft.com/office/drawing/2014/main" id="{9F6A8C9C-73EC-274C-BE7C-3A64DE283BD7}"/>
-                </a:ext>
-              </a:extLst>
-            </p:cNvPr>
-            <p:cNvSpPr/>
-            <p:nvPr/>
-          </p:nvSpPr>
-          <p:spPr>
-            <a:xfrm>
-              <a:off x="7943950" y="3552117"/>
-              <a:ext cx="104301" cy="109617"/>
-            </a:xfrm>
-            <a:prstGeom prst="ellipse">
-              <a:avLst/>
-            </a:prstGeom>
-            <a:solidFill>
-              <a:schemeClr val="tx1"/>
-            </a:solidFill>
-            <a:ln>
-              <a:solidFill>
-                <a:schemeClr val="tx1"/>
-              </a:solidFill>
-            </a:ln>
-          </p:spPr>
-          <p:style>
-            <a:lnRef idx="2">
-              <a:schemeClr val="accent1">
-                <a:shade val="50000"/>
-              </a:schemeClr>
-            </a:lnRef>
-            <a:fillRef idx="1">
-              <a:schemeClr val="accent1"/>
-            </a:fillRef>
-            <a:effectRef idx="0">
-              <a:schemeClr val="accent1"/>
-            </a:effectRef>
-            <a:fontRef idx="minor">
-              <a:schemeClr val="lt1"/>
-            </a:fontRef>
-          </p:style>
-          <p:txBody>
-            <a:bodyPr rtlCol="0" anchor="ctr"/>
-            <a:lstStyle/>
-            <a:p>
-              <a:pPr algn="ctr"/>
-              <a:endParaRPr lang="en-US"/>
-            </a:p>
-          </p:txBody>
-        </p:sp>
-      </p:grpSp>
-    </p:spTree>
-    <p:extLst>
-      <p:ext uri="{BB962C8B-B14F-4D97-AF65-F5344CB8AC3E}">
-        <p14:creationId xmlns:p14="http://schemas.microsoft.com/office/powerpoint/2010/main" val="2564517926"/>
-      </p:ext>
-    </p:extLst>
-  </p:cSld>
-  <p:clrMapOvr>
-    <a:masterClrMapping/>
-  </p:clrMapOvr>
-</p:sld>
-</file>
-
-<file path=ppt/slides/slide2.xml><?xml version="1.0" encoding="utf-8"?>
-<p:sld xmlns:a="http://schemas.openxmlformats.org/drawingml/2006/main" xmlns:r="http://schemas.openxmlformats.org/officeDocument/2006/relationships" xmlns:p="http://schemas.openxmlformats.org/presentationml/2006/main">
-  <p:cSld>
-    <p:spTree>
-      <p:nvGrpSpPr>
-        <p:cNvPr id="1" name=""/>
-        <p:cNvGrpSpPr/>
-        <p:nvPr/>
-      </p:nvGrpSpPr>
-      <p:grpSpPr>
-        <a:xfrm>
-          <a:off x="0" y="0"/>
-          <a:ext cx="0" cy="0"/>
-          <a:chOff x="0" y="0"/>
-          <a:chExt cx="0" cy="0"/>
-        </a:xfrm>
-      </p:grpSpPr>
-      <p:sp>
-        <p:nvSpPr>
-          <p:cNvPr id="2" name="Title 1">
-            <a:extLst>
-              <a:ext uri="{FF2B5EF4-FFF2-40B4-BE49-F238E27FC236}">
                 <a16:creationId xmlns:a16="http://schemas.microsoft.com/office/drawing/2014/main" id="{1D79796D-B214-5748-BE86-5D1E8C01ACFB}"/>
               </a:ext>
             </a:extLst>
@@ -4281,7 +3864,445 @@
 </p:sld>
 </file>
 
+<file path=ppt/slides/slide2.xml><?xml version="1.0" encoding="utf-8"?>
+<p:sld xmlns:a="http://schemas.openxmlformats.org/drawingml/2006/main" xmlns:r="http://schemas.openxmlformats.org/officeDocument/2006/relationships" xmlns:p="http://schemas.openxmlformats.org/presentationml/2006/main">
+  <p:cSld>
+    <p:spTree>
+      <p:nvGrpSpPr>
+        <p:cNvPr id="1" name=""/>
+        <p:cNvGrpSpPr/>
+        <p:nvPr/>
+      </p:nvGrpSpPr>
+      <p:grpSpPr>
+        <a:xfrm>
+          <a:off x="0" y="0"/>
+          <a:ext cx="0" cy="0"/>
+          <a:chOff x="0" y="0"/>
+          <a:chExt cx="0" cy="0"/>
+        </a:xfrm>
+      </p:grpSpPr>
+      <p:sp>
+        <p:nvSpPr>
+          <p:cNvPr id="2" name="Title 1">
+            <a:extLst>
+              <a:ext uri="{FF2B5EF4-FFF2-40B4-BE49-F238E27FC236}">
+                <a16:creationId xmlns:a16="http://schemas.microsoft.com/office/drawing/2014/main" id="{1D79796D-B214-5748-BE86-5D1E8C01ACFB}"/>
+              </a:ext>
+            </a:extLst>
+          </p:cNvPr>
+          <p:cNvSpPr>
+            <a:spLocks noGrp="1"/>
+          </p:cNvSpPr>
+          <p:nvPr>
+            <p:ph type="title"/>
+          </p:nvPr>
+        </p:nvSpPr>
+        <p:spPr/>
+        <p:txBody>
+          <a:bodyPr/>
+          <a:lstStyle/>
+          <a:p>
+            <a:r>
+              <a:rPr lang="en-US" dirty="0"/>
+              <a:t>ALU</a:t>
+            </a:r>
+          </a:p>
+        </p:txBody>
+      </p:sp>
+      <p:sp>
+        <p:nvSpPr>
+          <p:cNvPr id="5" name="Freeform 4">
+            <a:extLst>
+              <a:ext uri="{FF2B5EF4-FFF2-40B4-BE49-F238E27FC236}">
+                <a16:creationId xmlns:a16="http://schemas.microsoft.com/office/drawing/2014/main" id="{DAB5272F-9951-4245-BD0B-F820142E517D}"/>
+              </a:ext>
+            </a:extLst>
+          </p:cNvPr>
+          <p:cNvSpPr/>
+          <p:nvPr/>
+        </p:nvSpPr>
+        <p:spPr>
+          <a:xfrm>
+            <a:off x="2468880" y="2769326"/>
+            <a:ext cx="2847703" cy="1358537"/>
+          </a:xfrm>
+          <a:custGeom>
+            <a:avLst/>
+            <a:gdLst>
+              <a:gd name="connsiteX0" fmla="*/ 0 w 2847703"/>
+              <a:gd name="connsiteY0" fmla="*/ 0 h 1358537"/>
+              <a:gd name="connsiteX1" fmla="*/ 1123406 w 2847703"/>
+              <a:gd name="connsiteY1" fmla="*/ 0 h 1358537"/>
+              <a:gd name="connsiteX2" fmla="*/ 1384663 w 2847703"/>
+              <a:gd name="connsiteY2" fmla="*/ 561703 h 1358537"/>
+              <a:gd name="connsiteX3" fmla="*/ 1632857 w 2847703"/>
+              <a:gd name="connsiteY3" fmla="*/ 26125 h 1358537"/>
+              <a:gd name="connsiteX4" fmla="*/ 2847703 w 2847703"/>
+              <a:gd name="connsiteY4" fmla="*/ 0 h 1358537"/>
+              <a:gd name="connsiteX5" fmla="*/ 1946366 w 2847703"/>
+              <a:gd name="connsiteY5" fmla="*/ 1358537 h 1358537"/>
+              <a:gd name="connsiteX6" fmla="*/ 770709 w 2847703"/>
+              <a:gd name="connsiteY6" fmla="*/ 1358537 h 1358537"/>
+              <a:gd name="connsiteX7" fmla="*/ 0 w 2847703"/>
+              <a:gd name="connsiteY7" fmla="*/ 0 h 1358537"/>
+              <a:gd name="connsiteX0" fmla="*/ 0 w 2847703"/>
+              <a:gd name="connsiteY0" fmla="*/ 0 h 1358537"/>
+              <a:gd name="connsiteX1" fmla="*/ 1136469 w 2847703"/>
+              <a:gd name="connsiteY1" fmla="*/ 0 h 1358537"/>
+              <a:gd name="connsiteX2" fmla="*/ 1384663 w 2847703"/>
+              <a:gd name="connsiteY2" fmla="*/ 561703 h 1358537"/>
+              <a:gd name="connsiteX3" fmla="*/ 1632857 w 2847703"/>
+              <a:gd name="connsiteY3" fmla="*/ 26125 h 1358537"/>
+              <a:gd name="connsiteX4" fmla="*/ 2847703 w 2847703"/>
+              <a:gd name="connsiteY4" fmla="*/ 0 h 1358537"/>
+              <a:gd name="connsiteX5" fmla="*/ 1946366 w 2847703"/>
+              <a:gd name="connsiteY5" fmla="*/ 1358537 h 1358537"/>
+              <a:gd name="connsiteX6" fmla="*/ 770709 w 2847703"/>
+              <a:gd name="connsiteY6" fmla="*/ 1358537 h 1358537"/>
+              <a:gd name="connsiteX7" fmla="*/ 0 w 2847703"/>
+              <a:gd name="connsiteY7" fmla="*/ 0 h 1358537"/>
+              <a:gd name="connsiteX0" fmla="*/ 0 w 2847703"/>
+              <a:gd name="connsiteY0" fmla="*/ 0 h 1358537"/>
+              <a:gd name="connsiteX1" fmla="*/ 1136469 w 2847703"/>
+              <a:gd name="connsiteY1" fmla="*/ 0 h 1358537"/>
+              <a:gd name="connsiteX2" fmla="*/ 1384663 w 2847703"/>
+              <a:gd name="connsiteY2" fmla="*/ 561703 h 1358537"/>
+              <a:gd name="connsiteX3" fmla="*/ 1685108 w 2847703"/>
+              <a:gd name="connsiteY3" fmla="*/ 13062 h 1358537"/>
+              <a:gd name="connsiteX4" fmla="*/ 2847703 w 2847703"/>
+              <a:gd name="connsiteY4" fmla="*/ 0 h 1358537"/>
+              <a:gd name="connsiteX5" fmla="*/ 1946366 w 2847703"/>
+              <a:gd name="connsiteY5" fmla="*/ 1358537 h 1358537"/>
+              <a:gd name="connsiteX6" fmla="*/ 770709 w 2847703"/>
+              <a:gd name="connsiteY6" fmla="*/ 1358537 h 1358537"/>
+              <a:gd name="connsiteX7" fmla="*/ 0 w 2847703"/>
+              <a:gd name="connsiteY7" fmla="*/ 0 h 1358537"/>
+              <a:gd name="connsiteX0" fmla="*/ 0 w 2847703"/>
+              <a:gd name="connsiteY0" fmla="*/ 0 h 1358537"/>
+              <a:gd name="connsiteX1" fmla="*/ 1136469 w 2847703"/>
+              <a:gd name="connsiteY1" fmla="*/ 0 h 1358537"/>
+              <a:gd name="connsiteX2" fmla="*/ 1410789 w 2847703"/>
+              <a:gd name="connsiteY2" fmla="*/ 574766 h 1358537"/>
+              <a:gd name="connsiteX3" fmla="*/ 1685108 w 2847703"/>
+              <a:gd name="connsiteY3" fmla="*/ 13062 h 1358537"/>
+              <a:gd name="connsiteX4" fmla="*/ 2847703 w 2847703"/>
+              <a:gd name="connsiteY4" fmla="*/ 0 h 1358537"/>
+              <a:gd name="connsiteX5" fmla="*/ 1946366 w 2847703"/>
+              <a:gd name="connsiteY5" fmla="*/ 1358537 h 1358537"/>
+              <a:gd name="connsiteX6" fmla="*/ 770709 w 2847703"/>
+              <a:gd name="connsiteY6" fmla="*/ 1358537 h 1358537"/>
+              <a:gd name="connsiteX7" fmla="*/ 0 w 2847703"/>
+              <a:gd name="connsiteY7" fmla="*/ 0 h 1358537"/>
+              <a:gd name="connsiteX0" fmla="*/ 0 w 2847703"/>
+              <a:gd name="connsiteY0" fmla="*/ 0 h 1358537"/>
+              <a:gd name="connsiteX1" fmla="*/ 1136469 w 2847703"/>
+              <a:gd name="connsiteY1" fmla="*/ 0 h 1358537"/>
+              <a:gd name="connsiteX2" fmla="*/ 1410789 w 2847703"/>
+              <a:gd name="connsiteY2" fmla="*/ 574766 h 1358537"/>
+              <a:gd name="connsiteX3" fmla="*/ 1685108 w 2847703"/>
+              <a:gd name="connsiteY3" fmla="*/ 4595 h 1358537"/>
+              <a:gd name="connsiteX4" fmla="*/ 2847703 w 2847703"/>
+              <a:gd name="connsiteY4" fmla="*/ 0 h 1358537"/>
+              <a:gd name="connsiteX5" fmla="*/ 1946366 w 2847703"/>
+              <a:gd name="connsiteY5" fmla="*/ 1358537 h 1358537"/>
+              <a:gd name="connsiteX6" fmla="*/ 770709 w 2847703"/>
+              <a:gd name="connsiteY6" fmla="*/ 1358537 h 1358537"/>
+              <a:gd name="connsiteX7" fmla="*/ 0 w 2847703"/>
+              <a:gd name="connsiteY7" fmla="*/ 0 h 1358537"/>
+            </a:gdLst>
+            <a:ahLst/>
+            <a:cxnLst>
+              <a:cxn ang="0">
+                <a:pos x="connsiteX0" y="connsiteY0"/>
+              </a:cxn>
+              <a:cxn ang="0">
+                <a:pos x="connsiteX1" y="connsiteY1"/>
+              </a:cxn>
+              <a:cxn ang="0">
+                <a:pos x="connsiteX2" y="connsiteY2"/>
+              </a:cxn>
+              <a:cxn ang="0">
+                <a:pos x="connsiteX3" y="connsiteY3"/>
+              </a:cxn>
+              <a:cxn ang="0">
+                <a:pos x="connsiteX4" y="connsiteY4"/>
+              </a:cxn>
+              <a:cxn ang="0">
+                <a:pos x="connsiteX5" y="connsiteY5"/>
+              </a:cxn>
+              <a:cxn ang="0">
+                <a:pos x="connsiteX6" y="connsiteY6"/>
+              </a:cxn>
+              <a:cxn ang="0">
+                <a:pos x="connsiteX7" y="connsiteY7"/>
+              </a:cxn>
+            </a:cxnLst>
+            <a:rect l="l" t="t" r="r" b="b"/>
+            <a:pathLst>
+              <a:path w="2847703" h="1358537">
+                <a:moveTo>
+                  <a:pt x="0" y="0"/>
+                </a:moveTo>
+                <a:lnTo>
+                  <a:pt x="1136469" y="0"/>
+                </a:lnTo>
+                <a:lnTo>
+                  <a:pt x="1410789" y="574766"/>
+                </a:lnTo>
+                <a:lnTo>
+                  <a:pt x="1685108" y="4595"/>
+                </a:lnTo>
+                <a:lnTo>
+                  <a:pt x="2847703" y="0"/>
+                </a:lnTo>
+                <a:lnTo>
+                  <a:pt x="1946366" y="1358537"/>
+                </a:lnTo>
+                <a:lnTo>
+                  <a:pt x="770709" y="1358537"/>
+                </a:lnTo>
+                <a:lnTo>
+                  <a:pt x="0" y="0"/>
+                </a:lnTo>
+                <a:close/>
+              </a:path>
+            </a:pathLst>
+          </a:custGeom>
+          <a:solidFill>
+            <a:schemeClr val="bg1"/>
+          </a:solidFill>
+          <a:ln>
+            <a:solidFill>
+              <a:schemeClr val="tx1"/>
+            </a:solidFill>
+          </a:ln>
+        </p:spPr>
+        <p:style>
+          <a:lnRef idx="2">
+            <a:schemeClr val="accent1">
+              <a:shade val="50000"/>
+            </a:schemeClr>
+          </a:lnRef>
+          <a:fillRef idx="1">
+            <a:schemeClr val="accent1"/>
+          </a:fillRef>
+          <a:effectRef idx="0">
+            <a:schemeClr val="accent1"/>
+          </a:effectRef>
+          <a:fontRef idx="minor">
+            <a:schemeClr val="lt1"/>
+          </a:fontRef>
+        </p:style>
+        <p:txBody>
+          <a:bodyPr rtlCol="0" anchor="ctr"/>
+          <a:lstStyle/>
+          <a:p>
+            <a:pPr algn="ctr"/>
+            <a:endParaRPr lang="en-US" dirty="0"/>
+          </a:p>
+        </p:txBody>
+      </p:sp>
+    </p:spTree>
+    <p:extLst>
+      <p:ext uri="{BB962C8B-B14F-4D97-AF65-F5344CB8AC3E}">
+        <p14:creationId xmlns:p14="http://schemas.microsoft.com/office/powerpoint/2010/main" val="2090605005"/>
+      </p:ext>
+    </p:extLst>
+  </p:cSld>
+  <p:clrMapOvr>
+    <a:masterClrMapping/>
+  </p:clrMapOvr>
+</p:sld>
+</file>
+
 <file path=ppt/slides/slide3.xml><?xml version="1.0" encoding="utf-8"?>
+<p:sld xmlns:a="http://schemas.openxmlformats.org/drawingml/2006/main" xmlns:r="http://schemas.openxmlformats.org/officeDocument/2006/relationships" xmlns:p="http://schemas.openxmlformats.org/presentationml/2006/main">
+  <p:cSld>
+    <p:spTree>
+      <p:nvGrpSpPr>
+        <p:cNvPr id="1" name=""/>
+        <p:cNvGrpSpPr/>
+        <p:nvPr/>
+      </p:nvGrpSpPr>
+      <p:grpSpPr>
+        <a:xfrm>
+          <a:off x="0" y="0"/>
+          <a:ext cx="0" cy="0"/>
+          <a:chOff x="0" y="0"/>
+          <a:chExt cx="0" cy="0"/>
+        </a:xfrm>
+      </p:grpSpPr>
+      <p:sp>
+        <p:nvSpPr>
+          <p:cNvPr id="2" name="Title 1">
+            <a:extLst>
+              <a:ext uri="{FF2B5EF4-FFF2-40B4-BE49-F238E27FC236}">
+                <a16:creationId xmlns:a16="http://schemas.microsoft.com/office/drawing/2014/main" id="{1D79796D-B214-5748-BE86-5D1E8C01ACFB}"/>
+              </a:ext>
+            </a:extLst>
+          </p:cNvPr>
+          <p:cNvSpPr>
+            <a:spLocks noGrp="1"/>
+          </p:cNvSpPr>
+          <p:nvPr>
+            <p:ph type="title"/>
+          </p:nvPr>
+        </p:nvSpPr>
+        <p:spPr/>
+        <p:txBody>
+          <a:bodyPr/>
+          <a:lstStyle/>
+          <a:p>
+            <a:r>
+              <a:rPr lang="en-US" dirty="0"/>
+              <a:t>Register</a:t>
+            </a:r>
+          </a:p>
+        </p:txBody>
+      </p:sp>
+      <p:grpSp>
+        <p:nvGrpSpPr>
+          <p:cNvPr id="6" name="Group 5">
+            <a:extLst>
+              <a:ext uri="{FF2B5EF4-FFF2-40B4-BE49-F238E27FC236}">
+                <a16:creationId xmlns:a16="http://schemas.microsoft.com/office/drawing/2014/main" id="{D4AB5134-7C30-8D44-A2A5-692947FB2C00}"/>
+              </a:ext>
+            </a:extLst>
+          </p:cNvPr>
+          <p:cNvGrpSpPr/>
+          <p:nvPr/>
+        </p:nvGrpSpPr>
+        <p:grpSpPr>
+          <a:xfrm>
+            <a:off x="2160104" y="2438778"/>
+            <a:ext cx="1126435" cy="1258957"/>
+            <a:chOff x="2160104" y="2464904"/>
+            <a:chExt cx="1126435" cy="1258957"/>
+          </a:xfrm>
+        </p:grpSpPr>
+        <p:sp>
+          <p:nvSpPr>
+            <p:cNvPr id="3" name="Rectangle 2">
+              <a:extLst>
+                <a:ext uri="{FF2B5EF4-FFF2-40B4-BE49-F238E27FC236}">
+                  <a16:creationId xmlns:a16="http://schemas.microsoft.com/office/drawing/2014/main" id="{0BAD0951-6C6E-2E4A-B0E6-A3AA9141EF5F}"/>
+                </a:ext>
+              </a:extLst>
+            </p:cNvPr>
+            <p:cNvSpPr/>
+            <p:nvPr/>
+          </p:nvSpPr>
+          <p:spPr>
+            <a:xfrm>
+              <a:off x="2160104" y="2464904"/>
+              <a:ext cx="1126435" cy="1258957"/>
+            </a:xfrm>
+            <a:prstGeom prst="rect">
+              <a:avLst/>
+            </a:prstGeom>
+            <a:solidFill>
+              <a:schemeClr val="bg1"/>
+            </a:solidFill>
+            <a:ln>
+              <a:solidFill>
+                <a:schemeClr val="tx1"/>
+              </a:solidFill>
+            </a:ln>
+          </p:spPr>
+          <p:style>
+            <a:lnRef idx="2">
+              <a:schemeClr val="accent1">
+                <a:shade val="50000"/>
+              </a:schemeClr>
+            </a:lnRef>
+            <a:fillRef idx="1">
+              <a:schemeClr val="accent1"/>
+            </a:fillRef>
+            <a:effectRef idx="0">
+              <a:schemeClr val="accent1"/>
+            </a:effectRef>
+            <a:fontRef idx="minor">
+              <a:schemeClr val="lt1"/>
+            </a:fontRef>
+          </p:style>
+          <p:txBody>
+            <a:bodyPr rtlCol="0" anchor="ctr"/>
+            <a:lstStyle/>
+            <a:p>
+              <a:pPr algn="ctr"/>
+              <a:endParaRPr lang="en-US"/>
+            </a:p>
+          </p:txBody>
+        </p:sp>
+        <p:sp>
+          <p:nvSpPr>
+            <p:cNvPr id="5" name="Triangle 4">
+              <a:extLst>
+                <a:ext uri="{FF2B5EF4-FFF2-40B4-BE49-F238E27FC236}">
+                  <a16:creationId xmlns:a16="http://schemas.microsoft.com/office/drawing/2014/main" id="{6E417F15-3081-F341-9562-1D2F994C6966}"/>
+                </a:ext>
+              </a:extLst>
+            </p:cNvPr>
+            <p:cNvSpPr/>
+            <p:nvPr/>
+          </p:nvSpPr>
+          <p:spPr>
+            <a:xfrm rot="10800000">
+              <a:off x="2757187" y="2464904"/>
+              <a:ext cx="338667" cy="314371"/>
+            </a:xfrm>
+            <a:prstGeom prst="triangle">
+              <a:avLst/>
+            </a:prstGeom>
+            <a:solidFill>
+              <a:schemeClr val="bg1"/>
+            </a:solidFill>
+            <a:ln>
+              <a:solidFill>
+                <a:schemeClr val="tx1"/>
+              </a:solidFill>
+            </a:ln>
+          </p:spPr>
+          <p:style>
+            <a:lnRef idx="2">
+              <a:schemeClr val="accent1">
+                <a:shade val="50000"/>
+              </a:schemeClr>
+            </a:lnRef>
+            <a:fillRef idx="1">
+              <a:schemeClr val="accent1"/>
+            </a:fillRef>
+            <a:effectRef idx="0">
+              <a:schemeClr val="accent1"/>
+            </a:effectRef>
+            <a:fontRef idx="minor">
+              <a:schemeClr val="lt1"/>
+            </a:fontRef>
+          </p:style>
+          <p:txBody>
+            <a:bodyPr rtlCol="0" anchor="ctr"/>
+            <a:lstStyle/>
+            <a:p>
+              <a:pPr algn="ctr"/>
+              <a:endParaRPr lang="en-US"/>
+            </a:p>
+          </p:txBody>
+        </p:sp>
+      </p:grpSp>
+    </p:spTree>
+    <p:extLst>
+      <p:ext uri="{BB962C8B-B14F-4D97-AF65-F5344CB8AC3E}">
+        <p14:creationId xmlns:p14="http://schemas.microsoft.com/office/powerpoint/2010/main" val="3595410340"/>
+      </p:ext>
+    </p:extLst>
+  </p:cSld>
+  <p:clrMapOvr>
+    <a:masterClrMapping/>
+  </p:clrMapOvr>
+</p:sld>
+</file>
+
+<file path=ppt/slides/slide4.xml><?xml version="1.0" encoding="utf-8"?>
 <p:sld xmlns:a="http://schemas.openxmlformats.org/drawingml/2006/main" xmlns:r="http://schemas.openxmlformats.org/officeDocument/2006/relationships" xmlns:p="http://schemas.openxmlformats.org/presentationml/2006/main">
   <p:cSld>
     <p:spTree>
@@ -4861,7 +4882,431 @@
 </p:sld>
 </file>
 
-<file path=ppt/slides/slide4.xml><?xml version="1.0" encoding="utf-8"?>
+<file path=ppt/slides/slide5.xml><?xml version="1.0" encoding="utf-8"?>
+<p:sld xmlns:a="http://schemas.openxmlformats.org/drawingml/2006/main" xmlns:r="http://schemas.openxmlformats.org/officeDocument/2006/relationships" xmlns:p="http://schemas.openxmlformats.org/presentationml/2006/main">
+  <p:cSld>
+    <p:spTree>
+      <p:nvGrpSpPr>
+        <p:cNvPr id="1" name=""/>
+        <p:cNvGrpSpPr/>
+        <p:nvPr/>
+      </p:nvGrpSpPr>
+      <p:grpSpPr>
+        <a:xfrm>
+          <a:off x="0" y="0"/>
+          <a:ext cx="0" cy="0"/>
+          <a:chOff x="0" y="0"/>
+          <a:chExt cx="0" cy="0"/>
+        </a:xfrm>
+      </p:grpSpPr>
+      <p:sp>
+        <p:nvSpPr>
+          <p:cNvPr id="2" name="Title 1">
+            <a:extLst>
+              <a:ext uri="{FF2B5EF4-FFF2-40B4-BE49-F238E27FC236}">
+                <a16:creationId xmlns:a16="http://schemas.microsoft.com/office/drawing/2014/main" id="{BD6336BC-F2C5-7549-BB6E-BDD45E8BB60C}"/>
+              </a:ext>
+            </a:extLst>
+          </p:cNvPr>
+          <p:cNvSpPr>
+            <a:spLocks noGrp="1"/>
+          </p:cNvSpPr>
+          <p:nvPr>
+            <p:ph type="title"/>
+          </p:nvPr>
+        </p:nvSpPr>
+        <p:spPr/>
+        <p:txBody>
+          <a:bodyPr/>
+          <a:lstStyle/>
+          <a:p>
+            <a:r>
+              <a:rPr lang="en-US" dirty="0"/>
+              <a:t>Ellipses</a:t>
+            </a:r>
+          </a:p>
+        </p:txBody>
+      </p:sp>
+      <p:grpSp>
+        <p:nvGrpSpPr>
+          <p:cNvPr id="16" name="Group 15">
+            <a:extLst>
+              <a:ext uri="{FF2B5EF4-FFF2-40B4-BE49-F238E27FC236}">
+                <a16:creationId xmlns:a16="http://schemas.microsoft.com/office/drawing/2014/main" id="{FFBFFBE5-70EC-FE45-B684-9C1D741FA81F}"/>
+              </a:ext>
+            </a:extLst>
+          </p:cNvPr>
+          <p:cNvGrpSpPr/>
+          <p:nvPr/>
+        </p:nvGrpSpPr>
+        <p:grpSpPr>
+          <a:xfrm>
+            <a:off x="2757664" y="2684155"/>
+            <a:ext cx="107426" cy="500523"/>
+            <a:chOff x="7940825" y="3161211"/>
+            <a:chExt cx="107426" cy="500523"/>
+          </a:xfrm>
+        </p:grpSpPr>
+        <p:sp>
+          <p:nvSpPr>
+            <p:cNvPr id="17" name="Oval 16">
+              <a:extLst>
+                <a:ext uri="{FF2B5EF4-FFF2-40B4-BE49-F238E27FC236}">
+                  <a16:creationId xmlns:a16="http://schemas.microsoft.com/office/drawing/2014/main" id="{FEE2CA01-4E09-4845-97B2-C74BD4012C24}"/>
+                </a:ext>
+              </a:extLst>
+            </p:cNvPr>
+            <p:cNvSpPr/>
+            <p:nvPr/>
+          </p:nvSpPr>
+          <p:spPr>
+            <a:xfrm>
+              <a:off x="7942419" y="3161211"/>
+              <a:ext cx="104301" cy="109617"/>
+            </a:xfrm>
+            <a:prstGeom prst="ellipse">
+              <a:avLst/>
+            </a:prstGeom>
+            <a:solidFill>
+              <a:schemeClr val="tx1"/>
+            </a:solidFill>
+            <a:ln>
+              <a:solidFill>
+                <a:schemeClr val="tx1"/>
+              </a:solidFill>
+            </a:ln>
+          </p:spPr>
+          <p:style>
+            <a:lnRef idx="2">
+              <a:schemeClr val="accent1">
+                <a:shade val="50000"/>
+              </a:schemeClr>
+            </a:lnRef>
+            <a:fillRef idx="1">
+              <a:schemeClr val="accent1"/>
+            </a:fillRef>
+            <a:effectRef idx="0">
+              <a:schemeClr val="accent1"/>
+            </a:effectRef>
+            <a:fontRef idx="minor">
+              <a:schemeClr val="lt1"/>
+            </a:fontRef>
+          </p:style>
+          <p:txBody>
+            <a:bodyPr rtlCol="0" anchor="ctr"/>
+            <a:lstStyle/>
+            <a:p>
+              <a:pPr algn="ctr"/>
+              <a:endParaRPr lang="en-US"/>
+            </a:p>
+          </p:txBody>
+        </p:sp>
+        <p:sp>
+          <p:nvSpPr>
+            <p:cNvPr id="18" name="Oval 17">
+              <a:extLst>
+                <a:ext uri="{FF2B5EF4-FFF2-40B4-BE49-F238E27FC236}">
+                  <a16:creationId xmlns:a16="http://schemas.microsoft.com/office/drawing/2014/main" id="{9109F35A-83FE-1543-9D9A-6C7A9C9B0102}"/>
+                </a:ext>
+              </a:extLst>
+            </p:cNvPr>
+            <p:cNvSpPr/>
+            <p:nvPr/>
+          </p:nvSpPr>
+          <p:spPr>
+            <a:xfrm>
+              <a:off x="7940825" y="3356664"/>
+              <a:ext cx="104301" cy="109617"/>
+            </a:xfrm>
+            <a:prstGeom prst="ellipse">
+              <a:avLst/>
+            </a:prstGeom>
+            <a:solidFill>
+              <a:schemeClr val="tx1"/>
+            </a:solidFill>
+            <a:ln>
+              <a:solidFill>
+                <a:schemeClr val="tx1"/>
+              </a:solidFill>
+            </a:ln>
+          </p:spPr>
+          <p:style>
+            <a:lnRef idx="2">
+              <a:schemeClr val="accent1">
+                <a:shade val="50000"/>
+              </a:schemeClr>
+            </a:lnRef>
+            <a:fillRef idx="1">
+              <a:schemeClr val="accent1"/>
+            </a:fillRef>
+            <a:effectRef idx="0">
+              <a:schemeClr val="accent1"/>
+            </a:effectRef>
+            <a:fontRef idx="minor">
+              <a:schemeClr val="lt1"/>
+            </a:fontRef>
+          </p:style>
+          <p:txBody>
+            <a:bodyPr rtlCol="0" anchor="ctr"/>
+            <a:lstStyle/>
+            <a:p>
+              <a:pPr algn="ctr"/>
+              <a:endParaRPr lang="en-US" dirty="0"/>
+            </a:p>
+          </p:txBody>
+        </p:sp>
+        <p:sp>
+          <p:nvSpPr>
+            <p:cNvPr id="19" name="Oval 18">
+              <a:extLst>
+                <a:ext uri="{FF2B5EF4-FFF2-40B4-BE49-F238E27FC236}">
+                  <a16:creationId xmlns:a16="http://schemas.microsoft.com/office/drawing/2014/main" id="{B2207441-D021-984A-A0EB-F8C552B90411}"/>
+                </a:ext>
+              </a:extLst>
+            </p:cNvPr>
+            <p:cNvSpPr/>
+            <p:nvPr/>
+          </p:nvSpPr>
+          <p:spPr>
+            <a:xfrm>
+              <a:off x="7943950" y="3552117"/>
+              <a:ext cx="104301" cy="109617"/>
+            </a:xfrm>
+            <a:prstGeom prst="ellipse">
+              <a:avLst/>
+            </a:prstGeom>
+            <a:solidFill>
+              <a:schemeClr val="tx1"/>
+            </a:solidFill>
+            <a:ln>
+              <a:solidFill>
+                <a:schemeClr val="tx1"/>
+              </a:solidFill>
+            </a:ln>
+          </p:spPr>
+          <p:style>
+            <a:lnRef idx="2">
+              <a:schemeClr val="accent1">
+                <a:shade val="50000"/>
+              </a:schemeClr>
+            </a:lnRef>
+            <a:fillRef idx="1">
+              <a:schemeClr val="accent1"/>
+            </a:fillRef>
+            <a:effectRef idx="0">
+              <a:schemeClr val="accent1"/>
+            </a:effectRef>
+            <a:fontRef idx="minor">
+              <a:schemeClr val="lt1"/>
+            </a:fontRef>
+          </p:style>
+          <p:txBody>
+            <a:bodyPr rtlCol="0" anchor="ctr"/>
+            <a:lstStyle/>
+            <a:p>
+              <a:pPr algn="ctr"/>
+              <a:endParaRPr lang="en-US"/>
+            </a:p>
+          </p:txBody>
+        </p:sp>
+      </p:grpSp>
+      <p:grpSp>
+        <p:nvGrpSpPr>
+          <p:cNvPr id="24" name="Group 23">
+            <a:extLst>
+              <a:ext uri="{FF2B5EF4-FFF2-40B4-BE49-F238E27FC236}">
+                <a16:creationId xmlns:a16="http://schemas.microsoft.com/office/drawing/2014/main" id="{419C95AD-AF33-B24E-AA1A-3A422AB18F44}"/>
+              </a:ext>
+            </a:extLst>
+          </p:cNvPr>
+          <p:cNvGrpSpPr/>
+          <p:nvPr/>
+        </p:nvGrpSpPr>
+        <p:grpSpPr>
+          <a:xfrm rot="16200000">
+            <a:off x="4975169" y="2515775"/>
+            <a:ext cx="107426" cy="500523"/>
+            <a:chOff x="7940825" y="3161211"/>
+            <a:chExt cx="107426" cy="500523"/>
+          </a:xfrm>
+        </p:grpSpPr>
+        <p:sp>
+          <p:nvSpPr>
+            <p:cNvPr id="25" name="Oval 24">
+              <a:extLst>
+                <a:ext uri="{FF2B5EF4-FFF2-40B4-BE49-F238E27FC236}">
+                  <a16:creationId xmlns:a16="http://schemas.microsoft.com/office/drawing/2014/main" id="{B457740C-B336-B240-9D43-B24C64194C4A}"/>
+                </a:ext>
+              </a:extLst>
+            </p:cNvPr>
+            <p:cNvSpPr/>
+            <p:nvPr/>
+          </p:nvSpPr>
+          <p:spPr>
+            <a:xfrm>
+              <a:off x="7942419" y="3161211"/>
+              <a:ext cx="104301" cy="109617"/>
+            </a:xfrm>
+            <a:prstGeom prst="ellipse">
+              <a:avLst/>
+            </a:prstGeom>
+            <a:solidFill>
+              <a:schemeClr val="tx1"/>
+            </a:solidFill>
+            <a:ln>
+              <a:solidFill>
+                <a:schemeClr val="tx1"/>
+              </a:solidFill>
+            </a:ln>
+          </p:spPr>
+          <p:style>
+            <a:lnRef idx="2">
+              <a:schemeClr val="accent1">
+                <a:shade val="50000"/>
+              </a:schemeClr>
+            </a:lnRef>
+            <a:fillRef idx="1">
+              <a:schemeClr val="accent1"/>
+            </a:fillRef>
+            <a:effectRef idx="0">
+              <a:schemeClr val="accent1"/>
+            </a:effectRef>
+            <a:fontRef idx="minor">
+              <a:schemeClr val="lt1"/>
+            </a:fontRef>
+          </p:style>
+          <p:txBody>
+            <a:bodyPr rtlCol="0" anchor="ctr"/>
+            <a:lstStyle/>
+            <a:p>
+              <a:pPr algn="ctr"/>
+              <a:endParaRPr lang="en-US"/>
+            </a:p>
+          </p:txBody>
+        </p:sp>
+        <p:sp>
+          <p:nvSpPr>
+            <p:cNvPr id="26" name="Oval 25">
+              <a:extLst>
+                <a:ext uri="{FF2B5EF4-FFF2-40B4-BE49-F238E27FC236}">
+                  <a16:creationId xmlns:a16="http://schemas.microsoft.com/office/drawing/2014/main" id="{CD5AA14C-FFC9-2145-8BD7-3F3DF9CBBD39}"/>
+                </a:ext>
+              </a:extLst>
+            </p:cNvPr>
+            <p:cNvSpPr/>
+            <p:nvPr/>
+          </p:nvSpPr>
+          <p:spPr>
+            <a:xfrm>
+              <a:off x="7940825" y="3356664"/>
+              <a:ext cx="104301" cy="109617"/>
+            </a:xfrm>
+            <a:prstGeom prst="ellipse">
+              <a:avLst/>
+            </a:prstGeom>
+            <a:solidFill>
+              <a:schemeClr val="tx1"/>
+            </a:solidFill>
+            <a:ln>
+              <a:solidFill>
+                <a:schemeClr val="tx1"/>
+              </a:solidFill>
+            </a:ln>
+          </p:spPr>
+          <p:style>
+            <a:lnRef idx="2">
+              <a:schemeClr val="accent1">
+                <a:shade val="50000"/>
+              </a:schemeClr>
+            </a:lnRef>
+            <a:fillRef idx="1">
+              <a:schemeClr val="accent1"/>
+            </a:fillRef>
+            <a:effectRef idx="0">
+              <a:schemeClr val="accent1"/>
+            </a:effectRef>
+            <a:fontRef idx="minor">
+              <a:schemeClr val="lt1"/>
+            </a:fontRef>
+          </p:style>
+          <p:txBody>
+            <a:bodyPr rtlCol="0" anchor="ctr"/>
+            <a:lstStyle/>
+            <a:p>
+              <a:pPr algn="ctr"/>
+              <a:endParaRPr lang="en-US" dirty="0"/>
+            </a:p>
+          </p:txBody>
+        </p:sp>
+        <p:sp>
+          <p:nvSpPr>
+            <p:cNvPr id="27" name="Oval 26">
+              <a:extLst>
+                <a:ext uri="{FF2B5EF4-FFF2-40B4-BE49-F238E27FC236}">
+                  <a16:creationId xmlns:a16="http://schemas.microsoft.com/office/drawing/2014/main" id="{9F6A8C9C-73EC-274C-BE7C-3A64DE283BD7}"/>
+                </a:ext>
+              </a:extLst>
+            </p:cNvPr>
+            <p:cNvSpPr/>
+            <p:nvPr/>
+          </p:nvSpPr>
+          <p:spPr>
+            <a:xfrm>
+              <a:off x="7943950" y="3552117"/>
+              <a:ext cx="104301" cy="109617"/>
+            </a:xfrm>
+            <a:prstGeom prst="ellipse">
+              <a:avLst/>
+            </a:prstGeom>
+            <a:solidFill>
+              <a:schemeClr val="tx1"/>
+            </a:solidFill>
+            <a:ln>
+              <a:solidFill>
+                <a:schemeClr val="tx1"/>
+              </a:solidFill>
+            </a:ln>
+          </p:spPr>
+          <p:style>
+            <a:lnRef idx="2">
+              <a:schemeClr val="accent1">
+                <a:shade val="50000"/>
+              </a:schemeClr>
+            </a:lnRef>
+            <a:fillRef idx="1">
+              <a:schemeClr val="accent1"/>
+            </a:fillRef>
+            <a:effectRef idx="0">
+              <a:schemeClr val="accent1"/>
+            </a:effectRef>
+            <a:fontRef idx="minor">
+              <a:schemeClr val="lt1"/>
+            </a:fontRef>
+          </p:style>
+          <p:txBody>
+            <a:bodyPr rtlCol="0" anchor="ctr"/>
+            <a:lstStyle/>
+            <a:p>
+              <a:pPr algn="ctr"/>
+              <a:endParaRPr lang="en-US"/>
+            </a:p>
+          </p:txBody>
+        </p:sp>
+      </p:grpSp>
+    </p:spTree>
+    <p:extLst>
+      <p:ext uri="{BB962C8B-B14F-4D97-AF65-F5344CB8AC3E}">
+        <p14:creationId xmlns:p14="http://schemas.microsoft.com/office/powerpoint/2010/main" val="2564517926"/>
+      </p:ext>
+    </p:extLst>
+  </p:cSld>
+  <p:clrMapOvr>
+    <a:masterClrMapping/>
+  </p:clrMapOvr>
+</p:sld>
+</file>
+
+<file path=ppt/slides/slide6.xml><?xml version="1.0" encoding="utf-8"?>
 <p:sld xmlns:a="http://schemas.openxmlformats.org/drawingml/2006/main" xmlns:r="http://schemas.openxmlformats.org/officeDocument/2006/relationships" xmlns:p="http://schemas.openxmlformats.org/presentationml/2006/main">
   <p:cSld>
     <p:spTree>
@@ -5470,7 +5915,7 @@
 </p:sld>
 </file>
 
-<file path=ppt/slides/slide5.xml><?xml version="1.0" encoding="utf-8"?>
+<file path=ppt/slides/slide7.xml><?xml version="1.0" encoding="utf-8"?>
 <p:sld xmlns:a="http://schemas.openxmlformats.org/drawingml/2006/main" xmlns:r="http://schemas.openxmlformats.org/officeDocument/2006/relationships" xmlns:p="http://schemas.openxmlformats.org/presentationml/2006/main">
   <p:cSld>
     <p:spTree>
@@ -7347,7 +7792,7 @@
 </p:sld>
 </file>
 
-<file path=ppt/slides/slide6.xml><?xml version="1.0" encoding="utf-8"?>
+<file path=ppt/slides/slide8.xml><?xml version="1.0" encoding="utf-8"?>
 <p:sld xmlns:a="http://schemas.openxmlformats.org/drawingml/2006/main" xmlns:r="http://schemas.openxmlformats.org/officeDocument/2006/relationships" xmlns:p="http://schemas.openxmlformats.org/presentationml/2006/main">
   <p:cSld>
     <p:spTree>

</xml_diff>

<commit_message>
Added images to readme
</commit_message>
<xml_diff>
--- a/CircuitFigures.pptx
+++ b/CircuitFigures.pptx
@@ -205,7 +205,7 @@
           <a:p>
             <a:fld id="{49E6E53C-763C-F645-B62E-88CCF4DB6A8A}" type="datetimeFigureOut">
               <a:rPr lang="en-US" smtClean="0"/>
-              <a:t>8/26/18</a:t>
+              <a:t>8/28/18</a:t>
             </a:fld>
             <a:endParaRPr lang="en-US"/>
           </a:p>
@@ -703,7 +703,7 @@
           <a:p>
             <a:fld id="{D8A81409-9130-6E4D-944D-162DD4ECF258}" type="datetimeFigureOut">
               <a:rPr lang="en-US" smtClean="0"/>
-              <a:t>8/26/18</a:t>
+              <a:t>8/28/18</a:t>
             </a:fld>
             <a:endParaRPr lang="en-US"/>
           </a:p>
@@ -901,7 +901,7 @@
           <a:p>
             <a:fld id="{D8A81409-9130-6E4D-944D-162DD4ECF258}" type="datetimeFigureOut">
               <a:rPr lang="en-US" smtClean="0"/>
-              <a:t>8/26/18</a:t>
+              <a:t>8/28/18</a:t>
             </a:fld>
             <a:endParaRPr lang="en-US"/>
           </a:p>
@@ -1109,7 +1109,7 @@
           <a:p>
             <a:fld id="{D8A81409-9130-6E4D-944D-162DD4ECF258}" type="datetimeFigureOut">
               <a:rPr lang="en-US" smtClean="0"/>
-              <a:t>8/26/18</a:t>
+              <a:t>8/28/18</a:t>
             </a:fld>
             <a:endParaRPr lang="en-US"/>
           </a:p>
@@ -1307,7 +1307,7 @@
           <a:p>
             <a:fld id="{D8A81409-9130-6E4D-944D-162DD4ECF258}" type="datetimeFigureOut">
               <a:rPr lang="en-US" smtClean="0"/>
-              <a:t>8/26/18</a:t>
+              <a:t>8/28/18</a:t>
             </a:fld>
             <a:endParaRPr lang="en-US"/>
           </a:p>
@@ -1582,7 +1582,7 @@
           <a:p>
             <a:fld id="{D8A81409-9130-6E4D-944D-162DD4ECF258}" type="datetimeFigureOut">
               <a:rPr lang="en-US" smtClean="0"/>
-              <a:t>8/26/18</a:t>
+              <a:t>8/28/18</a:t>
             </a:fld>
             <a:endParaRPr lang="en-US"/>
           </a:p>
@@ -1847,7 +1847,7 @@
           <a:p>
             <a:fld id="{D8A81409-9130-6E4D-944D-162DD4ECF258}" type="datetimeFigureOut">
               <a:rPr lang="en-US" smtClean="0"/>
-              <a:t>8/26/18</a:t>
+              <a:t>8/28/18</a:t>
             </a:fld>
             <a:endParaRPr lang="en-US"/>
           </a:p>
@@ -2259,7 +2259,7 @@
           <a:p>
             <a:fld id="{D8A81409-9130-6E4D-944D-162DD4ECF258}" type="datetimeFigureOut">
               <a:rPr lang="en-US" smtClean="0"/>
-              <a:t>8/26/18</a:t>
+              <a:t>8/28/18</a:t>
             </a:fld>
             <a:endParaRPr lang="en-US"/>
           </a:p>
@@ -2400,7 +2400,7 @@
           <a:p>
             <a:fld id="{D8A81409-9130-6E4D-944D-162DD4ECF258}" type="datetimeFigureOut">
               <a:rPr lang="en-US" smtClean="0"/>
-              <a:t>8/26/18</a:t>
+              <a:t>8/28/18</a:t>
             </a:fld>
             <a:endParaRPr lang="en-US"/>
           </a:p>
@@ -2513,7 +2513,7 @@
           <a:p>
             <a:fld id="{D8A81409-9130-6E4D-944D-162DD4ECF258}" type="datetimeFigureOut">
               <a:rPr lang="en-US" smtClean="0"/>
-              <a:t>8/26/18</a:t>
+              <a:t>8/28/18</a:t>
             </a:fld>
             <a:endParaRPr lang="en-US"/>
           </a:p>
@@ -2824,7 +2824,7 @@
           <a:p>
             <a:fld id="{D8A81409-9130-6E4D-944D-162DD4ECF258}" type="datetimeFigureOut">
               <a:rPr lang="en-US" smtClean="0"/>
-              <a:t>8/26/18</a:t>
+              <a:t>8/28/18</a:t>
             </a:fld>
             <a:endParaRPr lang="en-US"/>
           </a:p>
@@ -3112,7 +3112,7 @@
           <a:p>
             <a:fld id="{D8A81409-9130-6E4D-944D-162DD4ECF258}" type="datetimeFigureOut">
               <a:rPr lang="en-US" smtClean="0"/>
-              <a:t>8/26/18</a:t>
+              <a:t>8/28/18</a:t>
             </a:fld>
             <a:endParaRPr lang="en-US"/>
           </a:p>
@@ -3353,7 +3353,7 @@
           <a:p>
             <a:fld id="{D8A81409-9130-6E4D-944D-162DD4ECF258}" type="datetimeFigureOut">
               <a:rPr lang="en-US" smtClean="0"/>
-              <a:t>8/26/18</a:t>
+              <a:t>8/28/18</a:t>
             </a:fld>
             <a:endParaRPr lang="en-US"/>
           </a:p>

</xml_diff>

<commit_message>
Added more buses and changed default font to black for registers
</commit_message>
<xml_diff>
--- a/CircuitFigures.pptx
+++ b/CircuitFigures.pptx
@@ -5,7 +5,7 @@
     <p:sldMasterId id="2147483648" r:id="rId1"/>
   </p:sldMasterIdLst>
   <p:notesMasterIdLst>
-    <p:notesMasterId r:id="rId11"/>
+    <p:notesMasterId r:id="rId12"/>
   </p:notesMasterIdLst>
   <p:sldIdLst>
     <p:sldId id="260" r:id="rId2"/>
@@ -17,6 +17,7 @@
     <p:sldId id="257" r:id="rId8"/>
     <p:sldId id="259" r:id="rId9"/>
     <p:sldId id="307" r:id="rId10"/>
+    <p:sldId id="311" r:id="rId11"/>
   </p:sldIdLst>
   <p:sldSz cx="12192000" cy="6858000"/>
   <p:notesSz cx="6858000" cy="9144000"/>
@@ -205,7 +206,7 @@
           <a:p>
             <a:fld id="{49E6E53C-763C-F645-B62E-88CCF4DB6A8A}" type="datetimeFigureOut">
               <a:rPr lang="en-US" smtClean="0"/>
-              <a:t>8/28/18</a:t>
+              <a:t>10/1/18</a:t>
             </a:fld>
             <a:endParaRPr lang="en-US"/>
           </a:p>
@@ -703,7 +704,7 @@
           <a:p>
             <a:fld id="{D8A81409-9130-6E4D-944D-162DD4ECF258}" type="datetimeFigureOut">
               <a:rPr lang="en-US" smtClean="0"/>
-              <a:t>8/28/18</a:t>
+              <a:t>10/1/18</a:t>
             </a:fld>
             <a:endParaRPr lang="en-US"/>
           </a:p>
@@ -901,7 +902,7 @@
           <a:p>
             <a:fld id="{D8A81409-9130-6E4D-944D-162DD4ECF258}" type="datetimeFigureOut">
               <a:rPr lang="en-US" smtClean="0"/>
-              <a:t>8/28/18</a:t>
+              <a:t>10/1/18</a:t>
             </a:fld>
             <a:endParaRPr lang="en-US"/>
           </a:p>
@@ -1109,7 +1110,7 @@
           <a:p>
             <a:fld id="{D8A81409-9130-6E4D-944D-162DD4ECF258}" type="datetimeFigureOut">
               <a:rPr lang="en-US" smtClean="0"/>
-              <a:t>8/28/18</a:t>
+              <a:t>10/1/18</a:t>
             </a:fld>
             <a:endParaRPr lang="en-US"/>
           </a:p>
@@ -1307,7 +1308,7 @@
           <a:p>
             <a:fld id="{D8A81409-9130-6E4D-944D-162DD4ECF258}" type="datetimeFigureOut">
               <a:rPr lang="en-US" smtClean="0"/>
-              <a:t>8/28/18</a:t>
+              <a:t>10/1/18</a:t>
             </a:fld>
             <a:endParaRPr lang="en-US"/>
           </a:p>
@@ -1582,7 +1583,7 @@
           <a:p>
             <a:fld id="{D8A81409-9130-6E4D-944D-162DD4ECF258}" type="datetimeFigureOut">
               <a:rPr lang="en-US" smtClean="0"/>
-              <a:t>8/28/18</a:t>
+              <a:t>10/1/18</a:t>
             </a:fld>
             <a:endParaRPr lang="en-US"/>
           </a:p>
@@ -1847,7 +1848,7 @@
           <a:p>
             <a:fld id="{D8A81409-9130-6E4D-944D-162DD4ECF258}" type="datetimeFigureOut">
               <a:rPr lang="en-US" smtClean="0"/>
-              <a:t>8/28/18</a:t>
+              <a:t>10/1/18</a:t>
             </a:fld>
             <a:endParaRPr lang="en-US"/>
           </a:p>
@@ -2259,7 +2260,7 @@
           <a:p>
             <a:fld id="{D8A81409-9130-6E4D-944D-162DD4ECF258}" type="datetimeFigureOut">
               <a:rPr lang="en-US" smtClean="0"/>
-              <a:t>8/28/18</a:t>
+              <a:t>10/1/18</a:t>
             </a:fld>
             <a:endParaRPr lang="en-US"/>
           </a:p>
@@ -2400,7 +2401,7 @@
           <a:p>
             <a:fld id="{D8A81409-9130-6E4D-944D-162DD4ECF258}" type="datetimeFigureOut">
               <a:rPr lang="en-US" smtClean="0"/>
-              <a:t>8/28/18</a:t>
+              <a:t>10/1/18</a:t>
             </a:fld>
             <a:endParaRPr lang="en-US"/>
           </a:p>
@@ -2513,7 +2514,7 @@
           <a:p>
             <a:fld id="{D8A81409-9130-6E4D-944D-162DD4ECF258}" type="datetimeFigureOut">
               <a:rPr lang="en-US" smtClean="0"/>
-              <a:t>8/28/18</a:t>
+              <a:t>10/1/18</a:t>
             </a:fld>
             <a:endParaRPr lang="en-US"/>
           </a:p>
@@ -2824,7 +2825,7 @@
           <a:p>
             <a:fld id="{D8A81409-9130-6E4D-944D-162DD4ECF258}" type="datetimeFigureOut">
               <a:rPr lang="en-US" smtClean="0"/>
-              <a:t>8/28/18</a:t>
+              <a:t>10/1/18</a:t>
             </a:fld>
             <a:endParaRPr lang="en-US"/>
           </a:p>
@@ -3112,7 +3113,7 @@
           <a:p>
             <a:fld id="{D8A81409-9130-6E4D-944D-162DD4ECF258}" type="datetimeFigureOut">
               <a:rPr lang="en-US" smtClean="0"/>
-              <a:t>8/28/18</a:t>
+              <a:t>10/1/18</a:t>
             </a:fld>
             <a:endParaRPr lang="en-US"/>
           </a:p>
@@ -3353,7 +3354,7 @@
           <a:p>
             <a:fld id="{D8A81409-9130-6E4D-944D-162DD4ECF258}" type="datetimeFigureOut">
               <a:rPr lang="en-US" smtClean="0"/>
-              <a:t>8/28/18</a:t>
+              <a:t>10/1/18</a:t>
             </a:fld>
             <a:endParaRPr lang="en-US"/>
           </a:p>
@@ -3865,6 +3866,120 @@
 </p:sld>
 </file>
 
+<file path=ppt/slides/slide10.xml><?xml version="1.0" encoding="utf-8"?>
+<p:sld xmlns:a="http://schemas.openxmlformats.org/drawingml/2006/main" xmlns:r="http://schemas.openxmlformats.org/officeDocument/2006/relationships" xmlns:p="http://schemas.openxmlformats.org/presentationml/2006/main">
+  <p:cSld>
+    <p:spTree>
+      <p:nvGrpSpPr>
+        <p:cNvPr id="1" name=""/>
+        <p:cNvGrpSpPr/>
+        <p:nvPr/>
+      </p:nvGrpSpPr>
+      <p:grpSpPr>
+        <a:xfrm>
+          <a:off x="0" y="0"/>
+          <a:ext cx="0" cy="0"/>
+          <a:chOff x="0" y="0"/>
+          <a:chExt cx="0" cy="0"/>
+        </a:xfrm>
+      </p:grpSpPr>
+      <p:sp>
+        <p:nvSpPr>
+          <p:cNvPr id="2" name="Title 1">
+            <a:extLst>
+              <a:ext uri="{FF2B5EF4-FFF2-40B4-BE49-F238E27FC236}">
+                <a16:creationId xmlns:a16="http://schemas.microsoft.com/office/drawing/2014/main" id="{2EF087AF-8563-5C47-8482-D407A07CD06F}"/>
+              </a:ext>
+            </a:extLst>
+          </p:cNvPr>
+          <p:cNvSpPr>
+            <a:spLocks noGrp="1"/>
+          </p:cNvSpPr>
+          <p:nvPr>
+            <p:ph type="title"/>
+          </p:nvPr>
+        </p:nvSpPr>
+        <p:spPr/>
+        <p:txBody>
+          <a:bodyPr/>
+          <a:lstStyle/>
+          <a:p>
+            <a:endParaRPr lang="en-US" dirty="0"/>
+          </a:p>
+        </p:txBody>
+      </p:sp>
+      <p:sp>
+        <p:nvSpPr>
+          <p:cNvPr id="4" name="TextBox 3">
+            <a:extLst>
+              <a:ext uri="{FF2B5EF4-FFF2-40B4-BE49-F238E27FC236}">
+                <a16:creationId xmlns:a16="http://schemas.microsoft.com/office/drawing/2014/main" id="{08C08227-C14E-C440-A1A2-0C32D31E9FD3}"/>
+              </a:ext>
+            </a:extLst>
+          </p:cNvPr>
+          <p:cNvSpPr txBox="1"/>
+          <p:nvPr/>
+        </p:nvSpPr>
+        <p:spPr>
+          <a:xfrm>
+            <a:off x="2822712" y="2133600"/>
+            <a:ext cx="6175513" cy="1477328"/>
+          </a:xfrm>
+          <a:prstGeom prst="rect">
+            <a:avLst/>
+          </a:prstGeom>
+          <a:noFill/>
+        </p:spPr>
+        <p:txBody>
+          <a:bodyPr wrap="square" rtlCol="0">
+            <a:spAutoFit/>
+          </a:bodyPr>
+          <a:lstStyle/>
+          <a:p>
+            <a:r>
+              <a:rPr lang="en-US" dirty="0"/>
+              <a:t>What am I missing in this list of primitives?</a:t>
+            </a:r>
+          </a:p>
+          <a:p>
+            <a:r>
+              <a:rPr lang="en-US" dirty="0"/>
+              <a:t>Caches?</a:t>
+            </a:r>
+          </a:p>
+          <a:p>
+            <a:r>
+              <a:rPr lang="en-US" dirty="0"/>
+              <a:t>RAMs</a:t>
+            </a:r>
+          </a:p>
+          <a:p>
+            <a:r>
+              <a:rPr lang="en-US" dirty="0"/>
+              <a:t>Analog elements</a:t>
+            </a:r>
+          </a:p>
+          <a:p>
+            <a:r>
+              <a:rPr lang="en-US" dirty="0"/>
+              <a:t>Individual gates?</a:t>
+            </a:r>
+          </a:p>
+        </p:txBody>
+      </p:sp>
+    </p:spTree>
+    <p:extLst>
+      <p:ext uri="{BB962C8B-B14F-4D97-AF65-F5344CB8AC3E}">
+        <p14:creationId xmlns:p14="http://schemas.microsoft.com/office/powerpoint/2010/main" val="164346136"/>
+      </p:ext>
+    </p:extLst>
+  </p:cSld>
+  <p:clrMapOvr>
+    <a:masterClrMapping/>
+  </p:clrMapOvr>
+</p:sld>
+</file>
+
 <file path=ppt/slides/slide2.xml><?xml version="1.0" encoding="utf-8"?>
 <p:sld xmlns:a="http://schemas.openxmlformats.org/drawingml/2006/main" xmlns:r="http://schemas.openxmlformats.org/officeDocument/2006/relationships" xmlns:p="http://schemas.openxmlformats.org/presentationml/2006/main">
   <p:cSld>
@@ -4231,7 +4346,11 @@
             <a:lstStyle/>
             <a:p>
               <a:pPr algn="ctr"/>
-              <a:endParaRPr lang="en-US"/>
+              <a:endParaRPr lang="en-US" dirty="0">
+                <a:solidFill>
+                  <a:schemeClr val="tx1"/>
+                </a:solidFill>
+              </a:endParaRPr>
             </a:p>
           </p:txBody>
         </p:sp>
@@ -4285,7 +4404,7 @@
             <a:lstStyle/>
             <a:p>
               <a:pPr algn="ctr"/>
-              <a:endParaRPr lang="en-US"/>
+              <a:endParaRPr lang="en-US" dirty="0"/>
             </a:p>
           </p:txBody>
         </p:sp>
@@ -4362,8 +4481,8 @@
         </p:nvGrpSpPr>
         <p:grpSpPr>
           <a:xfrm>
-            <a:off x="4686300" y="2616200"/>
-            <a:ext cx="1270000" cy="1447800"/>
+            <a:off x="4977847" y="2775225"/>
+            <a:ext cx="1330187" cy="1743765"/>
             <a:chOff x="4686300" y="2616200"/>
             <a:chExt cx="1270000" cy="1447800"/>
           </a:xfrm>
@@ -5181,6 +5300,528 @@
               <a:extLst>
                 <a:ext uri="{FF2B5EF4-FFF2-40B4-BE49-F238E27FC236}">
                   <a16:creationId xmlns:a16="http://schemas.microsoft.com/office/drawing/2014/main" id="{89352736-C568-144A-BF15-C13E05EC9360}"/>
+                </a:ext>
+              </a:extLst>
+            </p:cNvPr>
+            <p:cNvCxnSpPr>
+              <a:cxnSpLocks/>
+            </p:cNvCxnSpPr>
+            <p:nvPr/>
+          </p:nvCxnSpPr>
+          <p:spPr>
+            <a:xfrm>
+              <a:off x="4940897" y="4617425"/>
+              <a:ext cx="1360150" cy="0"/>
+            </a:xfrm>
+            <a:prstGeom prst="line">
+              <a:avLst/>
+            </a:prstGeom>
+            <a:ln w="38100">
+              <a:solidFill>
+                <a:schemeClr val="tx1"/>
+              </a:solidFill>
+            </a:ln>
+          </p:spPr>
+          <p:style>
+            <a:lnRef idx="1">
+              <a:schemeClr val="accent1"/>
+            </a:lnRef>
+            <a:fillRef idx="0">
+              <a:schemeClr val="accent1"/>
+            </a:fillRef>
+            <a:effectRef idx="0">
+              <a:schemeClr val="accent1"/>
+            </a:effectRef>
+            <a:fontRef idx="minor">
+              <a:schemeClr val="tx1"/>
+            </a:fontRef>
+          </p:style>
+        </p:cxnSp>
+      </p:grpSp>
+      <p:grpSp>
+        <p:nvGrpSpPr>
+          <p:cNvPr id="21" name="Group 20">
+            <a:extLst>
+              <a:ext uri="{FF2B5EF4-FFF2-40B4-BE49-F238E27FC236}">
+                <a16:creationId xmlns:a16="http://schemas.microsoft.com/office/drawing/2014/main" id="{A60A0052-4F50-1445-BC2D-FE00B55D783C}"/>
+              </a:ext>
+            </a:extLst>
+          </p:cNvPr>
+          <p:cNvGrpSpPr/>
+          <p:nvPr/>
+        </p:nvGrpSpPr>
+        <p:grpSpPr>
+          <a:xfrm>
+            <a:off x="1103000" y="4055212"/>
+            <a:ext cx="1284870" cy="1113226"/>
+            <a:chOff x="1657472" y="3839257"/>
+            <a:chExt cx="4173872" cy="1113226"/>
+          </a:xfrm>
+        </p:grpSpPr>
+        <p:cxnSp>
+          <p:nvCxnSpPr>
+            <p:cNvPr id="22" name="Straight Connector 21">
+              <a:extLst>
+                <a:ext uri="{FF2B5EF4-FFF2-40B4-BE49-F238E27FC236}">
+                  <a16:creationId xmlns:a16="http://schemas.microsoft.com/office/drawing/2014/main" id="{11A2B132-314F-6648-A63C-8C46B72F5871}"/>
+                </a:ext>
+              </a:extLst>
+            </p:cNvPr>
+            <p:cNvCxnSpPr>
+              <a:cxnSpLocks/>
+            </p:cNvCxnSpPr>
+            <p:nvPr/>
+          </p:nvCxnSpPr>
+          <p:spPr>
+            <a:xfrm>
+              <a:off x="1669698" y="3839257"/>
+              <a:ext cx="0" cy="1113226"/>
+            </a:xfrm>
+            <a:prstGeom prst="line">
+              <a:avLst/>
+            </a:prstGeom>
+            <a:ln w="38100">
+              <a:solidFill>
+                <a:schemeClr val="tx1"/>
+              </a:solidFill>
+              <a:headEnd type="none"/>
+            </a:ln>
+          </p:spPr>
+          <p:style>
+            <a:lnRef idx="1">
+              <a:schemeClr val="accent1"/>
+            </a:lnRef>
+            <a:fillRef idx="0">
+              <a:schemeClr val="accent1"/>
+            </a:fillRef>
+            <a:effectRef idx="0">
+              <a:schemeClr val="accent1"/>
+            </a:effectRef>
+            <a:fontRef idx="minor">
+              <a:schemeClr val="tx1"/>
+            </a:fontRef>
+          </p:style>
+        </p:cxnSp>
+        <p:cxnSp>
+          <p:nvCxnSpPr>
+            <p:cNvPr id="23" name="Straight Connector 22">
+              <a:extLst>
+                <a:ext uri="{FF2B5EF4-FFF2-40B4-BE49-F238E27FC236}">
+                  <a16:creationId xmlns:a16="http://schemas.microsoft.com/office/drawing/2014/main" id="{C6F9371E-90CF-C04B-961E-39514FD76F8D}"/>
+                </a:ext>
+              </a:extLst>
+            </p:cNvPr>
+            <p:cNvCxnSpPr>
+              <a:cxnSpLocks/>
+            </p:cNvCxnSpPr>
+            <p:nvPr/>
+          </p:nvCxnSpPr>
+          <p:spPr>
+            <a:xfrm flipH="1">
+              <a:off x="1657472" y="4936730"/>
+              <a:ext cx="4173872" cy="407"/>
+            </a:xfrm>
+            <a:prstGeom prst="line">
+              <a:avLst/>
+            </a:prstGeom>
+            <a:ln w="38100">
+              <a:solidFill>
+                <a:schemeClr val="tx1"/>
+              </a:solidFill>
+              <a:headEnd type="none"/>
+              <a:tailEnd type="none"/>
+            </a:ln>
+          </p:spPr>
+          <p:style>
+            <a:lnRef idx="1">
+              <a:schemeClr val="accent1"/>
+            </a:lnRef>
+            <a:fillRef idx="0">
+              <a:schemeClr val="accent1"/>
+            </a:fillRef>
+            <a:effectRef idx="0">
+              <a:schemeClr val="accent1"/>
+            </a:effectRef>
+            <a:fontRef idx="minor">
+              <a:schemeClr val="tx1"/>
+            </a:fontRef>
+          </p:style>
+        </p:cxnSp>
+      </p:grpSp>
+      <p:grpSp>
+        <p:nvGrpSpPr>
+          <p:cNvPr id="24" name="Group 23">
+            <a:extLst>
+              <a:ext uri="{FF2B5EF4-FFF2-40B4-BE49-F238E27FC236}">
+                <a16:creationId xmlns:a16="http://schemas.microsoft.com/office/drawing/2014/main" id="{9E03E60A-3B70-A647-BA40-50F76D6A9478}"/>
+              </a:ext>
+            </a:extLst>
+          </p:cNvPr>
+          <p:cNvGrpSpPr/>
+          <p:nvPr/>
+        </p:nvGrpSpPr>
+        <p:grpSpPr>
+          <a:xfrm>
+            <a:off x="3135867" y="4055212"/>
+            <a:ext cx="1284870" cy="1113226"/>
+            <a:chOff x="1607965" y="3839257"/>
+            <a:chExt cx="4173872" cy="1113226"/>
+          </a:xfrm>
+        </p:grpSpPr>
+        <p:cxnSp>
+          <p:nvCxnSpPr>
+            <p:cNvPr id="25" name="Straight Connector 24">
+              <a:extLst>
+                <a:ext uri="{FF2B5EF4-FFF2-40B4-BE49-F238E27FC236}">
+                  <a16:creationId xmlns:a16="http://schemas.microsoft.com/office/drawing/2014/main" id="{2B0E8D95-3D13-CA48-87F6-0EA4D047FBB3}"/>
+                </a:ext>
+              </a:extLst>
+            </p:cNvPr>
+            <p:cNvCxnSpPr>
+              <a:cxnSpLocks/>
+            </p:cNvCxnSpPr>
+            <p:nvPr/>
+          </p:nvCxnSpPr>
+          <p:spPr>
+            <a:xfrm>
+              <a:off x="1669698" y="3839257"/>
+              <a:ext cx="0" cy="1113226"/>
+            </a:xfrm>
+            <a:prstGeom prst="line">
+              <a:avLst/>
+            </a:prstGeom>
+            <a:ln w="38100">
+              <a:solidFill>
+                <a:schemeClr val="tx1"/>
+              </a:solidFill>
+              <a:headEnd type="none"/>
+            </a:ln>
+          </p:spPr>
+          <p:style>
+            <a:lnRef idx="1">
+              <a:schemeClr val="accent1"/>
+            </a:lnRef>
+            <a:fillRef idx="0">
+              <a:schemeClr val="accent1"/>
+            </a:fillRef>
+            <a:effectRef idx="0">
+              <a:schemeClr val="accent1"/>
+            </a:effectRef>
+            <a:fontRef idx="minor">
+              <a:schemeClr val="tx1"/>
+            </a:fontRef>
+          </p:style>
+        </p:cxnSp>
+        <p:cxnSp>
+          <p:nvCxnSpPr>
+            <p:cNvPr id="26" name="Straight Connector 25">
+              <a:extLst>
+                <a:ext uri="{FF2B5EF4-FFF2-40B4-BE49-F238E27FC236}">
+                  <a16:creationId xmlns:a16="http://schemas.microsoft.com/office/drawing/2014/main" id="{632771AE-7234-D848-BED1-44F7F9016B88}"/>
+                </a:ext>
+              </a:extLst>
+            </p:cNvPr>
+            <p:cNvCxnSpPr>
+              <a:cxnSpLocks/>
+            </p:cNvCxnSpPr>
+            <p:nvPr/>
+          </p:nvCxnSpPr>
+          <p:spPr>
+            <a:xfrm flipH="1">
+              <a:off x="1607965" y="4936730"/>
+              <a:ext cx="4173872" cy="407"/>
+            </a:xfrm>
+            <a:prstGeom prst="line">
+              <a:avLst/>
+            </a:prstGeom>
+            <a:ln w="38100">
+              <a:solidFill>
+                <a:schemeClr val="tx1"/>
+              </a:solidFill>
+              <a:headEnd type="none"/>
+              <a:tailEnd type="none"/>
+            </a:ln>
+          </p:spPr>
+          <p:style>
+            <a:lnRef idx="1">
+              <a:schemeClr val="accent1"/>
+            </a:lnRef>
+            <a:fillRef idx="0">
+              <a:schemeClr val="accent1"/>
+            </a:fillRef>
+            <a:effectRef idx="0">
+              <a:schemeClr val="accent1"/>
+            </a:effectRef>
+            <a:fontRef idx="minor">
+              <a:schemeClr val="tx1"/>
+            </a:fontRef>
+          </p:style>
+        </p:cxnSp>
+      </p:grpSp>
+      <p:grpSp>
+        <p:nvGrpSpPr>
+          <p:cNvPr id="27" name="Group 26">
+            <a:extLst>
+              <a:ext uri="{FF2B5EF4-FFF2-40B4-BE49-F238E27FC236}">
+                <a16:creationId xmlns:a16="http://schemas.microsoft.com/office/drawing/2014/main" id="{CD6FC01F-09C5-944A-A17B-FEDDE9D2F648}"/>
+              </a:ext>
+            </a:extLst>
+          </p:cNvPr>
+          <p:cNvGrpSpPr/>
+          <p:nvPr/>
+        </p:nvGrpSpPr>
+        <p:grpSpPr>
+          <a:xfrm>
+            <a:off x="6425625" y="4390652"/>
+            <a:ext cx="1360150" cy="1025192"/>
+            <a:chOff x="7121603" y="4267708"/>
+            <a:chExt cx="1360150" cy="598774"/>
+          </a:xfrm>
+        </p:grpSpPr>
+        <p:cxnSp>
+          <p:nvCxnSpPr>
+            <p:cNvPr id="28" name="Straight Connector 27">
+              <a:extLst>
+                <a:ext uri="{FF2B5EF4-FFF2-40B4-BE49-F238E27FC236}">
+                  <a16:creationId xmlns:a16="http://schemas.microsoft.com/office/drawing/2014/main" id="{054FD7A4-536E-484D-A835-602FE49E330A}"/>
+                </a:ext>
+              </a:extLst>
+            </p:cNvPr>
+            <p:cNvCxnSpPr>
+              <a:cxnSpLocks/>
+            </p:cNvCxnSpPr>
+            <p:nvPr/>
+          </p:nvCxnSpPr>
+          <p:spPr>
+            <a:xfrm>
+              <a:off x="8467311" y="4267708"/>
+              <a:ext cx="0" cy="368034"/>
+            </a:xfrm>
+            <a:prstGeom prst="line">
+              <a:avLst/>
+            </a:prstGeom>
+            <a:ln w="38100">
+              <a:solidFill>
+                <a:schemeClr val="tx1"/>
+              </a:solidFill>
+            </a:ln>
+          </p:spPr>
+          <p:style>
+            <a:lnRef idx="1">
+              <a:schemeClr val="accent1"/>
+            </a:lnRef>
+            <a:fillRef idx="0">
+              <a:schemeClr val="accent1"/>
+            </a:fillRef>
+            <a:effectRef idx="0">
+              <a:schemeClr val="accent1"/>
+            </a:effectRef>
+            <a:fontRef idx="minor">
+              <a:schemeClr val="tx1"/>
+            </a:fontRef>
+          </p:style>
+        </p:cxnSp>
+        <p:cxnSp>
+          <p:nvCxnSpPr>
+            <p:cNvPr id="29" name="Straight Connector 28">
+              <a:extLst>
+                <a:ext uri="{FF2B5EF4-FFF2-40B4-BE49-F238E27FC236}">
+                  <a16:creationId xmlns:a16="http://schemas.microsoft.com/office/drawing/2014/main" id="{9CEF55C1-38F9-0845-AC2B-9FD93C9755C0}"/>
+                </a:ext>
+              </a:extLst>
+            </p:cNvPr>
+            <p:cNvCxnSpPr>
+              <a:cxnSpLocks/>
+            </p:cNvCxnSpPr>
+            <p:nvPr/>
+          </p:nvCxnSpPr>
+          <p:spPr>
+            <a:xfrm>
+              <a:off x="7121603" y="4630685"/>
+              <a:ext cx="1360150" cy="0"/>
+            </a:xfrm>
+            <a:prstGeom prst="line">
+              <a:avLst/>
+            </a:prstGeom>
+            <a:ln w="38100">
+              <a:solidFill>
+                <a:schemeClr val="tx1"/>
+              </a:solidFill>
+            </a:ln>
+          </p:spPr>
+          <p:style>
+            <a:lnRef idx="1">
+              <a:schemeClr val="accent1"/>
+            </a:lnRef>
+            <a:fillRef idx="0">
+              <a:schemeClr val="accent1"/>
+            </a:fillRef>
+            <a:effectRef idx="0">
+              <a:schemeClr val="accent1"/>
+            </a:effectRef>
+            <a:fontRef idx="minor">
+              <a:schemeClr val="tx1"/>
+            </a:fontRef>
+          </p:style>
+        </p:cxnSp>
+        <p:cxnSp>
+          <p:nvCxnSpPr>
+            <p:cNvPr id="30" name="Straight Connector 29">
+              <a:extLst>
+                <a:ext uri="{FF2B5EF4-FFF2-40B4-BE49-F238E27FC236}">
+                  <a16:creationId xmlns:a16="http://schemas.microsoft.com/office/drawing/2014/main" id="{AE106509-DBEF-F048-9EA3-2089DDF117B1}"/>
+                </a:ext>
+              </a:extLst>
+            </p:cNvPr>
+            <p:cNvCxnSpPr>
+              <a:cxnSpLocks/>
+            </p:cNvCxnSpPr>
+            <p:nvPr/>
+          </p:nvCxnSpPr>
+          <p:spPr>
+            <a:xfrm>
+              <a:off x="7129888" y="4624999"/>
+              <a:ext cx="0" cy="241483"/>
+            </a:xfrm>
+            <a:prstGeom prst="line">
+              <a:avLst/>
+            </a:prstGeom>
+            <a:ln w="38100">
+              <a:solidFill>
+                <a:schemeClr val="tx1"/>
+              </a:solidFill>
+              <a:tailEnd type="none"/>
+            </a:ln>
+          </p:spPr>
+          <p:style>
+            <a:lnRef idx="1">
+              <a:schemeClr val="accent1"/>
+            </a:lnRef>
+            <a:fillRef idx="0">
+              <a:schemeClr val="accent1"/>
+            </a:fillRef>
+            <a:effectRef idx="0">
+              <a:schemeClr val="accent1"/>
+            </a:effectRef>
+            <a:fontRef idx="minor">
+              <a:schemeClr val="tx1"/>
+            </a:fontRef>
+          </p:style>
+        </p:cxnSp>
+      </p:grpSp>
+      <p:grpSp>
+        <p:nvGrpSpPr>
+          <p:cNvPr id="31" name="Group 30">
+            <a:extLst>
+              <a:ext uri="{FF2B5EF4-FFF2-40B4-BE49-F238E27FC236}">
+                <a16:creationId xmlns:a16="http://schemas.microsoft.com/office/drawing/2014/main" id="{0AFE8EFB-A14D-D44B-BFF9-599ABF911166}"/>
+              </a:ext>
+            </a:extLst>
+          </p:cNvPr>
+          <p:cNvGrpSpPr/>
+          <p:nvPr/>
+        </p:nvGrpSpPr>
+        <p:grpSpPr>
+          <a:xfrm>
+            <a:off x="8568017" y="4390651"/>
+            <a:ext cx="1360150" cy="1025192"/>
+            <a:chOff x="4940897" y="4249391"/>
+            <a:chExt cx="1360150" cy="619537"/>
+          </a:xfrm>
+        </p:grpSpPr>
+        <p:cxnSp>
+          <p:nvCxnSpPr>
+            <p:cNvPr id="32" name="Straight Connector 31">
+              <a:extLst>
+                <a:ext uri="{FF2B5EF4-FFF2-40B4-BE49-F238E27FC236}">
+                  <a16:creationId xmlns:a16="http://schemas.microsoft.com/office/drawing/2014/main" id="{3DE248E7-C194-774F-B575-579C02F006F5}"/>
+                </a:ext>
+              </a:extLst>
+            </p:cNvPr>
+            <p:cNvCxnSpPr>
+              <a:cxnSpLocks/>
+            </p:cNvCxnSpPr>
+            <p:nvPr/>
+          </p:nvCxnSpPr>
+          <p:spPr>
+            <a:xfrm>
+              <a:off x="6295842" y="4616513"/>
+              <a:ext cx="0" cy="252415"/>
+            </a:xfrm>
+            <a:prstGeom prst="line">
+              <a:avLst/>
+            </a:prstGeom>
+            <a:ln w="38100">
+              <a:solidFill>
+                <a:schemeClr val="tx1"/>
+              </a:solidFill>
+              <a:tailEnd type="none"/>
+            </a:ln>
+          </p:spPr>
+          <p:style>
+            <a:lnRef idx="1">
+              <a:schemeClr val="accent1"/>
+            </a:lnRef>
+            <a:fillRef idx="0">
+              <a:schemeClr val="accent1"/>
+            </a:fillRef>
+            <a:effectRef idx="0">
+              <a:schemeClr val="accent1"/>
+            </a:effectRef>
+            <a:fontRef idx="minor">
+              <a:schemeClr val="tx1"/>
+            </a:fontRef>
+          </p:style>
+        </p:cxnSp>
+        <p:cxnSp>
+          <p:nvCxnSpPr>
+            <p:cNvPr id="33" name="Straight Connector 32">
+              <a:extLst>
+                <a:ext uri="{FF2B5EF4-FFF2-40B4-BE49-F238E27FC236}">
+                  <a16:creationId xmlns:a16="http://schemas.microsoft.com/office/drawing/2014/main" id="{FBFE8177-1476-C34E-8738-6AAC15955B65}"/>
+                </a:ext>
+              </a:extLst>
+            </p:cNvPr>
+            <p:cNvCxnSpPr>
+              <a:cxnSpLocks/>
+            </p:cNvCxnSpPr>
+            <p:nvPr/>
+          </p:nvCxnSpPr>
+          <p:spPr>
+            <a:xfrm>
+              <a:off x="4946410" y="4249391"/>
+              <a:ext cx="0" cy="368034"/>
+            </a:xfrm>
+            <a:prstGeom prst="line">
+              <a:avLst/>
+            </a:prstGeom>
+            <a:ln w="38100">
+              <a:solidFill>
+                <a:schemeClr val="tx1"/>
+              </a:solidFill>
+            </a:ln>
+          </p:spPr>
+          <p:style>
+            <a:lnRef idx="1">
+              <a:schemeClr val="accent1"/>
+            </a:lnRef>
+            <a:fillRef idx="0">
+              <a:schemeClr val="accent1"/>
+            </a:fillRef>
+            <a:effectRef idx="0">
+              <a:schemeClr val="accent1"/>
+            </a:effectRef>
+            <a:fontRef idx="minor">
+              <a:schemeClr val="tx1"/>
+            </a:fontRef>
+          </p:style>
+        </p:cxnSp>
+        <p:cxnSp>
+          <p:nvCxnSpPr>
+            <p:cNvPr id="34" name="Straight Connector 33">
+              <a:extLst>
+                <a:ext uri="{FF2B5EF4-FFF2-40B4-BE49-F238E27FC236}">
+                  <a16:creationId xmlns:a16="http://schemas.microsoft.com/office/drawing/2014/main" id="{951ABBF6-E85F-524A-A725-9D30093886C2}"/>
                 </a:ext>
               </a:extLst>
             </p:cNvPr>

</xml_diff>

<commit_message>
Added timeline and pipelining figures to the repo
</commit_message>
<xml_diff>
--- a/CircuitFigures.pptx
+++ b/CircuitFigures.pptx
@@ -5,7 +5,7 @@
     <p:sldMasterId id="2147483648" r:id="rId1"/>
   </p:sldMasterIdLst>
   <p:notesMasterIdLst>
-    <p:notesMasterId r:id="rId12"/>
+    <p:notesMasterId r:id="rId14"/>
   </p:notesMasterIdLst>
   <p:sldIdLst>
     <p:sldId id="260" r:id="rId2"/>
@@ -17,7 +17,9 @@
     <p:sldId id="257" r:id="rId8"/>
     <p:sldId id="259" r:id="rId9"/>
     <p:sldId id="307" r:id="rId10"/>
-    <p:sldId id="311" r:id="rId11"/>
+    <p:sldId id="312" r:id="rId11"/>
+    <p:sldId id="276" r:id="rId12"/>
+    <p:sldId id="311" r:id="rId13"/>
   </p:sldIdLst>
   <p:sldSz cx="12192000" cy="6858000"/>
   <p:notesSz cx="6858000" cy="9144000"/>
@@ -206,7 +208,7 @@
           <a:p>
             <a:fld id="{49E6E53C-763C-F645-B62E-88CCF4DB6A8A}" type="datetimeFigureOut">
               <a:rPr lang="en-US" smtClean="0"/>
-              <a:t>10/1/18</a:t>
+              <a:t>10/30/18</a:t>
             </a:fld>
             <a:endParaRPr lang="en-US"/>
           </a:p>
@@ -557,6 +559,174 @@
 </p:notes>
 </file>
 
+<file path=ppt/notesSlides/notesSlide2.xml><?xml version="1.0" encoding="utf-8"?>
+<p:notes xmlns:a="http://schemas.openxmlformats.org/drawingml/2006/main" xmlns:r="http://schemas.openxmlformats.org/officeDocument/2006/relationships" xmlns:p="http://schemas.openxmlformats.org/presentationml/2006/main">
+  <p:cSld>
+    <p:spTree>
+      <p:nvGrpSpPr>
+        <p:cNvPr id="1" name=""/>
+        <p:cNvGrpSpPr/>
+        <p:nvPr/>
+      </p:nvGrpSpPr>
+      <p:grpSpPr>
+        <a:xfrm>
+          <a:off x="0" y="0"/>
+          <a:ext cx="0" cy="0"/>
+          <a:chOff x="0" y="0"/>
+          <a:chExt cx="0" cy="0"/>
+        </a:xfrm>
+      </p:grpSpPr>
+      <p:sp>
+        <p:nvSpPr>
+          <p:cNvPr id="2" name="Slide Image Placeholder 1"/>
+          <p:cNvSpPr>
+            <a:spLocks noGrp="1" noRot="1" noChangeAspect="1"/>
+          </p:cNvSpPr>
+          <p:nvPr>
+            <p:ph type="sldImg"/>
+          </p:nvPr>
+        </p:nvSpPr>
+        <p:spPr/>
+      </p:sp>
+      <p:sp>
+        <p:nvSpPr>
+          <p:cNvPr id="3" name="Notes Placeholder 2"/>
+          <p:cNvSpPr>
+            <a:spLocks noGrp="1"/>
+          </p:cNvSpPr>
+          <p:nvPr>
+            <p:ph type="body" idx="1"/>
+          </p:nvPr>
+        </p:nvSpPr>
+        <p:spPr/>
+        <p:txBody>
+          <a:bodyPr/>
+          <a:lstStyle/>
+          <a:p>
+            <a:endParaRPr lang="en-US" dirty="0"/>
+          </a:p>
+        </p:txBody>
+      </p:sp>
+      <p:sp>
+        <p:nvSpPr>
+          <p:cNvPr id="4" name="Slide Number Placeholder 3"/>
+          <p:cNvSpPr>
+            <a:spLocks noGrp="1"/>
+          </p:cNvSpPr>
+          <p:nvPr>
+            <p:ph type="sldNum" sz="quarter" idx="5"/>
+          </p:nvPr>
+        </p:nvSpPr>
+        <p:spPr/>
+        <p:txBody>
+          <a:bodyPr/>
+          <a:lstStyle/>
+          <a:p>
+            <a:fld id="{08A3127E-5F97-DC48-A741-4C1C9A34558D}" type="slidenum">
+              <a:rPr lang="en-US" smtClean="0"/>
+              <a:t>10</a:t>
+            </a:fld>
+            <a:endParaRPr lang="en-US"/>
+          </a:p>
+        </p:txBody>
+      </p:sp>
+    </p:spTree>
+    <p:extLst>
+      <p:ext uri="{BB962C8B-B14F-4D97-AF65-F5344CB8AC3E}">
+        <p14:creationId xmlns:p14="http://schemas.microsoft.com/office/powerpoint/2010/main" val="292124345"/>
+      </p:ext>
+    </p:extLst>
+  </p:cSld>
+  <p:clrMapOvr>
+    <a:masterClrMapping/>
+  </p:clrMapOvr>
+</p:notes>
+</file>
+
+<file path=ppt/notesSlides/notesSlide3.xml><?xml version="1.0" encoding="utf-8"?>
+<p:notes xmlns:a="http://schemas.openxmlformats.org/drawingml/2006/main" xmlns:r="http://schemas.openxmlformats.org/officeDocument/2006/relationships" xmlns:p="http://schemas.openxmlformats.org/presentationml/2006/main">
+  <p:cSld>
+    <p:spTree>
+      <p:nvGrpSpPr>
+        <p:cNvPr id="1" name=""/>
+        <p:cNvGrpSpPr/>
+        <p:nvPr/>
+      </p:nvGrpSpPr>
+      <p:grpSpPr>
+        <a:xfrm>
+          <a:off x="0" y="0"/>
+          <a:ext cx="0" cy="0"/>
+          <a:chOff x="0" y="0"/>
+          <a:chExt cx="0" cy="0"/>
+        </a:xfrm>
+      </p:grpSpPr>
+      <p:sp>
+        <p:nvSpPr>
+          <p:cNvPr id="2" name="Slide Image Placeholder 1"/>
+          <p:cNvSpPr>
+            <a:spLocks noGrp="1" noRot="1" noChangeAspect="1"/>
+          </p:cNvSpPr>
+          <p:nvPr>
+            <p:ph type="sldImg"/>
+          </p:nvPr>
+        </p:nvSpPr>
+        <p:spPr/>
+      </p:sp>
+      <p:sp>
+        <p:nvSpPr>
+          <p:cNvPr id="3" name="Notes Placeholder 2"/>
+          <p:cNvSpPr>
+            <a:spLocks noGrp="1"/>
+          </p:cNvSpPr>
+          <p:nvPr>
+            <p:ph type="body" idx="1"/>
+          </p:nvPr>
+        </p:nvSpPr>
+        <p:spPr/>
+        <p:txBody>
+          <a:bodyPr/>
+          <a:lstStyle/>
+          <a:p>
+            <a:endParaRPr lang="en-US" dirty="0"/>
+          </a:p>
+        </p:txBody>
+      </p:sp>
+      <p:sp>
+        <p:nvSpPr>
+          <p:cNvPr id="4" name="Slide Number Placeholder 3"/>
+          <p:cNvSpPr>
+            <a:spLocks noGrp="1"/>
+          </p:cNvSpPr>
+          <p:nvPr>
+            <p:ph type="sldNum" sz="quarter" idx="5"/>
+          </p:nvPr>
+        </p:nvSpPr>
+        <p:spPr/>
+        <p:txBody>
+          <a:bodyPr/>
+          <a:lstStyle/>
+          <a:p>
+            <a:fld id="{08A3127E-5F97-DC48-A741-4C1C9A34558D}" type="slidenum">
+              <a:rPr lang="en-US" smtClean="0"/>
+              <a:t>11</a:t>
+            </a:fld>
+            <a:endParaRPr lang="en-US"/>
+          </a:p>
+        </p:txBody>
+      </p:sp>
+    </p:spTree>
+    <p:extLst>
+      <p:ext uri="{BB962C8B-B14F-4D97-AF65-F5344CB8AC3E}">
+        <p14:creationId xmlns:p14="http://schemas.microsoft.com/office/powerpoint/2010/main" val="2641512170"/>
+      </p:ext>
+    </p:extLst>
+  </p:cSld>
+  <p:clrMapOvr>
+    <a:masterClrMapping/>
+  </p:clrMapOvr>
+</p:notes>
+</file>
+
 <file path=ppt/slideLayouts/slideLayout1.xml><?xml version="1.0" encoding="utf-8"?>
 <p:sldLayout xmlns:a="http://schemas.openxmlformats.org/drawingml/2006/main" xmlns:r="http://schemas.openxmlformats.org/officeDocument/2006/relationships" xmlns:p="http://schemas.openxmlformats.org/presentationml/2006/main" type="title" preserve="1">
   <p:cSld name="Title Slide">
@@ -704,7 +874,7 @@
           <a:p>
             <a:fld id="{D8A81409-9130-6E4D-944D-162DD4ECF258}" type="datetimeFigureOut">
               <a:rPr lang="en-US" smtClean="0"/>
-              <a:t>10/1/18</a:t>
+              <a:t>10/30/18</a:t>
             </a:fld>
             <a:endParaRPr lang="en-US"/>
           </a:p>
@@ -902,7 +1072,7 @@
           <a:p>
             <a:fld id="{D8A81409-9130-6E4D-944D-162DD4ECF258}" type="datetimeFigureOut">
               <a:rPr lang="en-US" smtClean="0"/>
-              <a:t>10/1/18</a:t>
+              <a:t>10/30/18</a:t>
             </a:fld>
             <a:endParaRPr lang="en-US"/>
           </a:p>
@@ -1110,7 +1280,7 @@
           <a:p>
             <a:fld id="{D8A81409-9130-6E4D-944D-162DD4ECF258}" type="datetimeFigureOut">
               <a:rPr lang="en-US" smtClean="0"/>
-              <a:t>10/1/18</a:t>
+              <a:t>10/30/18</a:t>
             </a:fld>
             <a:endParaRPr lang="en-US"/>
           </a:p>
@@ -1308,7 +1478,7 @@
           <a:p>
             <a:fld id="{D8A81409-9130-6E4D-944D-162DD4ECF258}" type="datetimeFigureOut">
               <a:rPr lang="en-US" smtClean="0"/>
-              <a:t>10/1/18</a:t>
+              <a:t>10/30/18</a:t>
             </a:fld>
             <a:endParaRPr lang="en-US"/>
           </a:p>
@@ -1583,7 +1753,7 @@
           <a:p>
             <a:fld id="{D8A81409-9130-6E4D-944D-162DD4ECF258}" type="datetimeFigureOut">
               <a:rPr lang="en-US" smtClean="0"/>
-              <a:t>10/1/18</a:t>
+              <a:t>10/30/18</a:t>
             </a:fld>
             <a:endParaRPr lang="en-US"/>
           </a:p>
@@ -1848,7 +2018,7 @@
           <a:p>
             <a:fld id="{D8A81409-9130-6E4D-944D-162DD4ECF258}" type="datetimeFigureOut">
               <a:rPr lang="en-US" smtClean="0"/>
-              <a:t>10/1/18</a:t>
+              <a:t>10/30/18</a:t>
             </a:fld>
             <a:endParaRPr lang="en-US"/>
           </a:p>
@@ -2260,7 +2430,7 @@
           <a:p>
             <a:fld id="{D8A81409-9130-6E4D-944D-162DD4ECF258}" type="datetimeFigureOut">
               <a:rPr lang="en-US" smtClean="0"/>
-              <a:t>10/1/18</a:t>
+              <a:t>10/30/18</a:t>
             </a:fld>
             <a:endParaRPr lang="en-US"/>
           </a:p>
@@ -2401,7 +2571,7 @@
           <a:p>
             <a:fld id="{D8A81409-9130-6E4D-944D-162DD4ECF258}" type="datetimeFigureOut">
               <a:rPr lang="en-US" smtClean="0"/>
-              <a:t>10/1/18</a:t>
+              <a:t>10/30/18</a:t>
             </a:fld>
             <a:endParaRPr lang="en-US"/>
           </a:p>
@@ -2514,7 +2684,7 @@
           <a:p>
             <a:fld id="{D8A81409-9130-6E4D-944D-162DD4ECF258}" type="datetimeFigureOut">
               <a:rPr lang="en-US" smtClean="0"/>
-              <a:t>10/1/18</a:t>
+              <a:t>10/30/18</a:t>
             </a:fld>
             <a:endParaRPr lang="en-US"/>
           </a:p>
@@ -2825,7 +2995,7 @@
           <a:p>
             <a:fld id="{D8A81409-9130-6E4D-944D-162DD4ECF258}" type="datetimeFigureOut">
               <a:rPr lang="en-US" smtClean="0"/>
-              <a:t>10/1/18</a:t>
+              <a:t>10/30/18</a:t>
             </a:fld>
             <a:endParaRPr lang="en-US"/>
           </a:p>
@@ -3113,7 +3283,7 @@
           <a:p>
             <a:fld id="{D8A81409-9130-6E4D-944D-162DD4ECF258}" type="datetimeFigureOut">
               <a:rPr lang="en-US" smtClean="0"/>
-              <a:t>10/1/18</a:t>
+              <a:t>10/30/18</a:t>
             </a:fld>
             <a:endParaRPr lang="en-US"/>
           </a:p>
@@ -3354,7 +3524,7 @@
           <a:p>
             <a:fld id="{D8A81409-9130-6E4D-944D-162DD4ECF258}" type="datetimeFigureOut">
               <a:rPr lang="en-US" smtClean="0"/>
-              <a:t>10/1/18</a:t>
+              <a:t>10/30/18</a:t>
             </a:fld>
             <a:endParaRPr lang="en-US"/>
           </a:p>
@@ -3883,31 +4053,3603 @@
           <a:chExt cx="0" cy="0"/>
         </a:xfrm>
       </p:grpSpPr>
-      <p:sp>
-        <p:nvSpPr>
-          <p:cNvPr id="2" name="Title 1">
+      <p:grpSp>
+        <p:nvGrpSpPr>
+          <p:cNvPr id="2" name="Group 1">
             <a:extLst>
               <a:ext uri="{FF2B5EF4-FFF2-40B4-BE49-F238E27FC236}">
-                <a16:creationId xmlns:a16="http://schemas.microsoft.com/office/drawing/2014/main" id="{2EF087AF-8563-5C47-8482-D407A07CD06F}"/>
+                <a16:creationId xmlns:a16="http://schemas.microsoft.com/office/drawing/2014/main" id="{F3F4E191-CBD0-1047-B327-677F68B3DC8B}"/>
               </a:ext>
             </a:extLst>
           </p:cNvPr>
-          <p:cNvSpPr>
-            <a:spLocks noGrp="1"/>
-          </p:cNvSpPr>
-          <p:nvPr>
-            <p:ph type="title"/>
-          </p:nvPr>
+          <p:cNvGrpSpPr/>
+          <p:nvPr/>
+        </p:nvGrpSpPr>
+        <p:grpSpPr>
+          <a:xfrm>
+            <a:off x="1126070" y="449784"/>
+            <a:ext cx="457200" cy="5689600"/>
+            <a:chOff x="2582335" y="1014400"/>
+            <a:chExt cx="457200" cy="5689600"/>
+          </a:xfrm>
+        </p:grpSpPr>
+        <p:cxnSp>
+          <p:nvCxnSpPr>
+            <p:cNvPr id="19" name="Straight Connector 18">
+              <a:extLst>
+                <a:ext uri="{FF2B5EF4-FFF2-40B4-BE49-F238E27FC236}">
+                  <a16:creationId xmlns:a16="http://schemas.microsoft.com/office/drawing/2014/main" id="{7618BDE8-9064-124C-8F81-8D594288B694}"/>
+                </a:ext>
+              </a:extLst>
+            </p:cNvPr>
+            <p:cNvCxnSpPr>
+              <a:cxnSpLocks/>
+            </p:cNvCxnSpPr>
+            <p:nvPr/>
+          </p:nvCxnSpPr>
+          <p:spPr>
+            <a:xfrm>
+              <a:off x="2810935" y="1014400"/>
+              <a:ext cx="0" cy="5689600"/>
+            </a:xfrm>
+            <a:prstGeom prst="line">
+              <a:avLst/>
+            </a:prstGeom>
+            <a:ln w="50800">
+              <a:solidFill>
+                <a:schemeClr val="tx1"/>
+              </a:solidFill>
+              <a:tailEnd type="triangle"/>
+            </a:ln>
+          </p:spPr>
+          <p:style>
+            <a:lnRef idx="1">
+              <a:schemeClr val="accent1"/>
+            </a:lnRef>
+            <a:fillRef idx="0">
+              <a:schemeClr val="accent1"/>
+            </a:fillRef>
+            <a:effectRef idx="0">
+              <a:schemeClr val="accent1"/>
+            </a:effectRef>
+            <a:fontRef idx="minor">
+              <a:schemeClr val="tx1"/>
+            </a:fontRef>
+          </p:style>
+        </p:cxnSp>
+        <p:cxnSp>
+          <p:nvCxnSpPr>
+            <p:cNvPr id="25" name="Straight Connector 24">
+              <a:extLst>
+                <a:ext uri="{FF2B5EF4-FFF2-40B4-BE49-F238E27FC236}">
+                  <a16:creationId xmlns:a16="http://schemas.microsoft.com/office/drawing/2014/main" id="{B1A17B0A-575A-BE46-AE64-D83DB58A37A6}"/>
+                </a:ext>
+              </a:extLst>
+            </p:cNvPr>
+            <p:cNvCxnSpPr/>
+            <p:nvPr/>
+          </p:nvCxnSpPr>
+          <p:spPr>
+            <a:xfrm>
+              <a:off x="2582335" y="1014400"/>
+              <a:ext cx="457200" cy="0"/>
+            </a:xfrm>
+            <a:prstGeom prst="line">
+              <a:avLst/>
+            </a:prstGeom>
+            <a:ln w="50800">
+              <a:solidFill>
+                <a:schemeClr val="tx1"/>
+              </a:solidFill>
+            </a:ln>
+          </p:spPr>
+          <p:style>
+            <a:lnRef idx="1">
+              <a:schemeClr val="accent1"/>
+            </a:lnRef>
+            <a:fillRef idx="0">
+              <a:schemeClr val="accent1"/>
+            </a:fillRef>
+            <a:effectRef idx="0">
+              <a:schemeClr val="accent1"/>
+            </a:effectRef>
+            <a:fontRef idx="minor">
+              <a:schemeClr val="tx1"/>
+            </a:fontRef>
+          </p:style>
+        </p:cxnSp>
+        <p:cxnSp>
+          <p:nvCxnSpPr>
+            <p:cNvPr id="26" name="Straight Connector 25">
+              <a:extLst>
+                <a:ext uri="{FF2B5EF4-FFF2-40B4-BE49-F238E27FC236}">
+                  <a16:creationId xmlns:a16="http://schemas.microsoft.com/office/drawing/2014/main" id="{8CAB5BC8-81A4-B047-90C6-FB4766637007}"/>
+                </a:ext>
+              </a:extLst>
+            </p:cNvPr>
+            <p:cNvCxnSpPr>
+              <a:cxnSpLocks/>
+            </p:cNvCxnSpPr>
+            <p:nvPr/>
+          </p:nvCxnSpPr>
+          <p:spPr>
+            <a:xfrm>
+              <a:off x="2582335" y="1420800"/>
+              <a:ext cx="457200" cy="0"/>
+            </a:xfrm>
+            <a:prstGeom prst="line">
+              <a:avLst/>
+            </a:prstGeom>
+            <a:ln w="50800">
+              <a:solidFill>
+                <a:schemeClr val="tx1"/>
+              </a:solidFill>
+            </a:ln>
+          </p:spPr>
+          <p:style>
+            <a:lnRef idx="1">
+              <a:schemeClr val="accent1"/>
+            </a:lnRef>
+            <a:fillRef idx="0">
+              <a:schemeClr val="accent1"/>
+            </a:fillRef>
+            <a:effectRef idx="0">
+              <a:schemeClr val="accent1"/>
+            </a:effectRef>
+            <a:fontRef idx="minor">
+              <a:schemeClr val="tx1"/>
+            </a:fontRef>
+          </p:style>
+        </p:cxnSp>
+        <p:cxnSp>
+          <p:nvCxnSpPr>
+            <p:cNvPr id="27" name="Straight Connector 26">
+              <a:extLst>
+                <a:ext uri="{FF2B5EF4-FFF2-40B4-BE49-F238E27FC236}">
+                  <a16:creationId xmlns:a16="http://schemas.microsoft.com/office/drawing/2014/main" id="{EFCB4AFF-2BA2-9F4F-9A89-55F1F31A4921}"/>
+                </a:ext>
+              </a:extLst>
+            </p:cNvPr>
+            <p:cNvCxnSpPr/>
+            <p:nvPr/>
+          </p:nvCxnSpPr>
+          <p:spPr>
+            <a:xfrm>
+              <a:off x="2582335" y="1844133"/>
+              <a:ext cx="457200" cy="0"/>
+            </a:xfrm>
+            <a:prstGeom prst="line">
+              <a:avLst/>
+            </a:prstGeom>
+            <a:ln w="50800">
+              <a:solidFill>
+                <a:schemeClr val="tx1"/>
+              </a:solidFill>
+            </a:ln>
+          </p:spPr>
+          <p:style>
+            <a:lnRef idx="1">
+              <a:schemeClr val="accent1"/>
+            </a:lnRef>
+            <a:fillRef idx="0">
+              <a:schemeClr val="accent1"/>
+            </a:fillRef>
+            <a:effectRef idx="0">
+              <a:schemeClr val="accent1"/>
+            </a:effectRef>
+            <a:fontRef idx="minor">
+              <a:schemeClr val="tx1"/>
+            </a:fontRef>
+          </p:style>
+        </p:cxnSp>
+        <p:cxnSp>
+          <p:nvCxnSpPr>
+            <p:cNvPr id="28" name="Straight Connector 27">
+              <a:extLst>
+                <a:ext uri="{FF2B5EF4-FFF2-40B4-BE49-F238E27FC236}">
+                  <a16:creationId xmlns:a16="http://schemas.microsoft.com/office/drawing/2014/main" id="{6BB33262-F3AD-F14B-B0D4-149819CABF38}"/>
+                </a:ext>
+              </a:extLst>
+            </p:cNvPr>
+            <p:cNvCxnSpPr/>
+            <p:nvPr/>
+          </p:nvCxnSpPr>
+          <p:spPr>
+            <a:xfrm>
+              <a:off x="2582335" y="2250533"/>
+              <a:ext cx="457200" cy="0"/>
+            </a:xfrm>
+            <a:prstGeom prst="line">
+              <a:avLst/>
+            </a:prstGeom>
+            <a:ln w="50800">
+              <a:solidFill>
+                <a:schemeClr val="tx1"/>
+              </a:solidFill>
+            </a:ln>
+          </p:spPr>
+          <p:style>
+            <a:lnRef idx="1">
+              <a:schemeClr val="accent1"/>
+            </a:lnRef>
+            <a:fillRef idx="0">
+              <a:schemeClr val="accent1"/>
+            </a:fillRef>
+            <a:effectRef idx="0">
+              <a:schemeClr val="accent1"/>
+            </a:effectRef>
+            <a:fontRef idx="minor">
+              <a:schemeClr val="tx1"/>
+            </a:fontRef>
+          </p:style>
+        </p:cxnSp>
+        <p:cxnSp>
+          <p:nvCxnSpPr>
+            <p:cNvPr id="29" name="Straight Connector 28">
+              <a:extLst>
+                <a:ext uri="{FF2B5EF4-FFF2-40B4-BE49-F238E27FC236}">
+                  <a16:creationId xmlns:a16="http://schemas.microsoft.com/office/drawing/2014/main" id="{D70A06FB-E89C-2A42-BB42-0F114C7F920C}"/>
+                </a:ext>
+              </a:extLst>
+            </p:cNvPr>
+            <p:cNvCxnSpPr/>
+            <p:nvPr/>
+          </p:nvCxnSpPr>
+          <p:spPr>
+            <a:xfrm>
+              <a:off x="2582335" y="2673866"/>
+              <a:ext cx="457200" cy="0"/>
+            </a:xfrm>
+            <a:prstGeom prst="line">
+              <a:avLst/>
+            </a:prstGeom>
+            <a:ln w="50800">
+              <a:solidFill>
+                <a:schemeClr val="tx1"/>
+              </a:solidFill>
+            </a:ln>
+          </p:spPr>
+          <p:style>
+            <a:lnRef idx="1">
+              <a:schemeClr val="accent1"/>
+            </a:lnRef>
+            <a:fillRef idx="0">
+              <a:schemeClr val="accent1"/>
+            </a:fillRef>
+            <a:effectRef idx="0">
+              <a:schemeClr val="accent1"/>
+            </a:effectRef>
+            <a:fontRef idx="minor">
+              <a:schemeClr val="tx1"/>
+            </a:fontRef>
+          </p:style>
+        </p:cxnSp>
+        <p:cxnSp>
+          <p:nvCxnSpPr>
+            <p:cNvPr id="30" name="Straight Connector 29">
+              <a:extLst>
+                <a:ext uri="{FF2B5EF4-FFF2-40B4-BE49-F238E27FC236}">
+                  <a16:creationId xmlns:a16="http://schemas.microsoft.com/office/drawing/2014/main" id="{7FDE9DB7-49E5-3245-B093-0E9EA6E6DBC9}"/>
+                </a:ext>
+              </a:extLst>
+            </p:cNvPr>
+            <p:cNvCxnSpPr/>
+            <p:nvPr/>
+          </p:nvCxnSpPr>
+          <p:spPr>
+            <a:xfrm>
+              <a:off x="2582335" y="3063334"/>
+              <a:ext cx="457200" cy="0"/>
+            </a:xfrm>
+            <a:prstGeom prst="line">
+              <a:avLst/>
+            </a:prstGeom>
+            <a:ln w="50800">
+              <a:solidFill>
+                <a:schemeClr val="tx1"/>
+              </a:solidFill>
+            </a:ln>
+          </p:spPr>
+          <p:style>
+            <a:lnRef idx="1">
+              <a:schemeClr val="accent1"/>
+            </a:lnRef>
+            <a:fillRef idx="0">
+              <a:schemeClr val="accent1"/>
+            </a:fillRef>
+            <a:effectRef idx="0">
+              <a:schemeClr val="accent1"/>
+            </a:effectRef>
+            <a:fontRef idx="minor">
+              <a:schemeClr val="tx1"/>
+            </a:fontRef>
+          </p:style>
+        </p:cxnSp>
+        <p:cxnSp>
+          <p:nvCxnSpPr>
+            <p:cNvPr id="31" name="Straight Connector 30">
+              <a:extLst>
+                <a:ext uri="{FF2B5EF4-FFF2-40B4-BE49-F238E27FC236}">
+                  <a16:creationId xmlns:a16="http://schemas.microsoft.com/office/drawing/2014/main" id="{FA690570-DD8B-E546-AF97-770D432E3A3E}"/>
+                </a:ext>
+              </a:extLst>
+            </p:cNvPr>
+            <p:cNvCxnSpPr/>
+            <p:nvPr/>
+          </p:nvCxnSpPr>
+          <p:spPr>
+            <a:xfrm>
+              <a:off x="2582335" y="3486667"/>
+              <a:ext cx="457200" cy="0"/>
+            </a:xfrm>
+            <a:prstGeom prst="line">
+              <a:avLst/>
+            </a:prstGeom>
+            <a:ln w="50800">
+              <a:solidFill>
+                <a:schemeClr val="tx1"/>
+              </a:solidFill>
+            </a:ln>
+          </p:spPr>
+          <p:style>
+            <a:lnRef idx="1">
+              <a:schemeClr val="accent1"/>
+            </a:lnRef>
+            <a:fillRef idx="0">
+              <a:schemeClr val="accent1"/>
+            </a:fillRef>
+            <a:effectRef idx="0">
+              <a:schemeClr val="accent1"/>
+            </a:effectRef>
+            <a:fontRef idx="minor">
+              <a:schemeClr val="tx1"/>
+            </a:fontRef>
+          </p:style>
+        </p:cxnSp>
+        <p:cxnSp>
+          <p:nvCxnSpPr>
+            <p:cNvPr id="32" name="Straight Connector 31">
+              <a:extLst>
+                <a:ext uri="{FF2B5EF4-FFF2-40B4-BE49-F238E27FC236}">
+                  <a16:creationId xmlns:a16="http://schemas.microsoft.com/office/drawing/2014/main" id="{ABA49545-D026-0147-8578-63B95B571523}"/>
+                </a:ext>
+              </a:extLst>
+            </p:cNvPr>
+            <p:cNvCxnSpPr/>
+            <p:nvPr/>
+          </p:nvCxnSpPr>
+          <p:spPr>
+            <a:xfrm>
+              <a:off x="2582335" y="3893067"/>
+              <a:ext cx="457200" cy="0"/>
+            </a:xfrm>
+            <a:prstGeom prst="line">
+              <a:avLst/>
+            </a:prstGeom>
+            <a:ln w="50800">
+              <a:solidFill>
+                <a:schemeClr val="tx1"/>
+              </a:solidFill>
+            </a:ln>
+          </p:spPr>
+          <p:style>
+            <a:lnRef idx="1">
+              <a:schemeClr val="accent1"/>
+            </a:lnRef>
+            <a:fillRef idx="0">
+              <a:schemeClr val="accent1"/>
+            </a:fillRef>
+            <a:effectRef idx="0">
+              <a:schemeClr val="accent1"/>
+            </a:effectRef>
+            <a:fontRef idx="minor">
+              <a:schemeClr val="tx1"/>
+            </a:fontRef>
+          </p:style>
+        </p:cxnSp>
+        <p:cxnSp>
+          <p:nvCxnSpPr>
+            <p:cNvPr id="33" name="Straight Connector 32">
+              <a:extLst>
+                <a:ext uri="{FF2B5EF4-FFF2-40B4-BE49-F238E27FC236}">
+                  <a16:creationId xmlns:a16="http://schemas.microsoft.com/office/drawing/2014/main" id="{D67240BC-7C7F-2547-BD07-6F3C1E03D1A3}"/>
+                </a:ext>
+              </a:extLst>
+            </p:cNvPr>
+            <p:cNvCxnSpPr/>
+            <p:nvPr/>
+          </p:nvCxnSpPr>
+          <p:spPr>
+            <a:xfrm>
+              <a:off x="2582335" y="4316400"/>
+              <a:ext cx="457200" cy="0"/>
+            </a:xfrm>
+            <a:prstGeom prst="line">
+              <a:avLst/>
+            </a:prstGeom>
+            <a:ln w="50800">
+              <a:solidFill>
+                <a:schemeClr val="tx1"/>
+              </a:solidFill>
+            </a:ln>
+          </p:spPr>
+          <p:style>
+            <a:lnRef idx="1">
+              <a:schemeClr val="accent1"/>
+            </a:lnRef>
+            <a:fillRef idx="0">
+              <a:schemeClr val="accent1"/>
+            </a:fillRef>
+            <a:effectRef idx="0">
+              <a:schemeClr val="accent1"/>
+            </a:effectRef>
+            <a:fontRef idx="minor">
+              <a:schemeClr val="tx1"/>
+            </a:fontRef>
+          </p:style>
+        </p:cxnSp>
+        <p:cxnSp>
+          <p:nvCxnSpPr>
+            <p:cNvPr id="34" name="Straight Connector 33">
+              <a:extLst>
+                <a:ext uri="{FF2B5EF4-FFF2-40B4-BE49-F238E27FC236}">
+                  <a16:creationId xmlns:a16="http://schemas.microsoft.com/office/drawing/2014/main" id="{862B1A0F-1330-CD4C-898A-31A7B036169D}"/>
+                </a:ext>
+              </a:extLst>
+            </p:cNvPr>
+            <p:cNvCxnSpPr/>
+            <p:nvPr/>
+          </p:nvCxnSpPr>
+          <p:spPr>
+            <a:xfrm>
+              <a:off x="2582335" y="4722800"/>
+              <a:ext cx="457200" cy="0"/>
+            </a:xfrm>
+            <a:prstGeom prst="line">
+              <a:avLst/>
+            </a:prstGeom>
+            <a:ln w="50800">
+              <a:solidFill>
+                <a:schemeClr val="tx1"/>
+              </a:solidFill>
+            </a:ln>
+          </p:spPr>
+          <p:style>
+            <a:lnRef idx="1">
+              <a:schemeClr val="accent1"/>
+            </a:lnRef>
+            <a:fillRef idx="0">
+              <a:schemeClr val="accent1"/>
+            </a:fillRef>
+            <a:effectRef idx="0">
+              <a:schemeClr val="accent1"/>
+            </a:effectRef>
+            <a:fontRef idx="minor">
+              <a:schemeClr val="tx1"/>
+            </a:fontRef>
+          </p:style>
+        </p:cxnSp>
+        <p:cxnSp>
+          <p:nvCxnSpPr>
+            <p:cNvPr id="35" name="Straight Connector 34">
+              <a:extLst>
+                <a:ext uri="{FF2B5EF4-FFF2-40B4-BE49-F238E27FC236}">
+                  <a16:creationId xmlns:a16="http://schemas.microsoft.com/office/drawing/2014/main" id="{34DA22E9-68FE-9F40-9B63-17F810CA5A96}"/>
+                </a:ext>
+              </a:extLst>
+            </p:cNvPr>
+            <p:cNvCxnSpPr/>
+            <p:nvPr/>
+          </p:nvCxnSpPr>
+          <p:spPr>
+            <a:xfrm>
+              <a:off x="2582335" y="5095334"/>
+              <a:ext cx="457200" cy="0"/>
+            </a:xfrm>
+            <a:prstGeom prst="line">
+              <a:avLst/>
+            </a:prstGeom>
+            <a:ln w="50800">
+              <a:solidFill>
+                <a:schemeClr val="tx1"/>
+              </a:solidFill>
+            </a:ln>
+          </p:spPr>
+          <p:style>
+            <a:lnRef idx="1">
+              <a:schemeClr val="accent1"/>
+            </a:lnRef>
+            <a:fillRef idx="0">
+              <a:schemeClr val="accent1"/>
+            </a:fillRef>
+            <a:effectRef idx="0">
+              <a:schemeClr val="accent1"/>
+            </a:effectRef>
+            <a:fontRef idx="minor">
+              <a:schemeClr val="tx1"/>
+            </a:fontRef>
+          </p:style>
+        </p:cxnSp>
+        <p:cxnSp>
+          <p:nvCxnSpPr>
+            <p:cNvPr id="36" name="Straight Connector 35">
+              <a:extLst>
+                <a:ext uri="{FF2B5EF4-FFF2-40B4-BE49-F238E27FC236}">
+                  <a16:creationId xmlns:a16="http://schemas.microsoft.com/office/drawing/2014/main" id="{914BB388-C059-FD43-83F8-987AC8A53D2A}"/>
+                </a:ext>
+              </a:extLst>
+            </p:cNvPr>
+            <p:cNvCxnSpPr/>
+            <p:nvPr/>
+          </p:nvCxnSpPr>
+          <p:spPr>
+            <a:xfrm>
+              <a:off x="2582335" y="5501734"/>
+              <a:ext cx="457200" cy="0"/>
+            </a:xfrm>
+            <a:prstGeom prst="line">
+              <a:avLst/>
+            </a:prstGeom>
+            <a:ln w="50800">
+              <a:solidFill>
+                <a:schemeClr val="tx1"/>
+              </a:solidFill>
+            </a:ln>
+          </p:spPr>
+          <p:style>
+            <a:lnRef idx="1">
+              <a:schemeClr val="accent1"/>
+            </a:lnRef>
+            <a:fillRef idx="0">
+              <a:schemeClr val="accent1"/>
+            </a:fillRef>
+            <a:effectRef idx="0">
+              <a:schemeClr val="accent1"/>
+            </a:effectRef>
+            <a:fontRef idx="minor">
+              <a:schemeClr val="tx1"/>
+            </a:fontRef>
+          </p:style>
+        </p:cxnSp>
+        <p:cxnSp>
+          <p:nvCxnSpPr>
+            <p:cNvPr id="37" name="Straight Connector 36">
+              <a:extLst>
+                <a:ext uri="{FF2B5EF4-FFF2-40B4-BE49-F238E27FC236}">
+                  <a16:creationId xmlns:a16="http://schemas.microsoft.com/office/drawing/2014/main" id="{FD36601F-2CC6-604D-B2D5-E0E574D04B24}"/>
+                </a:ext>
+              </a:extLst>
+            </p:cNvPr>
+            <p:cNvCxnSpPr/>
+            <p:nvPr/>
+          </p:nvCxnSpPr>
+          <p:spPr>
+            <a:xfrm>
+              <a:off x="2582335" y="5908134"/>
+              <a:ext cx="457200" cy="0"/>
+            </a:xfrm>
+            <a:prstGeom prst="line">
+              <a:avLst/>
+            </a:prstGeom>
+            <a:ln w="50800">
+              <a:solidFill>
+                <a:schemeClr val="tx1"/>
+              </a:solidFill>
+            </a:ln>
+          </p:spPr>
+          <p:style>
+            <a:lnRef idx="1">
+              <a:schemeClr val="accent1"/>
+            </a:lnRef>
+            <a:fillRef idx="0">
+              <a:schemeClr val="accent1"/>
+            </a:fillRef>
+            <a:effectRef idx="0">
+              <a:schemeClr val="accent1"/>
+            </a:effectRef>
+            <a:fontRef idx="minor">
+              <a:schemeClr val="tx1"/>
+            </a:fontRef>
+          </p:style>
+        </p:cxnSp>
+        <p:cxnSp>
+          <p:nvCxnSpPr>
+            <p:cNvPr id="38" name="Straight Connector 37">
+              <a:extLst>
+                <a:ext uri="{FF2B5EF4-FFF2-40B4-BE49-F238E27FC236}">
+                  <a16:creationId xmlns:a16="http://schemas.microsoft.com/office/drawing/2014/main" id="{31C23233-B447-DA48-A138-0B2BCF863829}"/>
+                </a:ext>
+              </a:extLst>
+            </p:cNvPr>
+            <p:cNvCxnSpPr/>
+            <p:nvPr/>
+          </p:nvCxnSpPr>
+          <p:spPr>
+            <a:xfrm>
+              <a:off x="2582335" y="6331467"/>
+              <a:ext cx="457200" cy="0"/>
+            </a:xfrm>
+            <a:prstGeom prst="line">
+              <a:avLst/>
+            </a:prstGeom>
+            <a:ln w="50800">
+              <a:solidFill>
+                <a:schemeClr val="tx1"/>
+              </a:solidFill>
+            </a:ln>
+          </p:spPr>
+          <p:style>
+            <a:lnRef idx="1">
+              <a:schemeClr val="accent1"/>
+            </a:lnRef>
+            <a:fillRef idx="0">
+              <a:schemeClr val="accent1"/>
+            </a:fillRef>
+            <a:effectRef idx="0">
+              <a:schemeClr val="accent1"/>
+            </a:effectRef>
+            <a:fontRef idx="minor">
+              <a:schemeClr val="tx1"/>
+            </a:fontRef>
+          </p:style>
+        </p:cxnSp>
+      </p:grpSp>
+    </p:spTree>
+    <p:extLst>
+      <p:ext uri="{BB962C8B-B14F-4D97-AF65-F5344CB8AC3E}">
+        <p14:creationId xmlns:p14="http://schemas.microsoft.com/office/powerpoint/2010/main" val="738085725"/>
+      </p:ext>
+    </p:extLst>
+  </p:cSld>
+  <p:clrMapOvr>
+    <a:masterClrMapping/>
+  </p:clrMapOvr>
+</p:sld>
+</file>
+
+<file path=ppt/slides/slide11.xml><?xml version="1.0" encoding="utf-8"?>
+<p:sld xmlns:a="http://schemas.openxmlformats.org/drawingml/2006/main" xmlns:r="http://schemas.openxmlformats.org/officeDocument/2006/relationships" xmlns:p="http://schemas.openxmlformats.org/presentationml/2006/main">
+  <p:cSld>
+    <p:spTree>
+      <p:nvGrpSpPr>
+        <p:cNvPr id="1" name=""/>
+        <p:cNvGrpSpPr/>
+        <p:nvPr/>
+      </p:nvGrpSpPr>
+      <p:grpSpPr>
+        <a:xfrm>
+          <a:off x="0" y="0"/>
+          <a:ext cx="0" cy="0"/>
+          <a:chOff x="0" y="0"/>
+          <a:chExt cx="0" cy="0"/>
+        </a:xfrm>
+      </p:grpSpPr>
+      <p:sp>
+        <p:nvSpPr>
+          <p:cNvPr id="4" name="Rectangle 3">
+            <a:extLst>
+              <a:ext uri="{FF2B5EF4-FFF2-40B4-BE49-F238E27FC236}">
+                <a16:creationId xmlns:a16="http://schemas.microsoft.com/office/drawing/2014/main" id="{6EAA2480-7DDC-C940-BB03-B1D835548B1A}"/>
+              </a:ext>
+            </a:extLst>
+          </p:cNvPr>
+          <p:cNvSpPr/>
+          <p:nvPr/>
         </p:nvSpPr>
-        <p:spPr/>
+        <p:spPr>
+          <a:xfrm>
+            <a:off x="1081616" y="2540001"/>
+            <a:ext cx="984249" cy="1490132"/>
+          </a:xfrm>
+          <a:prstGeom prst="rect">
+            <a:avLst/>
+          </a:prstGeom>
+          <a:solidFill>
+            <a:schemeClr val="bg1"/>
+          </a:solidFill>
+          <a:ln>
+            <a:solidFill>
+              <a:schemeClr val="tx1"/>
+            </a:solidFill>
+          </a:ln>
+        </p:spPr>
+        <p:style>
+          <a:lnRef idx="2">
+            <a:schemeClr val="accent1">
+              <a:shade val="50000"/>
+            </a:schemeClr>
+          </a:lnRef>
+          <a:fillRef idx="1">
+            <a:schemeClr val="accent1"/>
+          </a:fillRef>
+          <a:effectRef idx="0">
+            <a:schemeClr val="accent1"/>
+          </a:effectRef>
+          <a:fontRef idx="minor">
+            <a:schemeClr val="lt1"/>
+          </a:fontRef>
+        </p:style>
         <p:txBody>
-          <a:bodyPr/>
+          <a:bodyPr rtlCol="0" anchor="ctr"/>
           <a:lstStyle/>
+          <a:p>
+            <a:pPr algn="ctr"/>
+            <a:endParaRPr lang="en-US" dirty="0">
+              <a:solidFill>
+                <a:schemeClr val="tx1"/>
+              </a:solidFill>
+            </a:endParaRPr>
+          </a:p>
+        </p:txBody>
+      </p:sp>
+      <p:sp>
+        <p:nvSpPr>
+          <p:cNvPr id="7" name="TextBox 6">
+            <a:extLst>
+              <a:ext uri="{FF2B5EF4-FFF2-40B4-BE49-F238E27FC236}">
+                <a16:creationId xmlns:a16="http://schemas.microsoft.com/office/drawing/2014/main" id="{4EAE668E-F844-654B-802B-4A6055F0E758}"/>
+              </a:ext>
+            </a:extLst>
+          </p:cNvPr>
+          <p:cNvSpPr txBox="1"/>
+          <p:nvPr/>
+        </p:nvSpPr>
+        <p:spPr>
+          <a:xfrm>
+            <a:off x="1405465" y="2540001"/>
+            <a:ext cx="491067" cy="1754326"/>
+          </a:xfrm>
+          <a:prstGeom prst="rect">
+            <a:avLst/>
+          </a:prstGeom>
+          <a:noFill/>
+        </p:spPr>
+        <p:txBody>
+          <a:bodyPr wrap="square" rtlCol="0">
+            <a:spAutoFit/>
+          </a:bodyPr>
+          <a:lstStyle/>
+          <a:p>
+            <a:r>
+              <a:rPr lang="en-US" dirty="0"/>
+              <a:t>A</a:t>
+            </a:r>
+          </a:p>
+          <a:p>
+            <a:r>
+              <a:rPr lang="en-US" dirty="0"/>
+              <a:t>B</a:t>
+            </a:r>
+          </a:p>
+          <a:p>
+            <a:r>
+              <a:rPr lang="en-US" dirty="0"/>
+              <a:t>C</a:t>
+            </a:r>
+          </a:p>
+          <a:p>
+            <a:r>
+              <a:rPr lang="en-US" dirty="0"/>
+              <a:t>D</a:t>
+            </a:r>
+          </a:p>
+          <a:p>
+            <a:r>
+              <a:rPr lang="en-US" dirty="0"/>
+              <a:t>E</a:t>
+            </a:r>
+          </a:p>
           <a:p>
             <a:endParaRPr lang="en-US" dirty="0"/>
           </a:p>
         </p:txBody>
       </p:sp>
+      <p:cxnSp>
+        <p:nvCxnSpPr>
+          <p:cNvPr id="19" name="Straight Connector 18">
+            <a:extLst>
+              <a:ext uri="{FF2B5EF4-FFF2-40B4-BE49-F238E27FC236}">
+                <a16:creationId xmlns:a16="http://schemas.microsoft.com/office/drawing/2014/main" id="{7618BDE8-9064-124C-8F81-8D594288B694}"/>
+              </a:ext>
+            </a:extLst>
+          </p:cNvPr>
+          <p:cNvCxnSpPr>
+            <a:cxnSpLocks/>
+          </p:cNvCxnSpPr>
+          <p:nvPr/>
+        </p:nvCxnSpPr>
+        <p:spPr>
+          <a:xfrm>
+            <a:off x="2810935" y="1014400"/>
+            <a:ext cx="0" cy="5689600"/>
+          </a:xfrm>
+          <a:prstGeom prst="line">
+            <a:avLst/>
+          </a:prstGeom>
+          <a:ln w="50800">
+            <a:solidFill>
+              <a:schemeClr val="tx1"/>
+            </a:solidFill>
+            <a:tailEnd type="triangle"/>
+          </a:ln>
+        </p:spPr>
+        <p:style>
+          <a:lnRef idx="1">
+            <a:schemeClr val="accent1"/>
+          </a:lnRef>
+          <a:fillRef idx="0">
+            <a:schemeClr val="accent1"/>
+          </a:fillRef>
+          <a:effectRef idx="0">
+            <a:schemeClr val="accent1"/>
+          </a:effectRef>
+          <a:fontRef idx="minor">
+            <a:schemeClr val="tx1"/>
+          </a:fontRef>
+        </p:style>
+      </p:cxnSp>
+      <p:cxnSp>
+        <p:nvCxnSpPr>
+          <p:cNvPr id="25" name="Straight Connector 24">
+            <a:extLst>
+              <a:ext uri="{FF2B5EF4-FFF2-40B4-BE49-F238E27FC236}">
+                <a16:creationId xmlns:a16="http://schemas.microsoft.com/office/drawing/2014/main" id="{B1A17B0A-575A-BE46-AE64-D83DB58A37A6}"/>
+              </a:ext>
+            </a:extLst>
+          </p:cNvPr>
+          <p:cNvCxnSpPr/>
+          <p:nvPr/>
+        </p:nvCxnSpPr>
+        <p:spPr>
+          <a:xfrm>
+            <a:off x="2582335" y="1014400"/>
+            <a:ext cx="457200" cy="0"/>
+          </a:xfrm>
+          <a:prstGeom prst="line">
+            <a:avLst/>
+          </a:prstGeom>
+          <a:ln w="50800">
+            <a:solidFill>
+              <a:schemeClr val="tx1"/>
+            </a:solidFill>
+          </a:ln>
+        </p:spPr>
+        <p:style>
+          <a:lnRef idx="1">
+            <a:schemeClr val="accent1"/>
+          </a:lnRef>
+          <a:fillRef idx="0">
+            <a:schemeClr val="accent1"/>
+          </a:fillRef>
+          <a:effectRef idx="0">
+            <a:schemeClr val="accent1"/>
+          </a:effectRef>
+          <a:fontRef idx="minor">
+            <a:schemeClr val="tx1"/>
+          </a:fontRef>
+        </p:style>
+      </p:cxnSp>
+      <p:cxnSp>
+        <p:nvCxnSpPr>
+          <p:cNvPr id="26" name="Straight Connector 25">
+            <a:extLst>
+              <a:ext uri="{FF2B5EF4-FFF2-40B4-BE49-F238E27FC236}">
+                <a16:creationId xmlns:a16="http://schemas.microsoft.com/office/drawing/2014/main" id="{8CAB5BC8-81A4-B047-90C6-FB4766637007}"/>
+              </a:ext>
+            </a:extLst>
+          </p:cNvPr>
+          <p:cNvCxnSpPr>
+            <a:cxnSpLocks/>
+          </p:cNvCxnSpPr>
+          <p:nvPr/>
+        </p:nvCxnSpPr>
+        <p:spPr>
+          <a:xfrm>
+            <a:off x="2582335" y="1420800"/>
+            <a:ext cx="457200" cy="0"/>
+          </a:xfrm>
+          <a:prstGeom prst="line">
+            <a:avLst/>
+          </a:prstGeom>
+          <a:ln w="50800">
+            <a:solidFill>
+              <a:schemeClr val="tx1"/>
+            </a:solidFill>
+          </a:ln>
+        </p:spPr>
+        <p:style>
+          <a:lnRef idx="1">
+            <a:schemeClr val="accent1"/>
+          </a:lnRef>
+          <a:fillRef idx="0">
+            <a:schemeClr val="accent1"/>
+          </a:fillRef>
+          <a:effectRef idx="0">
+            <a:schemeClr val="accent1"/>
+          </a:effectRef>
+          <a:fontRef idx="minor">
+            <a:schemeClr val="tx1"/>
+          </a:fontRef>
+        </p:style>
+      </p:cxnSp>
+      <p:cxnSp>
+        <p:nvCxnSpPr>
+          <p:cNvPr id="27" name="Straight Connector 26">
+            <a:extLst>
+              <a:ext uri="{FF2B5EF4-FFF2-40B4-BE49-F238E27FC236}">
+                <a16:creationId xmlns:a16="http://schemas.microsoft.com/office/drawing/2014/main" id="{EFCB4AFF-2BA2-9F4F-9A89-55F1F31A4921}"/>
+              </a:ext>
+            </a:extLst>
+          </p:cNvPr>
+          <p:cNvCxnSpPr/>
+          <p:nvPr/>
+        </p:nvCxnSpPr>
+        <p:spPr>
+          <a:xfrm>
+            <a:off x="2582335" y="1844133"/>
+            <a:ext cx="457200" cy="0"/>
+          </a:xfrm>
+          <a:prstGeom prst="line">
+            <a:avLst/>
+          </a:prstGeom>
+          <a:ln w="50800">
+            <a:solidFill>
+              <a:schemeClr val="tx1"/>
+            </a:solidFill>
+          </a:ln>
+        </p:spPr>
+        <p:style>
+          <a:lnRef idx="1">
+            <a:schemeClr val="accent1"/>
+          </a:lnRef>
+          <a:fillRef idx="0">
+            <a:schemeClr val="accent1"/>
+          </a:fillRef>
+          <a:effectRef idx="0">
+            <a:schemeClr val="accent1"/>
+          </a:effectRef>
+          <a:fontRef idx="minor">
+            <a:schemeClr val="tx1"/>
+          </a:fontRef>
+        </p:style>
+      </p:cxnSp>
+      <p:cxnSp>
+        <p:nvCxnSpPr>
+          <p:cNvPr id="28" name="Straight Connector 27">
+            <a:extLst>
+              <a:ext uri="{FF2B5EF4-FFF2-40B4-BE49-F238E27FC236}">
+                <a16:creationId xmlns:a16="http://schemas.microsoft.com/office/drawing/2014/main" id="{6BB33262-F3AD-F14B-B0D4-149819CABF38}"/>
+              </a:ext>
+            </a:extLst>
+          </p:cNvPr>
+          <p:cNvCxnSpPr/>
+          <p:nvPr/>
+        </p:nvCxnSpPr>
+        <p:spPr>
+          <a:xfrm>
+            <a:off x="2582335" y="2250533"/>
+            <a:ext cx="457200" cy="0"/>
+          </a:xfrm>
+          <a:prstGeom prst="line">
+            <a:avLst/>
+          </a:prstGeom>
+          <a:ln w="50800">
+            <a:solidFill>
+              <a:schemeClr val="tx1"/>
+            </a:solidFill>
+          </a:ln>
+        </p:spPr>
+        <p:style>
+          <a:lnRef idx="1">
+            <a:schemeClr val="accent1"/>
+          </a:lnRef>
+          <a:fillRef idx="0">
+            <a:schemeClr val="accent1"/>
+          </a:fillRef>
+          <a:effectRef idx="0">
+            <a:schemeClr val="accent1"/>
+          </a:effectRef>
+          <a:fontRef idx="minor">
+            <a:schemeClr val="tx1"/>
+          </a:fontRef>
+        </p:style>
+      </p:cxnSp>
+      <p:cxnSp>
+        <p:nvCxnSpPr>
+          <p:cNvPr id="29" name="Straight Connector 28">
+            <a:extLst>
+              <a:ext uri="{FF2B5EF4-FFF2-40B4-BE49-F238E27FC236}">
+                <a16:creationId xmlns:a16="http://schemas.microsoft.com/office/drawing/2014/main" id="{D70A06FB-E89C-2A42-BB42-0F114C7F920C}"/>
+              </a:ext>
+            </a:extLst>
+          </p:cNvPr>
+          <p:cNvCxnSpPr/>
+          <p:nvPr/>
+        </p:nvCxnSpPr>
+        <p:spPr>
+          <a:xfrm>
+            <a:off x="2582335" y="2673866"/>
+            <a:ext cx="457200" cy="0"/>
+          </a:xfrm>
+          <a:prstGeom prst="line">
+            <a:avLst/>
+          </a:prstGeom>
+          <a:ln w="50800">
+            <a:solidFill>
+              <a:schemeClr val="tx1"/>
+            </a:solidFill>
+          </a:ln>
+        </p:spPr>
+        <p:style>
+          <a:lnRef idx="1">
+            <a:schemeClr val="accent1"/>
+          </a:lnRef>
+          <a:fillRef idx="0">
+            <a:schemeClr val="accent1"/>
+          </a:fillRef>
+          <a:effectRef idx="0">
+            <a:schemeClr val="accent1"/>
+          </a:effectRef>
+          <a:fontRef idx="minor">
+            <a:schemeClr val="tx1"/>
+          </a:fontRef>
+        </p:style>
+      </p:cxnSp>
+      <p:cxnSp>
+        <p:nvCxnSpPr>
+          <p:cNvPr id="30" name="Straight Connector 29">
+            <a:extLst>
+              <a:ext uri="{FF2B5EF4-FFF2-40B4-BE49-F238E27FC236}">
+                <a16:creationId xmlns:a16="http://schemas.microsoft.com/office/drawing/2014/main" id="{7FDE9DB7-49E5-3245-B093-0E9EA6E6DBC9}"/>
+              </a:ext>
+            </a:extLst>
+          </p:cNvPr>
+          <p:cNvCxnSpPr/>
+          <p:nvPr/>
+        </p:nvCxnSpPr>
+        <p:spPr>
+          <a:xfrm>
+            <a:off x="2582335" y="3063334"/>
+            <a:ext cx="457200" cy="0"/>
+          </a:xfrm>
+          <a:prstGeom prst="line">
+            <a:avLst/>
+          </a:prstGeom>
+          <a:ln w="50800">
+            <a:solidFill>
+              <a:schemeClr val="tx1"/>
+            </a:solidFill>
+          </a:ln>
+        </p:spPr>
+        <p:style>
+          <a:lnRef idx="1">
+            <a:schemeClr val="accent1"/>
+          </a:lnRef>
+          <a:fillRef idx="0">
+            <a:schemeClr val="accent1"/>
+          </a:fillRef>
+          <a:effectRef idx="0">
+            <a:schemeClr val="accent1"/>
+          </a:effectRef>
+          <a:fontRef idx="minor">
+            <a:schemeClr val="tx1"/>
+          </a:fontRef>
+        </p:style>
+      </p:cxnSp>
+      <p:cxnSp>
+        <p:nvCxnSpPr>
+          <p:cNvPr id="31" name="Straight Connector 30">
+            <a:extLst>
+              <a:ext uri="{FF2B5EF4-FFF2-40B4-BE49-F238E27FC236}">
+                <a16:creationId xmlns:a16="http://schemas.microsoft.com/office/drawing/2014/main" id="{FA690570-DD8B-E546-AF97-770D432E3A3E}"/>
+              </a:ext>
+            </a:extLst>
+          </p:cNvPr>
+          <p:cNvCxnSpPr/>
+          <p:nvPr/>
+        </p:nvCxnSpPr>
+        <p:spPr>
+          <a:xfrm>
+            <a:off x="2582335" y="3486667"/>
+            <a:ext cx="457200" cy="0"/>
+          </a:xfrm>
+          <a:prstGeom prst="line">
+            <a:avLst/>
+          </a:prstGeom>
+          <a:ln w="50800">
+            <a:solidFill>
+              <a:schemeClr val="tx1"/>
+            </a:solidFill>
+          </a:ln>
+        </p:spPr>
+        <p:style>
+          <a:lnRef idx="1">
+            <a:schemeClr val="accent1"/>
+          </a:lnRef>
+          <a:fillRef idx="0">
+            <a:schemeClr val="accent1"/>
+          </a:fillRef>
+          <a:effectRef idx="0">
+            <a:schemeClr val="accent1"/>
+          </a:effectRef>
+          <a:fontRef idx="minor">
+            <a:schemeClr val="tx1"/>
+          </a:fontRef>
+        </p:style>
+      </p:cxnSp>
+      <p:cxnSp>
+        <p:nvCxnSpPr>
+          <p:cNvPr id="32" name="Straight Connector 31">
+            <a:extLst>
+              <a:ext uri="{FF2B5EF4-FFF2-40B4-BE49-F238E27FC236}">
+                <a16:creationId xmlns:a16="http://schemas.microsoft.com/office/drawing/2014/main" id="{ABA49545-D026-0147-8578-63B95B571523}"/>
+              </a:ext>
+            </a:extLst>
+          </p:cNvPr>
+          <p:cNvCxnSpPr/>
+          <p:nvPr/>
+        </p:nvCxnSpPr>
+        <p:spPr>
+          <a:xfrm>
+            <a:off x="2582335" y="3893067"/>
+            <a:ext cx="457200" cy="0"/>
+          </a:xfrm>
+          <a:prstGeom prst="line">
+            <a:avLst/>
+          </a:prstGeom>
+          <a:ln w="50800">
+            <a:solidFill>
+              <a:schemeClr val="tx1"/>
+            </a:solidFill>
+          </a:ln>
+        </p:spPr>
+        <p:style>
+          <a:lnRef idx="1">
+            <a:schemeClr val="accent1"/>
+          </a:lnRef>
+          <a:fillRef idx="0">
+            <a:schemeClr val="accent1"/>
+          </a:fillRef>
+          <a:effectRef idx="0">
+            <a:schemeClr val="accent1"/>
+          </a:effectRef>
+          <a:fontRef idx="minor">
+            <a:schemeClr val="tx1"/>
+          </a:fontRef>
+        </p:style>
+      </p:cxnSp>
+      <p:cxnSp>
+        <p:nvCxnSpPr>
+          <p:cNvPr id="33" name="Straight Connector 32">
+            <a:extLst>
+              <a:ext uri="{FF2B5EF4-FFF2-40B4-BE49-F238E27FC236}">
+                <a16:creationId xmlns:a16="http://schemas.microsoft.com/office/drawing/2014/main" id="{D67240BC-7C7F-2547-BD07-6F3C1E03D1A3}"/>
+              </a:ext>
+            </a:extLst>
+          </p:cNvPr>
+          <p:cNvCxnSpPr/>
+          <p:nvPr/>
+        </p:nvCxnSpPr>
+        <p:spPr>
+          <a:xfrm>
+            <a:off x="2582335" y="4316400"/>
+            <a:ext cx="457200" cy="0"/>
+          </a:xfrm>
+          <a:prstGeom prst="line">
+            <a:avLst/>
+          </a:prstGeom>
+          <a:ln w="50800">
+            <a:solidFill>
+              <a:schemeClr val="tx1"/>
+            </a:solidFill>
+          </a:ln>
+        </p:spPr>
+        <p:style>
+          <a:lnRef idx="1">
+            <a:schemeClr val="accent1"/>
+          </a:lnRef>
+          <a:fillRef idx="0">
+            <a:schemeClr val="accent1"/>
+          </a:fillRef>
+          <a:effectRef idx="0">
+            <a:schemeClr val="accent1"/>
+          </a:effectRef>
+          <a:fontRef idx="minor">
+            <a:schemeClr val="tx1"/>
+          </a:fontRef>
+        </p:style>
+      </p:cxnSp>
+      <p:cxnSp>
+        <p:nvCxnSpPr>
+          <p:cNvPr id="34" name="Straight Connector 33">
+            <a:extLst>
+              <a:ext uri="{FF2B5EF4-FFF2-40B4-BE49-F238E27FC236}">
+                <a16:creationId xmlns:a16="http://schemas.microsoft.com/office/drawing/2014/main" id="{862B1A0F-1330-CD4C-898A-31A7B036169D}"/>
+              </a:ext>
+            </a:extLst>
+          </p:cNvPr>
+          <p:cNvCxnSpPr/>
+          <p:nvPr/>
+        </p:nvCxnSpPr>
+        <p:spPr>
+          <a:xfrm>
+            <a:off x="2582335" y="4722800"/>
+            <a:ext cx="457200" cy="0"/>
+          </a:xfrm>
+          <a:prstGeom prst="line">
+            <a:avLst/>
+          </a:prstGeom>
+          <a:ln w="50800">
+            <a:solidFill>
+              <a:schemeClr val="tx1"/>
+            </a:solidFill>
+          </a:ln>
+        </p:spPr>
+        <p:style>
+          <a:lnRef idx="1">
+            <a:schemeClr val="accent1"/>
+          </a:lnRef>
+          <a:fillRef idx="0">
+            <a:schemeClr val="accent1"/>
+          </a:fillRef>
+          <a:effectRef idx="0">
+            <a:schemeClr val="accent1"/>
+          </a:effectRef>
+          <a:fontRef idx="minor">
+            <a:schemeClr val="tx1"/>
+          </a:fontRef>
+        </p:style>
+      </p:cxnSp>
+      <p:cxnSp>
+        <p:nvCxnSpPr>
+          <p:cNvPr id="35" name="Straight Connector 34">
+            <a:extLst>
+              <a:ext uri="{FF2B5EF4-FFF2-40B4-BE49-F238E27FC236}">
+                <a16:creationId xmlns:a16="http://schemas.microsoft.com/office/drawing/2014/main" id="{34DA22E9-68FE-9F40-9B63-17F810CA5A96}"/>
+              </a:ext>
+            </a:extLst>
+          </p:cNvPr>
+          <p:cNvCxnSpPr/>
+          <p:nvPr/>
+        </p:nvCxnSpPr>
+        <p:spPr>
+          <a:xfrm>
+            <a:off x="2582335" y="5095334"/>
+            <a:ext cx="457200" cy="0"/>
+          </a:xfrm>
+          <a:prstGeom prst="line">
+            <a:avLst/>
+          </a:prstGeom>
+          <a:ln w="50800">
+            <a:solidFill>
+              <a:schemeClr val="tx1"/>
+            </a:solidFill>
+          </a:ln>
+        </p:spPr>
+        <p:style>
+          <a:lnRef idx="1">
+            <a:schemeClr val="accent1"/>
+          </a:lnRef>
+          <a:fillRef idx="0">
+            <a:schemeClr val="accent1"/>
+          </a:fillRef>
+          <a:effectRef idx="0">
+            <a:schemeClr val="accent1"/>
+          </a:effectRef>
+          <a:fontRef idx="minor">
+            <a:schemeClr val="tx1"/>
+          </a:fontRef>
+        </p:style>
+      </p:cxnSp>
+      <p:cxnSp>
+        <p:nvCxnSpPr>
+          <p:cNvPr id="36" name="Straight Connector 35">
+            <a:extLst>
+              <a:ext uri="{FF2B5EF4-FFF2-40B4-BE49-F238E27FC236}">
+                <a16:creationId xmlns:a16="http://schemas.microsoft.com/office/drawing/2014/main" id="{914BB388-C059-FD43-83F8-987AC8A53D2A}"/>
+              </a:ext>
+            </a:extLst>
+          </p:cNvPr>
+          <p:cNvCxnSpPr/>
+          <p:nvPr/>
+        </p:nvCxnSpPr>
+        <p:spPr>
+          <a:xfrm>
+            <a:off x="2582335" y="5501734"/>
+            <a:ext cx="457200" cy="0"/>
+          </a:xfrm>
+          <a:prstGeom prst="line">
+            <a:avLst/>
+          </a:prstGeom>
+          <a:ln w="50800">
+            <a:solidFill>
+              <a:schemeClr val="tx1"/>
+            </a:solidFill>
+          </a:ln>
+        </p:spPr>
+        <p:style>
+          <a:lnRef idx="1">
+            <a:schemeClr val="accent1"/>
+          </a:lnRef>
+          <a:fillRef idx="0">
+            <a:schemeClr val="accent1"/>
+          </a:fillRef>
+          <a:effectRef idx="0">
+            <a:schemeClr val="accent1"/>
+          </a:effectRef>
+          <a:fontRef idx="minor">
+            <a:schemeClr val="tx1"/>
+          </a:fontRef>
+        </p:style>
+      </p:cxnSp>
+      <p:cxnSp>
+        <p:nvCxnSpPr>
+          <p:cNvPr id="37" name="Straight Connector 36">
+            <a:extLst>
+              <a:ext uri="{FF2B5EF4-FFF2-40B4-BE49-F238E27FC236}">
+                <a16:creationId xmlns:a16="http://schemas.microsoft.com/office/drawing/2014/main" id="{FD36601F-2CC6-604D-B2D5-E0E574D04B24}"/>
+              </a:ext>
+            </a:extLst>
+          </p:cNvPr>
+          <p:cNvCxnSpPr/>
+          <p:nvPr/>
+        </p:nvCxnSpPr>
+        <p:spPr>
+          <a:xfrm>
+            <a:off x="2582335" y="5908134"/>
+            <a:ext cx="457200" cy="0"/>
+          </a:xfrm>
+          <a:prstGeom prst="line">
+            <a:avLst/>
+          </a:prstGeom>
+          <a:ln w="50800">
+            <a:solidFill>
+              <a:schemeClr val="tx1"/>
+            </a:solidFill>
+          </a:ln>
+        </p:spPr>
+        <p:style>
+          <a:lnRef idx="1">
+            <a:schemeClr val="accent1"/>
+          </a:lnRef>
+          <a:fillRef idx="0">
+            <a:schemeClr val="accent1"/>
+          </a:fillRef>
+          <a:effectRef idx="0">
+            <a:schemeClr val="accent1"/>
+          </a:effectRef>
+          <a:fontRef idx="minor">
+            <a:schemeClr val="tx1"/>
+          </a:fontRef>
+        </p:style>
+      </p:cxnSp>
+      <p:cxnSp>
+        <p:nvCxnSpPr>
+          <p:cNvPr id="38" name="Straight Connector 37">
+            <a:extLst>
+              <a:ext uri="{FF2B5EF4-FFF2-40B4-BE49-F238E27FC236}">
+                <a16:creationId xmlns:a16="http://schemas.microsoft.com/office/drawing/2014/main" id="{31C23233-B447-DA48-A138-0B2BCF863829}"/>
+              </a:ext>
+            </a:extLst>
+          </p:cNvPr>
+          <p:cNvCxnSpPr/>
+          <p:nvPr/>
+        </p:nvCxnSpPr>
+        <p:spPr>
+          <a:xfrm>
+            <a:off x="2582335" y="6331467"/>
+            <a:ext cx="457200" cy="0"/>
+          </a:xfrm>
+          <a:prstGeom prst="line">
+            <a:avLst/>
+          </a:prstGeom>
+          <a:ln w="50800">
+            <a:solidFill>
+              <a:schemeClr val="tx1"/>
+            </a:solidFill>
+          </a:ln>
+        </p:spPr>
+        <p:style>
+          <a:lnRef idx="1">
+            <a:schemeClr val="accent1"/>
+          </a:lnRef>
+          <a:fillRef idx="0">
+            <a:schemeClr val="accent1"/>
+          </a:fillRef>
+          <a:effectRef idx="0">
+            <a:schemeClr val="accent1"/>
+          </a:effectRef>
+          <a:fontRef idx="minor">
+            <a:schemeClr val="tx1"/>
+          </a:fontRef>
+        </p:style>
+      </p:cxnSp>
+      <p:sp>
+        <p:nvSpPr>
+          <p:cNvPr id="40" name="TextBox 39">
+            <a:extLst>
+              <a:ext uri="{FF2B5EF4-FFF2-40B4-BE49-F238E27FC236}">
+                <a16:creationId xmlns:a16="http://schemas.microsoft.com/office/drawing/2014/main" id="{AF402967-03BB-914B-9A5F-57208E0B76AB}"/>
+              </a:ext>
+            </a:extLst>
+          </p:cNvPr>
+          <p:cNvSpPr txBox="1"/>
+          <p:nvPr/>
+        </p:nvSpPr>
+        <p:spPr>
+          <a:xfrm>
+            <a:off x="3183469" y="829734"/>
+            <a:ext cx="1117600" cy="369332"/>
+          </a:xfrm>
+          <a:prstGeom prst="rect">
+            <a:avLst/>
+          </a:prstGeom>
+          <a:noFill/>
+        </p:spPr>
+        <p:txBody>
+          <a:bodyPr wrap="square" rtlCol="0">
+            <a:spAutoFit/>
+          </a:bodyPr>
+          <a:lstStyle/>
+          <a:p>
+            <a:r>
+              <a:rPr lang="en-US" dirty="0"/>
+              <a:t>A0</a:t>
+            </a:r>
+          </a:p>
+        </p:txBody>
+      </p:sp>
+      <p:sp>
+        <p:nvSpPr>
+          <p:cNvPr id="41" name="TextBox 40">
+            <a:extLst>
+              <a:ext uri="{FF2B5EF4-FFF2-40B4-BE49-F238E27FC236}">
+                <a16:creationId xmlns:a16="http://schemas.microsoft.com/office/drawing/2014/main" id="{2F351E87-E745-EE47-8BFE-B5F3B5AA7A93}"/>
+              </a:ext>
+            </a:extLst>
+          </p:cNvPr>
+          <p:cNvSpPr txBox="1"/>
+          <p:nvPr/>
+        </p:nvSpPr>
+        <p:spPr>
+          <a:xfrm>
+            <a:off x="3183469" y="1253067"/>
+            <a:ext cx="1117600" cy="369332"/>
+          </a:xfrm>
+          <a:prstGeom prst="rect">
+            <a:avLst/>
+          </a:prstGeom>
+          <a:noFill/>
+        </p:spPr>
+        <p:txBody>
+          <a:bodyPr wrap="square" rtlCol="0">
+            <a:spAutoFit/>
+          </a:bodyPr>
+          <a:lstStyle/>
+          <a:p>
+            <a:r>
+              <a:rPr lang="en-US" dirty="0"/>
+              <a:t>B0</a:t>
+            </a:r>
+          </a:p>
+        </p:txBody>
+      </p:sp>
+      <p:sp>
+        <p:nvSpPr>
+          <p:cNvPr id="42" name="TextBox 41">
+            <a:extLst>
+              <a:ext uri="{FF2B5EF4-FFF2-40B4-BE49-F238E27FC236}">
+                <a16:creationId xmlns:a16="http://schemas.microsoft.com/office/drawing/2014/main" id="{BDFABF89-E7FB-6645-B294-48C09FA0BBEF}"/>
+              </a:ext>
+            </a:extLst>
+          </p:cNvPr>
+          <p:cNvSpPr txBox="1"/>
+          <p:nvPr/>
+        </p:nvSpPr>
+        <p:spPr>
+          <a:xfrm>
+            <a:off x="3183469" y="1676400"/>
+            <a:ext cx="1117600" cy="369332"/>
+          </a:xfrm>
+          <a:prstGeom prst="rect">
+            <a:avLst/>
+          </a:prstGeom>
+          <a:noFill/>
+        </p:spPr>
+        <p:txBody>
+          <a:bodyPr wrap="square" rtlCol="0">
+            <a:spAutoFit/>
+          </a:bodyPr>
+          <a:lstStyle/>
+          <a:p>
+            <a:r>
+              <a:rPr lang="en-US" dirty="0"/>
+              <a:t>C0</a:t>
+            </a:r>
+          </a:p>
+        </p:txBody>
+      </p:sp>
+      <p:sp>
+        <p:nvSpPr>
+          <p:cNvPr id="43" name="TextBox 42">
+            <a:extLst>
+              <a:ext uri="{FF2B5EF4-FFF2-40B4-BE49-F238E27FC236}">
+                <a16:creationId xmlns:a16="http://schemas.microsoft.com/office/drawing/2014/main" id="{7C5BB0B3-CB8F-5443-916F-CCA69B6B8807}"/>
+              </a:ext>
+            </a:extLst>
+          </p:cNvPr>
+          <p:cNvSpPr txBox="1"/>
+          <p:nvPr/>
+        </p:nvSpPr>
+        <p:spPr>
+          <a:xfrm>
+            <a:off x="3183469" y="2099733"/>
+            <a:ext cx="1117600" cy="369332"/>
+          </a:xfrm>
+          <a:prstGeom prst="rect">
+            <a:avLst/>
+          </a:prstGeom>
+          <a:noFill/>
+        </p:spPr>
+        <p:txBody>
+          <a:bodyPr wrap="square" rtlCol="0">
+            <a:spAutoFit/>
+          </a:bodyPr>
+          <a:lstStyle/>
+          <a:p>
+            <a:r>
+              <a:rPr lang="en-US" dirty="0"/>
+              <a:t>D0</a:t>
+            </a:r>
+          </a:p>
+        </p:txBody>
+      </p:sp>
+      <p:sp>
+        <p:nvSpPr>
+          <p:cNvPr id="44" name="TextBox 43">
+            <a:extLst>
+              <a:ext uri="{FF2B5EF4-FFF2-40B4-BE49-F238E27FC236}">
+                <a16:creationId xmlns:a16="http://schemas.microsoft.com/office/drawing/2014/main" id="{5976F391-F5F8-9A41-AEF8-753354A81832}"/>
+              </a:ext>
+            </a:extLst>
+          </p:cNvPr>
+          <p:cNvSpPr txBox="1"/>
+          <p:nvPr/>
+        </p:nvSpPr>
+        <p:spPr>
+          <a:xfrm>
+            <a:off x="3183469" y="2523066"/>
+            <a:ext cx="1117600" cy="369332"/>
+          </a:xfrm>
+          <a:prstGeom prst="rect">
+            <a:avLst/>
+          </a:prstGeom>
+          <a:noFill/>
+        </p:spPr>
+        <p:txBody>
+          <a:bodyPr wrap="square" rtlCol="0">
+            <a:spAutoFit/>
+          </a:bodyPr>
+          <a:lstStyle/>
+          <a:p>
+            <a:r>
+              <a:rPr lang="en-US" dirty="0"/>
+              <a:t>E0</a:t>
+            </a:r>
+          </a:p>
+        </p:txBody>
+      </p:sp>
+      <p:sp>
+        <p:nvSpPr>
+          <p:cNvPr id="45" name="TextBox 44">
+            <a:extLst>
+              <a:ext uri="{FF2B5EF4-FFF2-40B4-BE49-F238E27FC236}">
+                <a16:creationId xmlns:a16="http://schemas.microsoft.com/office/drawing/2014/main" id="{6879BD84-02E4-E445-81C4-CA5C803994B1}"/>
+              </a:ext>
+            </a:extLst>
+          </p:cNvPr>
+          <p:cNvSpPr txBox="1"/>
+          <p:nvPr/>
+        </p:nvSpPr>
+        <p:spPr>
+          <a:xfrm>
+            <a:off x="3776136" y="2909331"/>
+            <a:ext cx="1117600" cy="369332"/>
+          </a:xfrm>
+          <a:prstGeom prst="rect">
+            <a:avLst/>
+          </a:prstGeom>
+          <a:noFill/>
+        </p:spPr>
+        <p:txBody>
+          <a:bodyPr wrap="square" rtlCol="0">
+            <a:spAutoFit/>
+          </a:bodyPr>
+          <a:lstStyle/>
+          <a:p>
+            <a:r>
+              <a:rPr lang="en-US" dirty="0"/>
+              <a:t>A1</a:t>
+            </a:r>
+          </a:p>
+        </p:txBody>
+      </p:sp>
+      <p:sp>
+        <p:nvSpPr>
+          <p:cNvPr id="46" name="TextBox 45">
+            <a:extLst>
+              <a:ext uri="{FF2B5EF4-FFF2-40B4-BE49-F238E27FC236}">
+                <a16:creationId xmlns:a16="http://schemas.microsoft.com/office/drawing/2014/main" id="{4D14CDD7-546E-B349-A57C-754B11F7CF2F}"/>
+              </a:ext>
+            </a:extLst>
+          </p:cNvPr>
+          <p:cNvSpPr txBox="1"/>
+          <p:nvPr/>
+        </p:nvSpPr>
+        <p:spPr>
+          <a:xfrm>
+            <a:off x="3776136" y="3332664"/>
+            <a:ext cx="1117600" cy="369332"/>
+          </a:xfrm>
+          <a:prstGeom prst="rect">
+            <a:avLst/>
+          </a:prstGeom>
+          <a:noFill/>
+        </p:spPr>
+        <p:txBody>
+          <a:bodyPr wrap="square" rtlCol="0">
+            <a:spAutoFit/>
+          </a:bodyPr>
+          <a:lstStyle/>
+          <a:p>
+            <a:r>
+              <a:rPr lang="en-US" dirty="0"/>
+              <a:t>B1</a:t>
+            </a:r>
+          </a:p>
+        </p:txBody>
+      </p:sp>
+      <p:sp>
+        <p:nvSpPr>
+          <p:cNvPr id="47" name="TextBox 46">
+            <a:extLst>
+              <a:ext uri="{FF2B5EF4-FFF2-40B4-BE49-F238E27FC236}">
+                <a16:creationId xmlns:a16="http://schemas.microsoft.com/office/drawing/2014/main" id="{9CF98542-9B4F-7045-9BD2-81EF25BBF7AC}"/>
+              </a:ext>
+            </a:extLst>
+          </p:cNvPr>
+          <p:cNvSpPr txBox="1"/>
+          <p:nvPr/>
+        </p:nvSpPr>
+        <p:spPr>
+          <a:xfrm>
+            <a:off x="3776136" y="3683125"/>
+            <a:ext cx="1117600" cy="369332"/>
+          </a:xfrm>
+          <a:prstGeom prst="rect">
+            <a:avLst/>
+          </a:prstGeom>
+          <a:noFill/>
+        </p:spPr>
+        <p:txBody>
+          <a:bodyPr wrap="square" rtlCol="0">
+            <a:spAutoFit/>
+          </a:bodyPr>
+          <a:lstStyle/>
+          <a:p>
+            <a:r>
+              <a:rPr lang="en-US" dirty="0"/>
+              <a:t>C1</a:t>
+            </a:r>
+          </a:p>
+        </p:txBody>
+      </p:sp>
+      <p:sp>
+        <p:nvSpPr>
+          <p:cNvPr id="48" name="TextBox 47">
+            <a:extLst>
+              <a:ext uri="{FF2B5EF4-FFF2-40B4-BE49-F238E27FC236}">
+                <a16:creationId xmlns:a16="http://schemas.microsoft.com/office/drawing/2014/main" id="{18483E39-B23D-5C4B-8447-A46A386F9362}"/>
+              </a:ext>
+            </a:extLst>
+          </p:cNvPr>
+          <p:cNvSpPr txBox="1"/>
+          <p:nvPr/>
+        </p:nvSpPr>
+        <p:spPr>
+          <a:xfrm>
+            <a:off x="3776136" y="4106458"/>
+            <a:ext cx="1117600" cy="369332"/>
+          </a:xfrm>
+          <a:prstGeom prst="rect">
+            <a:avLst/>
+          </a:prstGeom>
+          <a:noFill/>
+        </p:spPr>
+        <p:txBody>
+          <a:bodyPr wrap="square" rtlCol="0">
+            <a:spAutoFit/>
+          </a:bodyPr>
+          <a:lstStyle/>
+          <a:p>
+            <a:r>
+              <a:rPr lang="en-US" dirty="0"/>
+              <a:t>D1</a:t>
+            </a:r>
+          </a:p>
+        </p:txBody>
+      </p:sp>
+      <p:sp>
+        <p:nvSpPr>
+          <p:cNvPr id="49" name="TextBox 48">
+            <a:extLst>
+              <a:ext uri="{FF2B5EF4-FFF2-40B4-BE49-F238E27FC236}">
+                <a16:creationId xmlns:a16="http://schemas.microsoft.com/office/drawing/2014/main" id="{701F83DB-CCD7-8544-AD9B-3CF1C63C2EE7}"/>
+              </a:ext>
+            </a:extLst>
+          </p:cNvPr>
+          <p:cNvSpPr txBox="1"/>
+          <p:nvPr/>
+        </p:nvSpPr>
+        <p:spPr>
+          <a:xfrm>
+            <a:off x="3776136" y="4529791"/>
+            <a:ext cx="1117600" cy="369332"/>
+          </a:xfrm>
+          <a:prstGeom prst="rect">
+            <a:avLst/>
+          </a:prstGeom>
+          <a:noFill/>
+        </p:spPr>
+        <p:txBody>
+          <a:bodyPr wrap="square" rtlCol="0">
+            <a:spAutoFit/>
+          </a:bodyPr>
+          <a:lstStyle/>
+          <a:p>
+            <a:r>
+              <a:rPr lang="en-US" dirty="0"/>
+              <a:t>E1</a:t>
+            </a:r>
+          </a:p>
+        </p:txBody>
+      </p:sp>
+      <p:sp>
+        <p:nvSpPr>
+          <p:cNvPr id="50" name="TextBox 49">
+            <a:extLst>
+              <a:ext uri="{FF2B5EF4-FFF2-40B4-BE49-F238E27FC236}">
+                <a16:creationId xmlns:a16="http://schemas.microsoft.com/office/drawing/2014/main" id="{A3D0DD5B-30EC-0E4E-8153-FF0AB06DF607}"/>
+              </a:ext>
+            </a:extLst>
+          </p:cNvPr>
+          <p:cNvSpPr txBox="1"/>
+          <p:nvPr/>
+        </p:nvSpPr>
+        <p:spPr>
+          <a:xfrm>
+            <a:off x="4538134" y="4898615"/>
+            <a:ext cx="508003" cy="369332"/>
+          </a:xfrm>
+          <a:prstGeom prst="rect">
+            <a:avLst/>
+          </a:prstGeom>
+          <a:noFill/>
+        </p:spPr>
+        <p:txBody>
+          <a:bodyPr wrap="square" rtlCol="0">
+            <a:spAutoFit/>
+          </a:bodyPr>
+          <a:lstStyle/>
+          <a:p>
+            <a:r>
+              <a:rPr lang="en-US" dirty="0"/>
+              <a:t>A2</a:t>
+            </a:r>
+          </a:p>
+        </p:txBody>
+      </p:sp>
+      <p:sp>
+        <p:nvSpPr>
+          <p:cNvPr id="51" name="TextBox 50">
+            <a:extLst>
+              <a:ext uri="{FF2B5EF4-FFF2-40B4-BE49-F238E27FC236}">
+                <a16:creationId xmlns:a16="http://schemas.microsoft.com/office/drawing/2014/main" id="{782BFDE0-87C0-E847-96FD-AF0DF2525B3D}"/>
+              </a:ext>
+            </a:extLst>
+          </p:cNvPr>
+          <p:cNvSpPr txBox="1"/>
+          <p:nvPr/>
+        </p:nvSpPr>
+        <p:spPr>
+          <a:xfrm>
+            <a:off x="4538134" y="5321948"/>
+            <a:ext cx="508003" cy="369332"/>
+          </a:xfrm>
+          <a:prstGeom prst="rect">
+            <a:avLst/>
+          </a:prstGeom>
+          <a:noFill/>
+        </p:spPr>
+        <p:txBody>
+          <a:bodyPr wrap="square" rtlCol="0">
+            <a:spAutoFit/>
+          </a:bodyPr>
+          <a:lstStyle/>
+          <a:p>
+            <a:r>
+              <a:rPr lang="en-US" dirty="0"/>
+              <a:t>B2</a:t>
+            </a:r>
+          </a:p>
+        </p:txBody>
+      </p:sp>
+      <p:sp>
+        <p:nvSpPr>
+          <p:cNvPr id="52" name="TextBox 51">
+            <a:extLst>
+              <a:ext uri="{FF2B5EF4-FFF2-40B4-BE49-F238E27FC236}">
+                <a16:creationId xmlns:a16="http://schemas.microsoft.com/office/drawing/2014/main" id="{18E9B2AF-8D41-4D49-8944-1ADD4EB6F23B}"/>
+              </a:ext>
+            </a:extLst>
+          </p:cNvPr>
+          <p:cNvSpPr txBox="1"/>
+          <p:nvPr/>
+        </p:nvSpPr>
+        <p:spPr>
+          <a:xfrm>
+            <a:off x="4538134" y="5694480"/>
+            <a:ext cx="508003" cy="369332"/>
+          </a:xfrm>
+          <a:prstGeom prst="rect">
+            <a:avLst/>
+          </a:prstGeom>
+          <a:noFill/>
+        </p:spPr>
+        <p:txBody>
+          <a:bodyPr wrap="square" rtlCol="0">
+            <a:spAutoFit/>
+          </a:bodyPr>
+          <a:lstStyle/>
+          <a:p>
+            <a:r>
+              <a:rPr lang="en-US" dirty="0"/>
+              <a:t>C2</a:t>
+            </a:r>
+          </a:p>
+        </p:txBody>
+      </p:sp>
+      <p:sp>
+        <p:nvSpPr>
+          <p:cNvPr id="53" name="TextBox 52">
+            <a:extLst>
+              <a:ext uri="{FF2B5EF4-FFF2-40B4-BE49-F238E27FC236}">
+                <a16:creationId xmlns:a16="http://schemas.microsoft.com/office/drawing/2014/main" id="{7313C27B-FD97-8545-8D72-37F1307D0D9F}"/>
+              </a:ext>
+            </a:extLst>
+          </p:cNvPr>
+          <p:cNvSpPr txBox="1"/>
+          <p:nvPr/>
+        </p:nvSpPr>
+        <p:spPr>
+          <a:xfrm>
+            <a:off x="4538134" y="6122956"/>
+            <a:ext cx="787399" cy="369332"/>
+          </a:xfrm>
+          <a:prstGeom prst="rect">
+            <a:avLst/>
+          </a:prstGeom>
+          <a:noFill/>
+        </p:spPr>
+        <p:txBody>
+          <a:bodyPr wrap="square" rtlCol="0">
+            <a:spAutoFit/>
+          </a:bodyPr>
+          <a:lstStyle/>
+          <a:p>
+            <a:r>
+              <a:rPr lang="en-US" dirty="0"/>
+              <a:t>D2</a:t>
+            </a:r>
+          </a:p>
+        </p:txBody>
+      </p:sp>
+      <p:sp>
+        <p:nvSpPr>
+          <p:cNvPr id="70" name="TextBox 69">
+            <a:extLst>
+              <a:ext uri="{FF2B5EF4-FFF2-40B4-BE49-F238E27FC236}">
+                <a16:creationId xmlns:a16="http://schemas.microsoft.com/office/drawing/2014/main" id="{8EF64746-F0D5-A049-BE50-A78A679A0057}"/>
+              </a:ext>
+            </a:extLst>
+          </p:cNvPr>
+          <p:cNvSpPr txBox="1"/>
+          <p:nvPr/>
+        </p:nvSpPr>
+        <p:spPr>
+          <a:xfrm>
+            <a:off x="8686804" y="801934"/>
+            <a:ext cx="1117600" cy="369332"/>
+          </a:xfrm>
+          <a:prstGeom prst="rect">
+            <a:avLst/>
+          </a:prstGeom>
+          <a:noFill/>
+        </p:spPr>
+        <p:txBody>
+          <a:bodyPr wrap="square" rtlCol="0">
+            <a:spAutoFit/>
+          </a:bodyPr>
+          <a:lstStyle/>
+          <a:p>
+            <a:r>
+              <a:rPr lang="en-US" dirty="0"/>
+              <a:t>A0</a:t>
+            </a:r>
+          </a:p>
+        </p:txBody>
+      </p:sp>
+      <p:sp>
+        <p:nvSpPr>
+          <p:cNvPr id="71" name="TextBox 70">
+            <a:extLst>
+              <a:ext uri="{FF2B5EF4-FFF2-40B4-BE49-F238E27FC236}">
+                <a16:creationId xmlns:a16="http://schemas.microsoft.com/office/drawing/2014/main" id="{6CFF10F0-F458-274F-B019-E883602464D0}"/>
+              </a:ext>
+            </a:extLst>
+          </p:cNvPr>
+          <p:cNvSpPr txBox="1"/>
+          <p:nvPr/>
+        </p:nvSpPr>
+        <p:spPr>
+          <a:xfrm>
+            <a:off x="8686804" y="1225267"/>
+            <a:ext cx="1117600" cy="369332"/>
+          </a:xfrm>
+          <a:prstGeom prst="rect">
+            <a:avLst/>
+          </a:prstGeom>
+          <a:noFill/>
+        </p:spPr>
+        <p:txBody>
+          <a:bodyPr wrap="square" rtlCol="0">
+            <a:spAutoFit/>
+          </a:bodyPr>
+          <a:lstStyle/>
+          <a:p>
+            <a:r>
+              <a:rPr lang="en-US" dirty="0"/>
+              <a:t>B0</a:t>
+            </a:r>
+          </a:p>
+        </p:txBody>
+      </p:sp>
+      <p:sp>
+        <p:nvSpPr>
+          <p:cNvPr id="72" name="TextBox 71">
+            <a:extLst>
+              <a:ext uri="{FF2B5EF4-FFF2-40B4-BE49-F238E27FC236}">
+                <a16:creationId xmlns:a16="http://schemas.microsoft.com/office/drawing/2014/main" id="{519A46F4-D794-264D-AEE8-B1DFC301A644}"/>
+              </a:ext>
+            </a:extLst>
+          </p:cNvPr>
+          <p:cNvSpPr txBox="1"/>
+          <p:nvPr/>
+        </p:nvSpPr>
+        <p:spPr>
+          <a:xfrm>
+            <a:off x="8686804" y="1648600"/>
+            <a:ext cx="1117600" cy="369332"/>
+          </a:xfrm>
+          <a:prstGeom prst="rect">
+            <a:avLst/>
+          </a:prstGeom>
+          <a:noFill/>
+        </p:spPr>
+        <p:txBody>
+          <a:bodyPr wrap="square" rtlCol="0">
+            <a:spAutoFit/>
+          </a:bodyPr>
+          <a:lstStyle/>
+          <a:p>
+            <a:r>
+              <a:rPr lang="en-US" dirty="0"/>
+              <a:t>C0</a:t>
+            </a:r>
+          </a:p>
+        </p:txBody>
+      </p:sp>
+      <p:sp>
+        <p:nvSpPr>
+          <p:cNvPr id="73" name="TextBox 72">
+            <a:extLst>
+              <a:ext uri="{FF2B5EF4-FFF2-40B4-BE49-F238E27FC236}">
+                <a16:creationId xmlns:a16="http://schemas.microsoft.com/office/drawing/2014/main" id="{51F84C7E-3440-BF4A-BE2A-797A07386664}"/>
+              </a:ext>
+            </a:extLst>
+          </p:cNvPr>
+          <p:cNvSpPr txBox="1"/>
+          <p:nvPr/>
+        </p:nvSpPr>
+        <p:spPr>
+          <a:xfrm>
+            <a:off x="8686804" y="2071933"/>
+            <a:ext cx="1117600" cy="369332"/>
+          </a:xfrm>
+          <a:prstGeom prst="rect">
+            <a:avLst/>
+          </a:prstGeom>
+          <a:noFill/>
+        </p:spPr>
+        <p:txBody>
+          <a:bodyPr wrap="square" rtlCol="0">
+            <a:spAutoFit/>
+          </a:bodyPr>
+          <a:lstStyle/>
+          <a:p>
+            <a:r>
+              <a:rPr lang="en-US" dirty="0"/>
+              <a:t>D0</a:t>
+            </a:r>
+          </a:p>
+        </p:txBody>
+      </p:sp>
+      <p:sp>
+        <p:nvSpPr>
+          <p:cNvPr id="74" name="TextBox 73">
+            <a:extLst>
+              <a:ext uri="{FF2B5EF4-FFF2-40B4-BE49-F238E27FC236}">
+                <a16:creationId xmlns:a16="http://schemas.microsoft.com/office/drawing/2014/main" id="{8B5FF9EA-5B57-8442-A59F-47FB0D46A2DD}"/>
+              </a:ext>
+            </a:extLst>
+          </p:cNvPr>
+          <p:cNvSpPr txBox="1"/>
+          <p:nvPr/>
+        </p:nvSpPr>
+        <p:spPr>
+          <a:xfrm>
+            <a:off x="8686804" y="2495266"/>
+            <a:ext cx="1117600" cy="369332"/>
+          </a:xfrm>
+          <a:prstGeom prst="rect">
+            <a:avLst/>
+          </a:prstGeom>
+          <a:noFill/>
+        </p:spPr>
+        <p:txBody>
+          <a:bodyPr wrap="square" rtlCol="0">
+            <a:spAutoFit/>
+          </a:bodyPr>
+          <a:lstStyle/>
+          <a:p>
+            <a:r>
+              <a:rPr lang="en-US" dirty="0"/>
+              <a:t>E0</a:t>
+            </a:r>
+          </a:p>
+        </p:txBody>
+      </p:sp>
+      <p:sp>
+        <p:nvSpPr>
+          <p:cNvPr id="80" name="TextBox 79">
+            <a:extLst>
+              <a:ext uri="{FF2B5EF4-FFF2-40B4-BE49-F238E27FC236}">
+                <a16:creationId xmlns:a16="http://schemas.microsoft.com/office/drawing/2014/main" id="{6B28AB55-E86C-F94B-9B8E-259EBAB12272}"/>
+              </a:ext>
+            </a:extLst>
+          </p:cNvPr>
+          <p:cNvSpPr txBox="1"/>
+          <p:nvPr/>
+        </p:nvSpPr>
+        <p:spPr>
+          <a:xfrm>
+            <a:off x="10261604" y="1700911"/>
+            <a:ext cx="1117600" cy="369332"/>
+          </a:xfrm>
+          <a:prstGeom prst="rect">
+            <a:avLst/>
+          </a:prstGeom>
+          <a:noFill/>
+        </p:spPr>
+        <p:txBody>
+          <a:bodyPr wrap="square" rtlCol="0">
+            <a:spAutoFit/>
+          </a:bodyPr>
+          <a:lstStyle/>
+          <a:p>
+            <a:r>
+              <a:rPr lang="en-US" dirty="0"/>
+              <a:t>A2</a:t>
+            </a:r>
+          </a:p>
+        </p:txBody>
+      </p:sp>
+      <p:sp>
+        <p:nvSpPr>
+          <p:cNvPr id="81" name="TextBox 80">
+            <a:extLst>
+              <a:ext uri="{FF2B5EF4-FFF2-40B4-BE49-F238E27FC236}">
+                <a16:creationId xmlns:a16="http://schemas.microsoft.com/office/drawing/2014/main" id="{9A9DD260-4826-A240-85E2-A2354F864051}"/>
+              </a:ext>
+            </a:extLst>
+          </p:cNvPr>
+          <p:cNvSpPr txBox="1"/>
+          <p:nvPr/>
+        </p:nvSpPr>
+        <p:spPr>
+          <a:xfrm>
+            <a:off x="10261604" y="2124244"/>
+            <a:ext cx="1117600" cy="369332"/>
+          </a:xfrm>
+          <a:prstGeom prst="rect">
+            <a:avLst/>
+          </a:prstGeom>
+          <a:noFill/>
+        </p:spPr>
+        <p:txBody>
+          <a:bodyPr wrap="square" rtlCol="0">
+            <a:spAutoFit/>
+          </a:bodyPr>
+          <a:lstStyle/>
+          <a:p>
+            <a:r>
+              <a:rPr lang="en-US" dirty="0"/>
+              <a:t>B2</a:t>
+            </a:r>
+          </a:p>
+        </p:txBody>
+      </p:sp>
+      <p:sp>
+        <p:nvSpPr>
+          <p:cNvPr id="82" name="TextBox 81">
+            <a:extLst>
+              <a:ext uri="{FF2B5EF4-FFF2-40B4-BE49-F238E27FC236}">
+                <a16:creationId xmlns:a16="http://schemas.microsoft.com/office/drawing/2014/main" id="{82B41A8D-1566-3D49-BF7A-35EC9367F407}"/>
+              </a:ext>
+            </a:extLst>
+          </p:cNvPr>
+          <p:cNvSpPr txBox="1"/>
+          <p:nvPr/>
+        </p:nvSpPr>
+        <p:spPr>
+          <a:xfrm>
+            <a:off x="10261604" y="2496777"/>
+            <a:ext cx="1117600" cy="369332"/>
+          </a:xfrm>
+          <a:prstGeom prst="rect">
+            <a:avLst/>
+          </a:prstGeom>
+          <a:noFill/>
+        </p:spPr>
+        <p:txBody>
+          <a:bodyPr wrap="square" rtlCol="0">
+            <a:spAutoFit/>
+          </a:bodyPr>
+          <a:lstStyle/>
+          <a:p>
+            <a:r>
+              <a:rPr lang="en-US" dirty="0"/>
+              <a:t>C2</a:t>
+            </a:r>
+          </a:p>
+        </p:txBody>
+      </p:sp>
+      <p:sp>
+        <p:nvSpPr>
+          <p:cNvPr id="83" name="TextBox 82">
+            <a:extLst>
+              <a:ext uri="{FF2B5EF4-FFF2-40B4-BE49-F238E27FC236}">
+                <a16:creationId xmlns:a16="http://schemas.microsoft.com/office/drawing/2014/main" id="{3F7F4FF0-E4A2-F249-AD28-EF79497B8214}"/>
+              </a:ext>
+            </a:extLst>
+          </p:cNvPr>
+          <p:cNvSpPr txBox="1"/>
+          <p:nvPr/>
+        </p:nvSpPr>
+        <p:spPr>
+          <a:xfrm>
+            <a:off x="10261604" y="2925252"/>
+            <a:ext cx="1117600" cy="369332"/>
+          </a:xfrm>
+          <a:prstGeom prst="rect">
+            <a:avLst/>
+          </a:prstGeom>
+          <a:noFill/>
+        </p:spPr>
+        <p:txBody>
+          <a:bodyPr wrap="square" rtlCol="0">
+            <a:spAutoFit/>
+          </a:bodyPr>
+          <a:lstStyle/>
+          <a:p>
+            <a:r>
+              <a:rPr lang="en-US" dirty="0"/>
+              <a:t>D2</a:t>
+            </a:r>
+          </a:p>
+        </p:txBody>
+      </p:sp>
+      <p:sp>
+        <p:nvSpPr>
+          <p:cNvPr id="84" name="TextBox 83">
+            <a:extLst>
+              <a:ext uri="{FF2B5EF4-FFF2-40B4-BE49-F238E27FC236}">
+                <a16:creationId xmlns:a16="http://schemas.microsoft.com/office/drawing/2014/main" id="{24E4A59D-CD02-E244-8FCC-FC821F9C92F1}"/>
+              </a:ext>
+            </a:extLst>
+          </p:cNvPr>
+          <p:cNvSpPr txBox="1"/>
+          <p:nvPr/>
+        </p:nvSpPr>
+        <p:spPr>
+          <a:xfrm>
+            <a:off x="9474204" y="1225267"/>
+            <a:ext cx="1117600" cy="369332"/>
+          </a:xfrm>
+          <a:prstGeom prst="rect">
+            <a:avLst/>
+          </a:prstGeom>
+          <a:noFill/>
+        </p:spPr>
+        <p:txBody>
+          <a:bodyPr wrap="square" rtlCol="0">
+            <a:spAutoFit/>
+          </a:bodyPr>
+          <a:lstStyle/>
+          <a:p>
+            <a:r>
+              <a:rPr lang="en-US" dirty="0"/>
+              <a:t>A1</a:t>
+            </a:r>
+          </a:p>
+        </p:txBody>
+      </p:sp>
+      <p:sp>
+        <p:nvSpPr>
+          <p:cNvPr id="85" name="TextBox 84">
+            <a:extLst>
+              <a:ext uri="{FF2B5EF4-FFF2-40B4-BE49-F238E27FC236}">
+                <a16:creationId xmlns:a16="http://schemas.microsoft.com/office/drawing/2014/main" id="{1E5384FD-B5B2-DE40-8D15-21A9839F51C3}"/>
+              </a:ext>
+            </a:extLst>
+          </p:cNvPr>
+          <p:cNvSpPr txBox="1"/>
+          <p:nvPr/>
+        </p:nvSpPr>
+        <p:spPr>
+          <a:xfrm>
+            <a:off x="9474204" y="1648600"/>
+            <a:ext cx="1117600" cy="369332"/>
+          </a:xfrm>
+          <a:prstGeom prst="rect">
+            <a:avLst/>
+          </a:prstGeom>
+          <a:noFill/>
+        </p:spPr>
+        <p:txBody>
+          <a:bodyPr wrap="square" rtlCol="0">
+            <a:spAutoFit/>
+          </a:bodyPr>
+          <a:lstStyle/>
+          <a:p>
+            <a:r>
+              <a:rPr lang="en-US" dirty="0"/>
+              <a:t>B1</a:t>
+            </a:r>
+          </a:p>
+        </p:txBody>
+      </p:sp>
+      <p:sp>
+        <p:nvSpPr>
+          <p:cNvPr id="86" name="TextBox 85">
+            <a:extLst>
+              <a:ext uri="{FF2B5EF4-FFF2-40B4-BE49-F238E27FC236}">
+                <a16:creationId xmlns:a16="http://schemas.microsoft.com/office/drawing/2014/main" id="{C54E9E02-02A8-7848-9312-8375C27C558A}"/>
+              </a:ext>
+            </a:extLst>
+          </p:cNvPr>
+          <p:cNvSpPr txBox="1"/>
+          <p:nvPr/>
+        </p:nvSpPr>
+        <p:spPr>
+          <a:xfrm>
+            <a:off x="9474204" y="2032927"/>
+            <a:ext cx="1117600" cy="369332"/>
+          </a:xfrm>
+          <a:prstGeom prst="rect">
+            <a:avLst/>
+          </a:prstGeom>
+          <a:noFill/>
+        </p:spPr>
+        <p:txBody>
+          <a:bodyPr wrap="square" rtlCol="0">
+            <a:spAutoFit/>
+          </a:bodyPr>
+          <a:lstStyle/>
+          <a:p>
+            <a:r>
+              <a:rPr lang="en-US" dirty="0"/>
+              <a:t>C1</a:t>
+            </a:r>
+          </a:p>
+        </p:txBody>
+      </p:sp>
+      <p:sp>
+        <p:nvSpPr>
+          <p:cNvPr id="87" name="TextBox 86">
+            <a:extLst>
+              <a:ext uri="{FF2B5EF4-FFF2-40B4-BE49-F238E27FC236}">
+                <a16:creationId xmlns:a16="http://schemas.microsoft.com/office/drawing/2014/main" id="{4DBD5100-02CB-5344-9976-9D64341C8592}"/>
+              </a:ext>
+            </a:extLst>
+          </p:cNvPr>
+          <p:cNvSpPr txBox="1"/>
+          <p:nvPr/>
+        </p:nvSpPr>
+        <p:spPr>
+          <a:xfrm>
+            <a:off x="9474204" y="2456260"/>
+            <a:ext cx="1117600" cy="369332"/>
+          </a:xfrm>
+          <a:prstGeom prst="rect">
+            <a:avLst/>
+          </a:prstGeom>
+          <a:noFill/>
+        </p:spPr>
+        <p:txBody>
+          <a:bodyPr wrap="square" rtlCol="0">
+            <a:spAutoFit/>
+          </a:bodyPr>
+          <a:lstStyle/>
+          <a:p>
+            <a:r>
+              <a:rPr lang="en-US" dirty="0"/>
+              <a:t>D1</a:t>
+            </a:r>
+          </a:p>
+        </p:txBody>
+      </p:sp>
+      <p:sp>
+        <p:nvSpPr>
+          <p:cNvPr id="88" name="TextBox 87">
+            <a:extLst>
+              <a:ext uri="{FF2B5EF4-FFF2-40B4-BE49-F238E27FC236}">
+                <a16:creationId xmlns:a16="http://schemas.microsoft.com/office/drawing/2014/main" id="{F8B0D346-C6BA-6641-A8D6-D7AA0C71458C}"/>
+              </a:ext>
+            </a:extLst>
+          </p:cNvPr>
+          <p:cNvSpPr txBox="1"/>
+          <p:nvPr/>
+        </p:nvSpPr>
+        <p:spPr>
+          <a:xfrm>
+            <a:off x="9474204" y="2896526"/>
+            <a:ext cx="1117600" cy="369332"/>
+          </a:xfrm>
+          <a:prstGeom prst="rect">
+            <a:avLst/>
+          </a:prstGeom>
+          <a:noFill/>
+        </p:spPr>
+        <p:txBody>
+          <a:bodyPr wrap="square" rtlCol="0">
+            <a:spAutoFit/>
+          </a:bodyPr>
+          <a:lstStyle/>
+          <a:p>
+            <a:r>
+              <a:rPr lang="en-US" dirty="0"/>
+              <a:t>E1</a:t>
+            </a:r>
+          </a:p>
+        </p:txBody>
+      </p:sp>
+      <p:sp>
+        <p:nvSpPr>
+          <p:cNvPr id="89" name="TextBox 88">
+            <a:extLst>
+              <a:ext uri="{FF2B5EF4-FFF2-40B4-BE49-F238E27FC236}">
+                <a16:creationId xmlns:a16="http://schemas.microsoft.com/office/drawing/2014/main" id="{A459A237-4499-E842-B455-D22147B532FC}"/>
+              </a:ext>
+            </a:extLst>
+          </p:cNvPr>
+          <p:cNvSpPr txBox="1"/>
+          <p:nvPr/>
+        </p:nvSpPr>
+        <p:spPr>
+          <a:xfrm>
+            <a:off x="10261604" y="3294584"/>
+            <a:ext cx="1117600" cy="369332"/>
+          </a:xfrm>
+          <a:prstGeom prst="rect">
+            <a:avLst/>
+          </a:prstGeom>
+          <a:noFill/>
+        </p:spPr>
+        <p:txBody>
+          <a:bodyPr wrap="square" rtlCol="0">
+            <a:spAutoFit/>
+          </a:bodyPr>
+          <a:lstStyle/>
+          <a:p>
+            <a:r>
+              <a:rPr lang="en-US" dirty="0"/>
+              <a:t>E2</a:t>
+            </a:r>
+          </a:p>
+        </p:txBody>
+      </p:sp>
+      <p:grpSp>
+        <p:nvGrpSpPr>
+          <p:cNvPr id="90" name="Group 89">
+            <a:extLst>
+              <a:ext uri="{FF2B5EF4-FFF2-40B4-BE49-F238E27FC236}">
+                <a16:creationId xmlns:a16="http://schemas.microsoft.com/office/drawing/2014/main" id="{E6F22DDF-714F-AC46-9B1D-706926A4440C}"/>
+              </a:ext>
+            </a:extLst>
+          </p:cNvPr>
+          <p:cNvGrpSpPr/>
+          <p:nvPr/>
+        </p:nvGrpSpPr>
+        <p:grpSpPr>
+          <a:xfrm>
+            <a:off x="389466" y="1876837"/>
+            <a:ext cx="1280184" cy="2895995"/>
+            <a:chOff x="1419710" y="4892157"/>
+            <a:chExt cx="670897" cy="1115530"/>
+          </a:xfrm>
+        </p:grpSpPr>
+        <p:grpSp>
+          <p:nvGrpSpPr>
+            <p:cNvPr id="91" name="Group 90">
+              <a:extLst>
+                <a:ext uri="{FF2B5EF4-FFF2-40B4-BE49-F238E27FC236}">
+                  <a16:creationId xmlns:a16="http://schemas.microsoft.com/office/drawing/2014/main" id="{451FE518-0ED3-A74F-81EF-528980236251}"/>
+                </a:ext>
+              </a:extLst>
+            </p:cNvPr>
+            <p:cNvGrpSpPr/>
+            <p:nvPr/>
+          </p:nvGrpSpPr>
+          <p:grpSpPr>
+            <a:xfrm rot="10800000">
+              <a:off x="1419710" y="4892157"/>
+              <a:ext cx="670897" cy="246621"/>
+              <a:chOff x="1544708" y="4448631"/>
+              <a:chExt cx="4237129" cy="542720"/>
+            </a:xfrm>
+          </p:grpSpPr>
+          <p:cxnSp>
+            <p:nvCxnSpPr>
+              <p:cNvPr id="96" name="Straight Connector 95">
+                <a:extLst>
+                  <a:ext uri="{FF2B5EF4-FFF2-40B4-BE49-F238E27FC236}">
+                    <a16:creationId xmlns:a16="http://schemas.microsoft.com/office/drawing/2014/main" id="{355EDAC4-A81B-0345-A597-5F2F2225C2E7}"/>
+                  </a:ext>
+                </a:extLst>
+              </p:cNvPr>
+              <p:cNvCxnSpPr>
+                <a:cxnSpLocks/>
+              </p:cNvCxnSpPr>
+              <p:nvPr/>
+            </p:nvCxnSpPr>
+            <p:spPr>
+              <a:xfrm rot="10800000" flipH="1" flipV="1">
+                <a:off x="1544708" y="4448631"/>
+                <a:ext cx="63257" cy="542720"/>
+              </a:xfrm>
+              <a:prstGeom prst="line">
+                <a:avLst/>
+              </a:prstGeom>
+              <a:ln w="38100">
+                <a:solidFill>
+                  <a:schemeClr val="tx1"/>
+                </a:solidFill>
+                <a:headEnd type="triangle"/>
+              </a:ln>
+            </p:spPr>
+            <p:style>
+              <a:lnRef idx="1">
+                <a:schemeClr val="accent1"/>
+              </a:lnRef>
+              <a:fillRef idx="0">
+                <a:schemeClr val="accent1"/>
+              </a:fillRef>
+              <a:effectRef idx="0">
+                <a:schemeClr val="accent1"/>
+              </a:effectRef>
+              <a:fontRef idx="minor">
+                <a:schemeClr val="tx1"/>
+              </a:fontRef>
+            </p:style>
+          </p:cxnSp>
+          <p:cxnSp>
+            <p:nvCxnSpPr>
+              <p:cNvPr id="97" name="Straight Connector 96">
+                <a:extLst>
+                  <a:ext uri="{FF2B5EF4-FFF2-40B4-BE49-F238E27FC236}">
+                    <a16:creationId xmlns:a16="http://schemas.microsoft.com/office/drawing/2014/main" id="{826A3888-D65E-F64C-9D09-FAD53935DE42}"/>
+                  </a:ext>
+                </a:extLst>
+              </p:cNvPr>
+              <p:cNvCxnSpPr>
+                <a:cxnSpLocks/>
+              </p:cNvCxnSpPr>
+              <p:nvPr/>
+            </p:nvCxnSpPr>
+            <p:spPr>
+              <a:xfrm flipH="1">
+                <a:off x="1607965" y="4979792"/>
+                <a:ext cx="4173872" cy="407"/>
+              </a:xfrm>
+              <a:prstGeom prst="line">
+                <a:avLst/>
+              </a:prstGeom>
+              <a:ln w="38100">
+                <a:solidFill>
+                  <a:schemeClr val="tx1"/>
+                </a:solidFill>
+                <a:headEnd type="none"/>
+                <a:tailEnd type="none"/>
+              </a:ln>
+            </p:spPr>
+            <p:style>
+              <a:lnRef idx="1">
+                <a:schemeClr val="accent1"/>
+              </a:lnRef>
+              <a:fillRef idx="0">
+                <a:schemeClr val="accent1"/>
+              </a:fillRef>
+              <a:effectRef idx="0">
+                <a:schemeClr val="accent1"/>
+              </a:effectRef>
+              <a:fontRef idx="minor">
+                <a:schemeClr val="tx1"/>
+              </a:fontRef>
+            </p:style>
+          </p:cxnSp>
+        </p:grpSp>
+        <p:grpSp>
+          <p:nvGrpSpPr>
+            <p:cNvPr id="92" name="Group 91">
+              <a:extLst>
+                <a:ext uri="{FF2B5EF4-FFF2-40B4-BE49-F238E27FC236}">
+                  <a16:creationId xmlns:a16="http://schemas.microsoft.com/office/drawing/2014/main" id="{839D55C0-37EE-0642-965B-647E9DBFAC06}"/>
+                </a:ext>
+              </a:extLst>
+            </p:cNvPr>
+            <p:cNvGrpSpPr/>
+            <p:nvPr/>
+          </p:nvGrpSpPr>
+          <p:grpSpPr>
+            <a:xfrm>
+              <a:off x="1428381" y="4894461"/>
+              <a:ext cx="652211" cy="1113226"/>
+              <a:chOff x="1657472" y="3839257"/>
+              <a:chExt cx="4173872" cy="1113226"/>
+            </a:xfrm>
+          </p:grpSpPr>
+          <p:cxnSp>
+            <p:nvCxnSpPr>
+              <p:cNvPr id="94" name="Straight Connector 93">
+                <a:extLst>
+                  <a:ext uri="{FF2B5EF4-FFF2-40B4-BE49-F238E27FC236}">
+                    <a16:creationId xmlns:a16="http://schemas.microsoft.com/office/drawing/2014/main" id="{DB381736-D642-DD41-A204-1D1D50D2EA06}"/>
+                  </a:ext>
+                </a:extLst>
+              </p:cNvPr>
+              <p:cNvCxnSpPr>
+                <a:cxnSpLocks/>
+              </p:cNvCxnSpPr>
+              <p:nvPr/>
+            </p:nvCxnSpPr>
+            <p:spPr>
+              <a:xfrm>
+                <a:off x="1669698" y="3839257"/>
+                <a:ext cx="0" cy="1113226"/>
+              </a:xfrm>
+              <a:prstGeom prst="line">
+                <a:avLst/>
+              </a:prstGeom>
+              <a:ln w="38100">
+                <a:solidFill>
+                  <a:schemeClr val="tx1"/>
+                </a:solidFill>
+                <a:headEnd type="none"/>
+              </a:ln>
+            </p:spPr>
+            <p:style>
+              <a:lnRef idx="1">
+                <a:schemeClr val="accent1"/>
+              </a:lnRef>
+              <a:fillRef idx="0">
+                <a:schemeClr val="accent1"/>
+              </a:fillRef>
+              <a:effectRef idx="0">
+                <a:schemeClr val="accent1"/>
+              </a:effectRef>
+              <a:fontRef idx="minor">
+                <a:schemeClr val="tx1"/>
+              </a:fontRef>
+            </p:style>
+          </p:cxnSp>
+          <p:cxnSp>
+            <p:nvCxnSpPr>
+              <p:cNvPr id="95" name="Straight Connector 94">
+                <a:extLst>
+                  <a:ext uri="{FF2B5EF4-FFF2-40B4-BE49-F238E27FC236}">
+                    <a16:creationId xmlns:a16="http://schemas.microsoft.com/office/drawing/2014/main" id="{07DC2246-5516-0E47-80CD-6933D4020203}"/>
+                  </a:ext>
+                </a:extLst>
+              </p:cNvPr>
+              <p:cNvCxnSpPr>
+                <a:cxnSpLocks/>
+              </p:cNvCxnSpPr>
+              <p:nvPr/>
+            </p:nvCxnSpPr>
+            <p:spPr>
+              <a:xfrm flipH="1">
+                <a:off x="1657472" y="4949775"/>
+                <a:ext cx="4173872" cy="407"/>
+              </a:xfrm>
+              <a:prstGeom prst="line">
+                <a:avLst/>
+              </a:prstGeom>
+              <a:ln w="38100">
+                <a:solidFill>
+                  <a:schemeClr val="tx1"/>
+                </a:solidFill>
+                <a:headEnd type="none"/>
+                <a:tailEnd type="none"/>
+              </a:ln>
+            </p:spPr>
+            <p:style>
+              <a:lnRef idx="1">
+                <a:schemeClr val="accent1"/>
+              </a:lnRef>
+              <a:fillRef idx="0">
+                <a:schemeClr val="accent1"/>
+              </a:fillRef>
+              <a:effectRef idx="0">
+                <a:schemeClr val="accent1"/>
+              </a:effectRef>
+              <a:fontRef idx="minor">
+                <a:schemeClr val="tx1"/>
+              </a:fontRef>
+            </p:style>
+          </p:cxnSp>
+        </p:grpSp>
+        <p:cxnSp>
+          <p:nvCxnSpPr>
+            <p:cNvPr id="93" name="Straight Connector 92">
+              <a:extLst>
+                <a:ext uri="{FF2B5EF4-FFF2-40B4-BE49-F238E27FC236}">
+                  <a16:creationId xmlns:a16="http://schemas.microsoft.com/office/drawing/2014/main" id="{C2BC65EC-4E31-5040-8FF7-B02F7AEB4340}"/>
+                </a:ext>
+              </a:extLst>
+            </p:cNvPr>
+            <p:cNvCxnSpPr>
+              <a:cxnSpLocks/>
+            </p:cNvCxnSpPr>
+            <p:nvPr/>
+          </p:nvCxnSpPr>
+          <p:spPr>
+            <a:xfrm>
+              <a:off x="2070816" y="5724939"/>
+              <a:ext cx="0" cy="282748"/>
+            </a:xfrm>
+            <a:prstGeom prst="line">
+              <a:avLst/>
+            </a:prstGeom>
+            <a:ln w="38100">
+              <a:solidFill>
+                <a:schemeClr val="tx1"/>
+              </a:solidFill>
+              <a:headEnd type="none"/>
+            </a:ln>
+          </p:spPr>
+          <p:style>
+            <a:lnRef idx="1">
+              <a:schemeClr val="accent1"/>
+            </a:lnRef>
+            <a:fillRef idx="0">
+              <a:schemeClr val="accent1"/>
+            </a:fillRef>
+            <a:effectRef idx="0">
+              <a:schemeClr val="accent1"/>
+            </a:effectRef>
+            <a:fontRef idx="minor">
+              <a:schemeClr val="tx1"/>
+            </a:fontRef>
+          </p:style>
+        </p:cxnSp>
+      </p:grpSp>
+      <p:cxnSp>
+        <p:nvCxnSpPr>
+          <p:cNvPr id="100" name="Straight Connector 99">
+            <a:extLst>
+              <a:ext uri="{FF2B5EF4-FFF2-40B4-BE49-F238E27FC236}">
+                <a16:creationId xmlns:a16="http://schemas.microsoft.com/office/drawing/2014/main" id="{3A0D657E-9DB5-3241-B4D7-BCA3FA2C0EDC}"/>
+              </a:ext>
+            </a:extLst>
+          </p:cNvPr>
+          <p:cNvCxnSpPr>
+            <a:cxnSpLocks/>
+          </p:cNvCxnSpPr>
+          <p:nvPr/>
+        </p:nvCxnSpPr>
+        <p:spPr>
+          <a:xfrm flipV="1">
+            <a:off x="1921934" y="1236133"/>
+            <a:ext cx="0" cy="1286938"/>
+          </a:xfrm>
+          <a:prstGeom prst="line">
+            <a:avLst/>
+          </a:prstGeom>
+          <a:ln w="38100">
+            <a:solidFill>
+              <a:schemeClr val="tx1"/>
+            </a:solidFill>
+            <a:headEnd type="triangle"/>
+          </a:ln>
+        </p:spPr>
+        <p:style>
+          <a:lnRef idx="1">
+            <a:schemeClr val="accent1"/>
+          </a:lnRef>
+          <a:fillRef idx="0">
+            <a:schemeClr val="accent1"/>
+          </a:fillRef>
+          <a:effectRef idx="0">
+            <a:schemeClr val="accent1"/>
+          </a:effectRef>
+          <a:fontRef idx="minor">
+            <a:schemeClr val="tx1"/>
+          </a:fontRef>
+        </p:style>
+      </p:cxnSp>
+      <p:cxnSp>
+        <p:nvCxnSpPr>
+          <p:cNvPr id="102" name="Straight Connector 101">
+            <a:extLst>
+              <a:ext uri="{FF2B5EF4-FFF2-40B4-BE49-F238E27FC236}">
+                <a16:creationId xmlns:a16="http://schemas.microsoft.com/office/drawing/2014/main" id="{BA099A77-6059-C341-9AAC-88DFC55AF3B5}"/>
+              </a:ext>
+            </a:extLst>
+          </p:cNvPr>
+          <p:cNvCxnSpPr>
+            <a:cxnSpLocks/>
+          </p:cNvCxnSpPr>
+          <p:nvPr/>
+        </p:nvCxnSpPr>
+        <p:spPr>
+          <a:xfrm flipV="1">
+            <a:off x="1871133" y="4026930"/>
+            <a:ext cx="0" cy="1976061"/>
+          </a:xfrm>
+          <a:prstGeom prst="line">
+            <a:avLst/>
+          </a:prstGeom>
+          <a:ln w="38100">
+            <a:solidFill>
+              <a:schemeClr val="tx1"/>
+            </a:solidFill>
+            <a:headEnd type="triangle"/>
+          </a:ln>
+        </p:spPr>
+        <p:style>
+          <a:lnRef idx="1">
+            <a:schemeClr val="accent1"/>
+          </a:lnRef>
+          <a:fillRef idx="0">
+            <a:schemeClr val="accent1"/>
+          </a:fillRef>
+          <a:effectRef idx="0">
+            <a:schemeClr val="accent1"/>
+          </a:effectRef>
+          <a:fontRef idx="minor">
+            <a:schemeClr val="tx1"/>
+          </a:fontRef>
+        </p:style>
+      </p:cxnSp>
+      <p:cxnSp>
+        <p:nvCxnSpPr>
+          <p:cNvPr id="104" name="Straight Connector 103">
+            <a:extLst>
+              <a:ext uri="{FF2B5EF4-FFF2-40B4-BE49-F238E27FC236}">
+                <a16:creationId xmlns:a16="http://schemas.microsoft.com/office/drawing/2014/main" id="{DB53E20C-86C8-224B-AE36-F5ED9F8E946D}"/>
+              </a:ext>
+            </a:extLst>
+          </p:cNvPr>
+          <p:cNvCxnSpPr>
+            <a:cxnSpLocks/>
+          </p:cNvCxnSpPr>
+          <p:nvPr/>
+        </p:nvCxnSpPr>
+        <p:spPr>
+          <a:xfrm>
+            <a:off x="5672668" y="46001"/>
+            <a:ext cx="0" cy="6720933"/>
+          </a:xfrm>
+          <a:prstGeom prst="line">
+            <a:avLst/>
+          </a:prstGeom>
+          <a:ln w="50800">
+            <a:solidFill>
+              <a:schemeClr val="accent2">
+                <a:lumMod val="75000"/>
+              </a:schemeClr>
+            </a:solidFill>
+            <a:tailEnd type="none"/>
+          </a:ln>
+        </p:spPr>
+        <p:style>
+          <a:lnRef idx="1">
+            <a:schemeClr val="accent1"/>
+          </a:lnRef>
+          <a:fillRef idx="0">
+            <a:schemeClr val="accent1"/>
+          </a:fillRef>
+          <a:effectRef idx="0">
+            <a:schemeClr val="accent1"/>
+          </a:effectRef>
+          <a:fontRef idx="minor">
+            <a:schemeClr val="tx1"/>
+          </a:fontRef>
+        </p:style>
+      </p:cxnSp>
+      <p:sp>
+        <p:nvSpPr>
+          <p:cNvPr id="106" name="TextBox 105">
+            <a:extLst>
+              <a:ext uri="{FF2B5EF4-FFF2-40B4-BE49-F238E27FC236}">
+                <a16:creationId xmlns:a16="http://schemas.microsoft.com/office/drawing/2014/main" id="{1165DBBE-C23A-5B4D-8ACC-C3AF6FA8C1D7}"/>
+              </a:ext>
+            </a:extLst>
+          </p:cNvPr>
+          <p:cNvSpPr txBox="1"/>
+          <p:nvPr/>
+        </p:nvSpPr>
+        <p:spPr>
+          <a:xfrm>
+            <a:off x="2827872" y="86269"/>
+            <a:ext cx="2438393" cy="646331"/>
+          </a:xfrm>
+          <a:prstGeom prst="rect">
+            <a:avLst/>
+          </a:prstGeom>
+          <a:noFill/>
+        </p:spPr>
+        <p:txBody>
+          <a:bodyPr wrap="square" rtlCol="0">
+            <a:spAutoFit/>
+          </a:bodyPr>
+          <a:lstStyle/>
+          <a:p>
+            <a:r>
+              <a:rPr lang="en-US" b="1" dirty="0"/>
+              <a:t>Not Pipelined (Initiation Interval = 5)</a:t>
+            </a:r>
+          </a:p>
+        </p:txBody>
+      </p:sp>
+      <p:sp>
+        <p:nvSpPr>
+          <p:cNvPr id="107" name="TextBox 106">
+            <a:extLst>
+              <a:ext uri="{FF2B5EF4-FFF2-40B4-BE49-F238E27FC236}">
+                <a16:creationId xmlns:a16="http://schemas.microsoft.com/office/drawing/2014/main" id="{EF45E8E0-E7B1-9A42-8E73-77F5602661C7}"/>
+              </a:ext>
+            </a:extLst>
+          </p:cNvPr>
+          <p:cNvSpPr txBox="1"/>
+          <p:nvPr/>
+        </p:nvSpPr>
+        <p:spPr>
+          <a:xfrm>
+            <a:off x="5977470" y="169335"/>
+            <a:ext cx="2285998" cy="369332"/>
+          </a:xfrm>
+          <a:prstGeom prst="rect">
+            <a:avLst/>
+          </a:prstGeom>
+          <a:noFill/>
+        </p:spPr>
+        <p:txBody>
+          <a:bodyPr wrap="square" rtlCol="0">
+            <a:spAutoFit/>
+          </a:bodyPr>
+          <a:lstStyle/>
+          <a:p>
+            <a:r>
+              <a:rPr lang="en-US" b="1" dirty="0"/>
+              <a:t>II = 2</a:t>
+            </a:r>
+          </a:p>
+        </p:txBody>
+      </p:sp>
+      <p:cxnSp>
+        <p:nvCxnSpPr>
+          <p:cNvPr id="109" name="Straight Connector 108">
+            <a:extLst>
+              <a:ext uri="{FF2B5EF4-FFF2-40B4-BE49-F238E27FC236}">
+                <a16:creationId xmlns:a16="http://schemas.microsoft.com/office/drawing/2014/main" id="{8F544790-D2C2-6F4E-BDFD-E314AC07C482}"/>
+              </a:ext>
+            </a:extLst>
+          </p:cNvPr>
+          <p:cNvCxnSpPr>
+            <a:cxnSpLocks/>
+          </p:cNvCxnSpPr>
+          <p:nvPr/>
+        </p:nvCxnSpPr>
+        <p:spPr>
+          <a:xfrm>
+            <a:off x="8415867" y="26198"/>
+            <a:ext cx="0" cy="6720933"/>
+          </a:xfrm>
+          <a:prstGeom prst="line">
+            <a:avLst/>
+          </a:prstGeom>
+          <a:ln w="50800">
+            <a:solidFill>
+              <a:schemeClr val="accent2">
+                <a:lumMod val="75000"/>
+              </a:schemeClr>
+            </a:solidFill>
+            <a:tailEnd type="none"/>
+          </a:ln>
+        </p:spPr>
+        <p:style>
+          <a:lnRef idx="1">
+            <a:schemeClr val="accent1"/>
+          </a:lnRef>
+          <a:fillRef idx="0">
+            <a:schemeClr val="accent1"/>
+          </a:fillRef>
+          <a:effectRef idx="0">
+            <a:schemeClr val="accent1"/>
+          </a:effectRef>
+          <a:fontRef idx="minor">
+            <a:schemeClr val="tx1"/>
+          </a:fontRef>
+        </p:style>
+      </p:cxnSp>
+      <p:sp>
+        <p:nvSpPr>
+          <p:cNvPr id="110" name="TextBox 109">
+            <a:extLst>
+              <a:ext uri="{FF2B5EF4-FFF2-40B4-BE49-F238E27FC236}">
+                <a16:creationId xmlns:a16="http://schemas.microsoft.com/office/drawing/2014/main" id="{4A8E457D-A98B-D444-8135-ECFEEF21DE4A}"/>
+              </a:ext>
+            </a:extLst>
+          </p:cNvPr>
+          <p:cNvSpPr txBox="1"/>
+          <p:nvPr/>
+        </p:nvSpPr>
+        <p:spPr>
+          <a:xfrm>
+            <a:off x="8898470" y="152400"/>
+            <a:ext cx="2285998" cy="369332"/>
+          </a:xfrm>
+          <a:prstGeom prst="rect">
+            <a:avLst/>
+          </a:prstGeom>
+          <a:noFill/>
+        </p:spPr>
+        <p:txBody>
+          <a:bodyPr wrap="square" rtlCol="0">
+            <a:spAutoFit/>
+          </a:bodyPr>
+          <a:lstStyle/>
+          <a:p>
+            <a:r>
+              <a:rPr lang="en-US" b="1" dirty="0"/>
+              <a:t>II = 1</a:t>
+            </a:r>
+          </a:p>
+        </p:txBody>
+      </p:sp>
+      <p:sp>
+        <p:nvSpPr>
+          <p:cNvPr id="111" name="TextBox 110">
+            <a:extLst>
+              <a:ext uri="{FF2B5EF4-FFF2-40B4-BE49-F238E27FC236}">
+                <a16:creationId xmlns:a16="http://schemas.microsoft.com/office/drawing/2014/main" id="{9D2241FF-F033-A947-9FA4-DC618D84E5E0}"/>
+              </a:ext>
+            </a:extLst>
+          </p:cNvPr>
+          <p:cNvSpPr txBox="1"/>
+          <p:nvPr/>
+        </p:nvSpPr>
+        <p:spPr>
+          <a:xfrm>
+            <a:off x="6079071" y="801934"/>
+            <a:ext cx="1117600" cy="369332"/>
+          </a:xfrm>
+          <a:prstGeom prst="rect">
+            <a:avLst/>
+          </a:prstGeom>
+          <a:noFill/>
+        </p:spPr>
+        <p:txBody>
+          <a:bodyPr wrap="square" rtlCol="0">
+            <a:spAutoFit/>
+          </a:bodyPr>
+          <a:lstStyle/>
+          <a:p>
+            <a:r>
+              <a:rPr lang="en-US" dirty="0"/>
+              <a:t>A0</a:t>
+            </a:r>
+          </a:p>
+        </p:txBody>
+      </p:sp>
+      <p:sp>
+        <p:nvSpPr>
+          <p:cNvPr id="112" name="TextBox 111">
+            <a:extLst>
+              <a:ext uri="{FF2B5EF4-FFF2-40B4-BE49-F238E27FC236}">
+                <a16:creationId xmlns:a16="http://schemas.microsoft.com/office/drawing/2014/main" id="{FAE11931-91B9-8246-B6B4-FDFC57B63002}"/>
+              </a:ext>
+            </a:extLst>
+          </p:cNvPr>
+          <p:cNvSpPr txBox="1"/>
+          <p:nvPr/>
+        </p:nvSpPr>
+        <p:spPr>
+          <a:xfrm>
+            <a:off x="6079071" y="1225267"/>
+            <a:ext cx="1117600" cy="369332"/>
+          </a:xfrm>
+          <a:prstGeom prst="rect">
+            <a:avLst/>
+          </a:prstGeom>
+          <a:noFill/>
+        </p:spPr>
+        <p:txBody>
+          <a:bodyPr wrap="square" rtlCol="0">
+            <a:spAutoFit/>
+          </a:bodyPr>
+          <a:lstStyle/>
+          <a:p>
+            <a:r>
+              <a:rPr lang="en-US" dirty="0"/>
+              <a:t>B0</a:t>
+            </a:r>
+          </a:p>
+        </p:txBody>
+      </p:sp>
+      <p:sp>
+        <p:nvSpPr>
+          <p:cNvPr id="113" name="TextBox 112">
+            <a:extLst>
+              <a:ext uri="{FF2B5EF4-FFF2-40B4-BE49-F238E27FC236}">
+                <a16:creationId xmlns:a16="http://schemas.microsoft.com/office/drawing/2014/main" id="{B168B080-6741-5F40-9533-1EA7E696FC6B}"/>
+              </a:ext>
+            </a:extLst>
+          </p:cNvPr>
+          <p:cNvSpPr txBox="1"/>
+          <p:nvPr/>
+        </p:nvSpPr>
+        <p:spPr>
+          <a:xfrm>
+            <a:off x="6079071" y="1648600"/>
+            <a:ext cx="1117600" cy="369332"/>
+          </a:xfrm>
+          <a:prstGeom prst="rect">
+            <a:avLst/>
+          </a:prstGeom>
+          <a:noFill/>
+        </p:spPr>
+        <p:txBody>
+          <a:bodyPr wrap="square" rtlCol="0">
+            <a:spAutoFit/>
+          </a:bodyPr>
+          <a:lstStyle/>
+          <a:p>
+            <a:r>
+              <a:rPr lang="en-US" dirty="0"/>
+              <a:t>C0</a:t>
+            </a:r>
+          </a:p>
+        </p:txBody>
+      </p:sp>
+      <p:sp>
+        <p:nvSpPr>
+          <p:cNvPr id="114" name="TextBox 113">
+            <a:extLst>
+              <a:ext uri="{FF2B5EF4-FFF2-40B4-BE49-F238E27FC236}">
+                <a16:creationId xmlns:a16="http://schemas.microsoft.com/office/drawing/2014/main" id="{E670CC77-DE9E-A046-8AC8-F5372A665B95}"/>
+              </a:ext>
+            </a:extLst>
+          </p:cNvPr>
+          <p:cNvSpPr txBox="1"/>
+          <p:nvPr/>
+        </p:nvSpPr>
+        <p:spPr>
+          <a:xfrm>
+            <a:off x="6079071" y="2071933"/>
+            <a:ext cx="1117600" cy="369332"/>
+          </a:xfrm>
+          <a:prstGeom prst="rect">
+            <a:avLst/>
+          </a:prstGeom>
+          <a:noFill/>
+        </p:spPr>
+        <p:txBody>
+          <a:bodyPr wrap="square" rtlCol="0">
+            <a:spAutoFit/>
+          </a:bodyPr>
+          <a:lstStyle/>
+          <a:p>
+            <a:r>
+              <a:rPr lang="en-US" dirty="0"/>
+              <a:t>D0</a:t>
+            </a:r>
+          </a:p>
+        </p:txBody>
+      </p:sp>
+      <p:sp>
+        <p:nvSpPr>
+          <p:cNvPr id="115" name="TextBox 114">
+            <a:extLst>
+              <a:ext uri="{FF2B5EF4-FFF2-40B4-BE49-F238E27FC236}">
+                <a16:creationId xmlns:a16="http://schemas.microsoft.com/office/drawing/2014/main" id="{647B43A7-5005-914A-AF8F-F9CE2843AAEC}"/>
+              </a:ext>
+            </a:extLst>
+          </p:cNvPr>
+          <p:cNvSpPr txBox="1"/>
+          <p:nvPr/>
+        </p:nvSpPr>
+        <p:spPr>
+          <a:xfrm>
+            <a:off x="6079071" y="2495266"/>
+            <a:ext cx="1117600" cy="369332"/>
+          </a:xfrm>
+          <a:prstGeom prst="rect">
+            <a:avLst/>
+          </a:prstGeom>
+          <a:noFill/>
+        </p:spPr>
+        <p:txBody>
+          <a:bodyPr wrap="square" rtlCol="0">
+            <a:spAutoFit/>
+          </a:bodyPr>
+          <a:lstStyle/>
+          <a:p>
+            <a:r>
+              <a:rPr lang="en-US" dirty="0"/>
+              <a:t>E0</a:t>
+            </a:r>
+          </a:p>
+        </p:txBody>
+      </p:sp>
+      <p:sp>
+        <p:nvSpPr>
+          <p:cNvPr id="116" name="TextBox 115">
+            <a:extLst>
+              <a:ext uri="{FF2B5EF4-FFF2-40B4-BE49-F238E27FC236}">
+                <a16:creationId xmlns:a16="http://schemas.microsoft.com/office/drawing/2014/main" id="{1CC3080E-0A1B-2141-8455-3B3B7B9F03C1}"/>
+              </a:ext>
+            </a:extLst>
+          </p:cNvPr>
+          <p:cNvSpPr txBox="1"/>
+          <p:nvPr/>
+        </p:nvSpPr>
+        <p:spPr>
+          <a:xfrm>
+            <a:off x="6874940" y="1679141"/>
+            <a:ext cx="1117600" cy="369332"/>
+          </a:xfrm>
+          <a:prstGeom prst="rect">
+            <a:avLst/>
+          </a:prstGeom>
+          <a:noFill/>
+        </p:spPr>
+        <p:txBody>
+          <a:bodyPr wrap="square" rtlCol="0">
+            <a:spAutoFit/>
+          </a:bodyPr>
+          <a:lstStyle/>
+          <a:p>
+            <a:r>
+              <a:rPr lang="en-US" dirty="0"/>
+              <a:t>A1</a:t>
+            </a:r>
+          </a:p>
+        </p:txBody>
+      </p:sp>
+      <p:sp>
+        <p:nvSpPr>
+          <p:cNvPr id="117" name="TextBox 116">
+            <a:extLst>
+              <a:ext uri="{FF2B5EF4-FFF2-40B4-BE49-F238E27FC236}">
+                <a16:creationId xmlns:a16="http://schemas.microsoft.com/office/drawing/2014/main" id="{46B75912-6689-B344-BDAB-AC3A5F2F521C}"/>
+              </a:ext>
+            </a:extLst>
+          </p:cNvPr>
+          <p:cNvSpPr txBox="1"/>
+          <p:nvPr/>
+        </p:nvSpPr>
+        <p:spPr>
+          <a:xfrm>
+            <a:off x="6874940" y="2102474"/>
+            <a:ext cx="1117600" cy="369332"/>
+          </a:xfrm>
+          <a:prstGeom prst="rect">
+            <a:avLst/>
+          </a:prstGeom>
+          <a:noFill/>
+        </p:spPr>
+        <p:txBody>
+          <a:bodyPr wrap="square" rtlCol="0">
+            <a:spAutoFit/>
+          </a:bodyPr>
+          <a:lstStyle/>
+          <a:p>
+            <a:r>
+              <a:rPr lang="en-US" dirty="0"/>
+              <a:t>B1</a:t>
+            </a:r>
+          </a:p>
+        </p:txBody>
+      </p:sp>
+      <p:sp>
+        <p:nvSpPr>
+          <p:cNvPr id="118" name="TextBox 117">
+            <a:extLst>
+              <a:ext uri="{FF2B5EF4-FFF2-40B4-BE49-F238E27FC236}">
+                <a16:creationId xmlns:a16="http://schemas.microsoft.com/office/drawing/2014/main" id="{EDA53F31-4017-1043-9627-2C7B5964D235}"/>
+              </a:ext>
+            </a:extLst>
+          </p:cNvPr>
+          <p:cNvSpPr txBox="1"/>
+          <p:nvPr/>
+        </p:nvSpPr>
+        <p:spPr>
+          <a:xfrm>
+            <a:off x="6874940" y="2486801"/>
+            <a:ext cx="1117600" cy="369332"/>
+          </a:xfrm>
+          <a:prstGeom prst="rect">
+            <a:avLst/>
+          </a:prstGeom>
+          <a:noFill/>
+        </p:spPr>
+        <p:txBody>
+          <a:bodyPr wrap="square" rtlCol="0">
+            <a:spAutoFit/>
+          </a:bodyPr>
+          <a:lstStyle/>
+          <a:p>
+            <a:r>
+              <a:rPr lang="en-US" dirty="0"/>
+              <a:t>C1</a:t>
+            </a:r>
+          </a:p>
+        </p:txBody>
+      </p:sp>
+      <p:sp>
+        <p:nvSpPr>
+          <p:cNvPr id="119" name="TextBox 118">
+            <a:extLst>
+              <a:ext uri="{FF2B5EF4-FFF2-40B4-BE49-F238E27FC236}">
+                <a16:creationId xmlns:a16="http://schemas.microsoft.com/office/drawing/2014/main" id="{621E6E7B-2E62-0246-BB4F-44C08557A964}"/>
+              </a:ext>
+            </a:extLst>
+          </p:cNvPr>
+          <p:cNvSpPr txBox="1"/>
+          <p:nvPr/>
+        </p:nvSpPr>
+        <p:spPr>
+          <a:xfrm>
+            <a:off x="6874940" y="2910134"/>
+            <a:ext cx="1117600" cy="369332"/>
+          </a:xfrm>
+          <a:prstGeom prst="rect">
+            <a:avLst/>
+          </a:prstGeom>
+          <a:noFill/>
+        </p:spPr>
+        <p:txBody>
+          <a:bodyPr wrap="square" rtlCol="0">
+            <a:spAutoFit/>
+          </a:bodyPr>
+          <a:lstStyle/>
+          <a:p>
+            <a:r>
+              <a:rPr lang="en-US" dirty="0"/>
+              <a:t>D1</a:t>
+            </a:r>
+          </a:p>
+        </p:txBody>
+      </p:sp>
+      <p:sp>
+        <p:nvSpPr>
+          <p:cNvPr id="120" name="TextBox 119">
+            <a:extLst>
+              <a:ext uri="{FF2B5EF4-FFF2-40B4-BE49-F238E27FC236}">
+                <a16:creationId xmlns:a16="http://schemas.microsoft.com/office/drawing/2014/main" id="{20FD5B17-DF7F-BC47-97E4-9FA113CA927D}"/>
+              </a:ext>
+            </a:extLst>
+          </p:cNvPr>
+          <p:cNvSpPr txBox="1"/>
+          <p:nvPr/>
+        </p:nvSpPr>
+        <p:spPr>
+          <a:xfrm>
+            <a:off x="6874940" y="3350400"/>
+            <a:ext cx="1117600" cy="369332"/>
+          </a:xfrm>
+          <a:prstGeom prst="rect">
+            <a:avLst/>
+          </a:prstGeom>
+          <a:noFill/>
+        </p:spPr>
+        <p:txBody>
+          <a:bodyPr wrap="square" rtlCol="0">
+            <a:spAutoFit/>
+          </a:bodyPr>
+          <a:lstStyle/>
+          <a:p>
+            <a:r>
+              <a:rPr lang="en-US" dirty="0"/>
+              <a:t>E1</a:t>
+            </a:r>
+          </a:p>
+        </p:txBody>
+      </p:sp>
+      <p:sp>
+        <p:nvSpPr>
+          <p:cNvPr id="121" name="TextBox 120">
+            <a:extLst>
+              <a:ext uri="{FF2B5EF4-FFF2-40B4-BE49-F238E27FC236}">
+                <a16:creationId xmlns:a16="http://schemas.microsoft.com/office/drawing/2014/main" id="{458F5283-737E-4E40-B356-F2A5E1D0BE26}"/>
+              </a:ext>
+            </a:extLst>
+          </p:cNvPr>
+          <p:cNvSpPr txBox="1"/>
+          <p:nvPr/>
+        </p:nvSpPr>
+        <p:spPr>
+          <a:xfrm>
+            <a:off x="7687735" y="2478336"/>
+            <a:ext cx="1117600" cy="369332"/>
+          </a:xfrm>
+          <a:prstGeom prst="rect">
+            <a:avLst/>
+          </a:prstGeom>
+          <a:noFill/>
+        </p:spPr>
+        <p:txBody>
+          <a:bodyPr wrap="square" rtlCol="0">
+            <a:spAutoFit/>
+          </a:bodyPr>
+          <a:lstStyle/>
+          <a:p>
+            <a:r>
+              <a:rPr lang="en-US" dirty="0"/>
+              <a:t>A2</a:t>
+            </a:r>
+          </a:p>
+        </p:txBody>
+      </p:sp>
+      <p:sp>
+        <p:nvSpPr>
+          <p:cNvPr id="122" name="TextBox 121">
+            <a:extLst>
+              <a:ext uri="{FF2B5EF4-FFF2-40B4-BE49-F238E27FC236}">
+                <a16:creationId xmlns:a16="http://schemas.microsoft.com/office/drawing/2014/main" id="{2B1ED6ED-679B-8446-9D12-C522AA25C6CA}"/>
+              </a:ext>
+            </a:extLst>
+          </p:cNvPr>
+          <p:cNvSpPr txBox="1"/>
+          <p:nvPr/>
+        </p:nvSpPr>
+        <p:spPr>
+          <a:xfrm>
+            <a:off x="7687735" y="2901669"/>
+            <a:ext cx="1117600" cy="369332"/>
+          </a:xfrm>
+          <a:prstGeom prst="rect">
+            <a:avLst/>
+          </a:prstGeom>
+          <a:noFill/>
+        </p:spPr>
+        <p:txBody>
+          <a:bodyPr wrap="square" rtlCol="0">
+            <a:spAutoFit/>
+          </a:bodyPr>
+          <a:lstStyle/>
+          <a:p>
+            <a:r>
+              <a:rPr lang="en-US" dirty="0"/>
+              <a:t>B2</a:t>
+            </a:r>
+          </a:p>
+        </p:txBody>
+      </p:sp>
+      <p:sp>
+        <p:nvSpPr>
+          <p:cNvPr id="123" name="TextBox 122">
+            <a:extLst>
+              <a:ext uri="{FF2B5EF4-FFF2-40B4-BE49-F238E27FC236}">
+                <a16:creationId xmlns:a16="http://schemas.microsoft.com/office/drawing/2014/main" id="{A943211E-1229-7848-85A7-A12776B734D0}"/>
+              </a:ext>
+            </a:extLst>
+          </p:cNvPr>
+          <p:cNvSpPr txBox="1"/>
+          <p:nvPr/>
+        </p:nvSpPr>
+        <p:spPr>
+          <a:xfrm>
+            <a:off x="7687735" y="3274202"/>
+            <a:ext cx="1117600" cy="369332"/>
+          </a:xfrm>
+          <a:prstGeom prst="rect">
+            <a:avLst/>
+          </a:prstGeom>
+          <a:noFill/>
+        </p:spPr>
+        <p:txBody>
+          <a:bodyPr wrap="square" rtlCol="0">
+            <a:spAutoFit/>
+          </a:bodyPr>
+          <a:lstStyle/>
+          <a:p>
+            <a:r>
+              <a:rPr lang="en-US" dirty="0"/>
+              <a:t>C2</a:t>
+            </a:r>
+          </a:p>
+        </p:txBody>
+      </p:sp>
+      <p:sp>
+        <p:nvSpPr>
+          <p:cNvPr id="124" name="TextBox 123">
+            <a:extLst>
+              <a:ext uri="{FF2B5EF4-FFF2-40B4-BE49-F238E27FC236}">
+                <a16:creationId xmlns:a16="http://schemas.microsoft.com/office/drawing/2014/main" id="{C7A17B0C-ACD7-F64E-B3EE-719E1627A06B}"/>
+              </a:ext>
+            </a:extLst>
+          </p:cNvPr>
+          <p:cNvSpPr txBox="1"/>
+          <p:nvPr/>
+        </p:nvSpPr>
+        <p:spPr>
+          <a:xfrm>
+            <a:off x="7687735" y="3702677"/>
+            <a:ext cx="1117600" cy="369332"/>
+          </a:xfrm>
+          <a:prstGeom prst="rect">
+            <a:avLst/>
+          </a:prstGeom>
+          <a:noFill/>
+        </p:spPr>
+        <p:txBody>
+          <a:bodyPr wrap="square" rtlCol="0">
+            <a:spAutoFit/>
+          </a:bodyPr>
+          <a:lstStyle/>
+          <a:p>
+            <a:r>
+              <a:rPr lang="en-US" dirty="0"/>
+              <a:t>D2</a:t>
+            </a:r>
+          </a:p>
+        </p:txBody>
+      </p:sp>
+      <p:sp>
+        <p:nvSpPr>
+          <p:cNvPr id="125" name="TextBox 124">
+            <a:extLst>
+              <a:ext uri="{FF2B5EF4-FFF2-40B4-BE49-F238E27FC236}">
+                <a16:creationId xmlns:a16="http://schemas.microsoft.com/office/drawing/2014/main" id="{815424A0-6540-B14A-B1AF-62598009AF35}"/>
+              </a:ext>
+            </a:extLst>
+          </p:cNvPr>
+          <p:cNvSpPr txBox="1"/>
+          <p:nvPr/>
+        </p:nvSpPr>
+        <p:spPr>
+          <a:xfrm>
+            <a:off x="7687735" y="4072009"/>
+            <a:ext cx="1117600" cy="369332"/>
+          </a:xfrm>
+          <a:prstGeom prst="rect">
+            <a:avLst/>
+          </a:prstGeom>
+          <a:noFill/>
+        </p:spPr>
+        <p:txBody>
+          <a:bodyPr wrap="square" rtlCol="0">
+            <a:spAutoFit/>
+          </a:bodyPr>
+          <a:lstStyle/>
+          <a:p>
+            <a:r>
+              <a:rPr lang="en-US" dirty="0"/>
+              <a:t>E2</a:t>
+            </a:r>
+          </a:p>
+        </p:txBody>
+      </p:sp>
+      <p:cxnSp>
+        <p:nvCxnSpPr>
+          <p:cNvPr id="126" name="Straight Connector 125">
+            <a:extLst>
+              <a:ext uri="{FF2B5EF4-FFF2-40B4-BE49-F238E27FC236}">
+                <a16:creationId xmlns:a16="http://schemas.microsoft.com/office/drawing/2014/main" id="{65500243-B5D7-5741-96D2-5DF53E599A69}"/>
+              </a:ext>
+            </a:extLst>
+          </p:cNvPr>
+          <p:cNvCxnSpPr>
+            <a:cxnSpLocks/>
+          </p:cNvCxnSpPr>
+          <p:nvPr/>
+        </p:nvCxnSpPr>
+        <p:spPr>
+          <a:xfrm>
+            <a:off x="2286003" y="52525"/>
+            <a:ext cx="0" cy="6720933"/>
+          </a:xfrm>
+          <a:prstGeom prst="line">
+            <a:avLst/>
+          </a:prstGeom>
+          <a:ln w="50800">
+            <a:solidFill>
+              <a:schemeClr val="accent2">
+                <a:lumMod val="75000"/>
+              </a:schemeClr>
+            </a:solidFill>
+            <a:tailEnd type="none"/>
+          </a:ln>
+        </p:spPr>
+        <p:style>
+          <a:lnRef idx="1">
+            <a:schemeClr val="accent1"/>
+          </a:lnRef>
+          <a:fillRef idx="0">
+            <a:schemeClr val="accent1"/>
+          </a:fillRef>
+          <a:effectRef idx="0">
+            <a:schemeClr val="accent1"/>
+          </a:effectRef>
+          <a:fontRef idx="minor">
+            <a:schemeClr val="tx1"/>
+          </a:fontRef>
+        </p:style>
+      </p:cxnSp>
+    </p:spTree>
+    <p:extLst>
+      <p:ext uri="{BB962C8B-B14F-4D97-AF65-F5344CB8AC3E}">
+        <p14:creationId xmlns:p14="http://schemas.microsoft.com/office/powerpoint/2010/main" val="2708773730"/>
+      </p:ext>
+    </p:extLst>
+  </p:cSld>
+  <p:clrMapOvr>
+    <a:masterClrMapping/>
+  </p:clrMapOvr>
+</p:sld>
+</file>
+
+<file path=ppt/slides/slide12.xml><?xml version="1.0" encoding="utf-8"?>
+<p:sld xmlns:a="http://schemas.openxmlformats.org/drawingml/2006/main" xmlns:r="http://schemas.openxmlformats.org/officeDocument/2006/relationships" xmlns:p="http://schemas.openxmlformats.org/presentationml/2006/main">
+  <p:cSld>
+    <p:spTree>
+      <p:nvGrpSpPr>
+        <p:cNvPr id="1" name=""/>
+        <p:cNvGrpSpPr/>
+        <p:nvPr/>
+      </p:nvGrpSpPr>
+      <p:grpSpPr>
+        <a:xfrm>
+          <a:off x="0" y="0"/>
+          <a:ext cx="0" cy="0"/>
+          <a:chOff x="0" y="0"/>
+          <a:chExt cx="0" cy="0"/>
+        </a:xfrm>
+      </p:grpSpPr>
       <p:sp>
         <p:nvSpPr>
           <p:cNvPr id="4" name="TextBox 3">
@@ -4830,7 +8572,7 @@
         </p:nvGrpSpPr>
         <p:grpSpPr>
           <a:xfrm>
-            <a:off x="1103000" y="1992169"/>
+            <a:off x="1103000" y="1515090"/>
             <a:ext cx="1284870" cy="1113226"/>
             <a:chOff x="1657472" y="3839257"/>
             <a:chExt cx="4173872" cy="1113226"/>
@@ -4940,7 +8682,7 @@
         </p:nvGrpSpPr>
         <p:grpSpPr>
           <a:xfrm>
-            <a:off x="3135867" y="1992169"/>
+            <a:off x="3135867" y="1515090"/>
             <a:ext cx="1284870" cy="1113226"/>
             <a:chOff x="1607965" y="3839257"/>
             <a:chExt cx="4173872" cy="1113226"/>
@@ -5050,7 +8792,7 @@
         </p:nvGrpSpPr>
         <p:grpSpPr>
           <a:xfrm>
-            <a:off x="6425625" y="2327609"/>
+            <a:off x="6425625" y="1532478"/>
             <a:ext cx="1360150" cy="1025192"/>
             <a:chOff x="7121603" y="4267708"/>
             <a:chExt cx="1360150" cy="598774"/>
@@ -5201,7 +8943,7 @@
         </p:nvGrpSpPr>
         <p:grpSpPr>
           <a:xfrm>
-            <a:off x="8568017" y="2327608"/>
+            <a:off x="8568017" y="1532477"/>
             <a:ext cx="1360150" cy="1025192"/>
             <a:chOff x="4940897" y="4249391"/>
             <a:chExt cx="1360150" cy="619537"/>
@@ -5352,7 +9094,7 @@
         </p:nvGrpSpPr>
         <p:grpSpPr>
           <a:xfrm>
-            <a:off x="1103000" y="4055212"/>
+            <a:off x="1103000" y="3220325"/>
             <a:ext cx="1284870" cy="1113226"/>
             <a:chOff x="1657472" y="3839257"/>
             <a:chExt cx="4173872" cy="1113226"/>
@@ -5462,7 +9204,7 @@
         </p:nvGrpSpPr>
         <p:grpSpPr>
           <a:xfrm>
-            <a:off x="3135867" y="4055212"/>
+            <a:off x="3135867" y="3220325"/>
             <a:ext cx="1284870" cy="1113226"/>
             <a:chOff x="1607965" y="3839257"/>
             <a:chExt cx="4173872" cy="1113226"/>
@@ -5572,7 +9314,7 @@
         </p:nvGrpSpPr>
         <p:grpSpPr>
           <a:xfrm>
-            <a:off x="6425625" y="4390652"/>
+            <a:off x="6425625" y="3264217"/>
             <a:ext cx="1360150" cy="1025192"/>
             <a:chOff x="7121603" y="4267708"/>
             <a:chExt cx="1360150" cy="598774"/>
@@ -5723,7 +9465,7 @@
         </p:nvGrpSpPr>
         <p:grpSpPr>
           <a:xfrm>
-            <a:off x="8568017" y="4390651"/>
+            <a:off x="8568017" y="3264216"/>
             <a:ext cx="1360150" cy="1025192"/>
             <a:chOff x="4940897" y="4249391"/>
             <a:chExt cx="1360150" cy="619537"/>
@@ -5842,6 +9584,291 @@
               <a:solidFill>
                 <a:schemeClr val="tx1"/>
               </a:solidFill>
+            </a:ln>
+          </p:spPr>
+          <p:style>
+            <a:lnRef idx="1">
+              <a:schemeClr val="accent1"/>
+            </a:lnRef>
+            <a:fillRef idx="0">
+              <a:schemeClr val="accent1"/>
+            </a:fillRef>
+            <a:effectRef idx="0">
+              <a:schemeClr val="accent1"/>
+            </a:effectRef>
+            <a:fontRef idx="minor">
+              <a:schemeClr val="tx1"/>
+            </a:fontRef>
+          </p:style>
+        </p:cxnSp>
+      </p:grpSp>
+      <p:grpSp>
+        <p:nvGrpSpPr>
+          <p:cNvPr id="5" name="Group 4">
+            <a:extLst>
+              <a:ext uri="{FF2B5EF4-FFF2-40B4-BE49-F238E27FC236}">
+                <a16:creationId xmlns:a16="http://schemas.microsoft.com/office/drawing/2014/main" id="{94CAF693-D2B5-784D-99CE-15246B1DA71A}"/>
+              </a:ext>
+            </a:extLst>
+          </p:cNvPr>
+          <p:cNvGrpSpPr/>
+          <p:nvPr/>
+        </p:nvGrpSpPr>
+        <p:grpSpPr>
+          <a:xfrm>
+            <a:off x="1419710" y="4894461"/>
+            <a:ext cx="660882" cy="1113226"/>
+            <a:chOff x="1419710" y="4894461"/>
+            <a:chExt cx="660882" cy="1113226"/>
+          </a:xfrm>
+        </p:grpSpPr>
+        <p:grpSp>
+          <p:nvGrpSpPr>
+            <p:cNvPr id="35" name="Group 34">
+              <a:extLst>
+                <a:ext uri="{FF2B5EF4-FFF2-40B4-BE49-F238E27FC236}">
+                  <a16:creationId xmlns:a16="http://schemas.microsoft.com/office/drawing/2014/main" id="{D7945E85-8F30-3E41-AB0A-8815188830D4}"/>
+                </a:ext>
+              </a:extLst>
+            </p:cNvPr>
+            <p:cNvGrpSpPr/>
+            <p:nvPr/>
+          </p:nvGrpSpPr>
+          <p:grpSpPr>
+            <a:xfrm rot="10800000">
+              <a:off x="1419710" y="4909809"/>
+              <a:ext cx="660881" cy="311549"/>
+              <a:chOff x="1607965" y="4266882"/>
+              <a:chExt cx="4173872" cy="685599"/>
+            </a:xfrm>
+          </p:grpSpPr>
+          <p:cxnSp>
+            <p:nvCxnSpPr>
+              <p:cNvPr id="36" name="Straight Connector 35">
+                <a:extLst>
+                  <a:ext uri="{FF2B5EF4-FFF2-40B4-BE49-F238E27FC236}">
+                    <a16:creationId xmlns:a16="http://schemas.microsoft.com/office/drawing/2014/main" id="{9140E396-CCE4-0547-82F7-331FA65BE098}"/>
+                  </a:ext>
+                </a:extLst>
+              </p:cNvPr>
+              <p:cNvCxnSpPr>
+                <a:cxnSpLocks/>
+              </p:cNvCxnSpPr>
+              <p:nvPr/>
+            </p:nvCxnSpPr>
+            <p:spPr>
+              <a:xfrm rot="10800000" flipV="1">
+                <a:off x="1669700" y="4266882"/>
+                <a:ext cx="0" cy="685599"/>
+              </a:xfrm>
+              <a:prstGeom prst="line">
+                <a:avLst/>
+              </a:prstGeom>
+              <a:ln w="38100">
+                <a:solidFill>
+                  <a:schemeClr val="tx1"/>
+                </a:solidFill>
+                <a:headEnd type="triangle"/>
+              </a:ln>
+            </p:spPr>
+            <p:style>
+              <a:lnRef idx="1">
+                <a:schemeClr val="accent1"/>
+              </a:lnRef>
+              <a:fillRef idx="0">
+                <a:schemeClr val="accent1"/>
+              </a:fillRef>
+              <a:effectRef idx="0">
+                <a:schemeClr val="accent1"/>
+              </a:effectRef>
+              <a:fontRef idx="minor">
+                <a:schemeClr val="tx1"/>
+              </a:fontRef>
+            </p:style>
+          </p:cxnSp>
+          <p:cxnSp>
+            <p:nvCxnSpPr>
+              <p:cNvPr id="37" name="Straight Connector 36">
+                <a:extLst>
+                  <a:ext uri="{FF2B5EF4-FFF2-40B4-BE49-F238E27FC236}">
+                    <a16:creationId xmlns:a16="http://schemas.microsoft.com/office/drawing/2014/main" id="{2CB1C806-2C44-5A42-9F96-984E940F4D56}"/>
+                  </a:ext>
+                </a:extLst>
+              </p:cNvPr>
+              <p:cNvCxnSpPr>
+                <a:cxnSpLocks/>
+              </p:cNvCxnSpPr>
+              <p:nvPr/>
+            </p:nvCxnSpPr>
+            <p:spPr>
+              <a:xfrm flipH="1">
+                <a:off x="1607965" y="4936730"/>
+                <a:ext cx="4173872" cy="407"/>
+              </a:xfrm>
+              <a:prstGeom prst="line">
+                <a:avLst/>
+              </a:prstGeom>
+              <a:ln w="38100">
+                <a:solidFill>
+                  <a:schemeClr val="tx1"/>
+                </a:solidFill>
+                <a:headEnd type="none"/>
+                <a:tailEnd type="none"/>
+              </a:ln>
+            </p:spPr>
+            <p:style>
+              <a:lnRef idx="1">
+                <a:schemeClr val="accent1"/>
+              </a:lnRef>
+              <a:fillRef idx="0">
+                <a:schemeClr val="accent1"/>
+              </a:fillRef>
+              <a:effectRef idx="0">
+                <a:schemeClr val="accent1"/>
+              </a:effectRef>
+              <a:fontRef idx="minor">
+                <a:schemeClr val="tx1"/>
+              </a:fontRef>
+            </p:style>
+          </p:cxnSp>
+        </p:grpSp>
+        <p:grpSp>
+          <p:nvGrpSpPr>
+            <p:cNvPr id="38" name="Group 37">
+              <a:extLst>
+                <a:ext uri="{FF2B5EF4-FFF2-40B4-BE49-F238E27FC236}">
+                  <a16:creationId xmlns:a16="http://schemas.microsoft.com/office/drawing/2014/main" id="{2FFE833F-0E11-3B41-B21B-5F6A0308DEF7}"/>
+                </a:ext>
+              </a:extLst>
+            </p:cNvPr>
+            <p:cNvGrpSpPr/>
+            <p:nvPr/>
+          </p:nvGrpSpPr>
+          <p:grpSpPr>
+            <a:xfrm>
+              <a:off x="1428381" y="4894461"/>
+              <a:ext cx="652211" cy="1113226"/>
+              <a:chOff x="1657472" y="3839257"/>
+              <a:chExt cx="4173872" cy="1113226"/>
+            </a:xfrm>
+          </p:grpSpPr>
+          <p:cxnSp>
+            <p:nvCxnSpPr>
+              <p:cNvPr id="39" name="Straight Connector 38">
+                <a:extLst>
+                  <a:ext uri="{FF2B5EF4-FFF2-40B4-BE49-F238E27FC236}">
+                    <a16:creationId xmlns:a16="http://schemas.microsoft.com/office/drawing/2014/main" id="{10D5B484-4837-8D45-8003-96B9232F5FC7}"/>
+                  </a:ext>
+                </a:extLst>
+              </p:cNvPr>
+              <p:cNvCxnSpPr>
+                <a:cxnSpLocks/>
+              </p:cNvCxnSpPr>
+              <p:nvPr/>
+            </p:nvCxnSpPr>
+            <p:spPr>
+              <a:xfrm>
+                <a:off x="1669698" y="3839257"/>
+                <a:ext cx="0" cy="1113226"/>
+              </a:xfrm>
+              <a:prstGeom prst="line">
+                <a:avLst/>
+              </a:prstGeom>
+              <a:ln w="38100">
+                <a:solidFill>
+                  <a:schemeClr val="tx1"/>
+                </a:solidFill>
+                <a:headEnd type="none"/>
+              </a:ln>
+            </p:spPr>
+            <p:style>
+              <a:lnRef idx="1">
+                <a:schemeClr val="accent1"/>
+              </a:lnRef>
+              <a:fillRef idx="0">
+                <a:schemeClr val="accent1"/>
+              </a:fillRef>
+              <a:effectRef idx="0">
+                <a:schemeClr val="accent1"/>
+              </a:effectRef>
+              <a:fontRef idx="minor">
+                <a:schemeClr val="tx1"/>
+              </a:fontRef>
+            </p:style>
+          </p:cxnSp>
+          <p:cxnSp>
+            <p:nvCxnSpPr>
+              <p:cNvPr id="40" name="Straight Connector 39">
+                <a:extLst>
+                  <a:ext uri="{FF2B5EF4-FFF2-40B4-BE49-F238E27FC236}">
+                    <a16:creationId xmlns:a16="http://schemas.microsoft.com/office/drawing/2014/main" id="{23BA1499-50F1-E643-9471-3BC4C569C406}"/>
+                  </a:ext>
+                </a:extLst>
+              </p:cNvPr>
+              <p:cNvCxnSpPr>
+                <a:cxnSpLocks/>
+              </p:cNvCxnSpPr>
+              <p:nvPr/>
+            </p:nvCxnSpPr>
+            <p:spPr>
+              <a:xfrm flipH="1">
+                <a:off x="1657472" y="4936730"/>
+                <a:ext cx="4173872" cy="407"/>
+              </a:xfrm>
+              <a:prstGeom prst="line">
+                <a:avLst/>
+              </a:prstGeom>
+              <a:ln w="38100">
+                <a:solidFill>
+                  <a:schemeClr val="tx1"/>
+                </a:solidFill>
+                <a:headEnd type="none"/>
+                <a:tailEnd type="none"/>
+              </a:ln>
+            </p:spPr>
+            <p:style>
+              <a:lnRef idx="1">
+                <a:schemeClr val="accent1"/>
+              </a:lnRef>
+              <a:fillRef idx="0">
+                <a:schemeClr val="accent1"/>
+              </a:fillRef>
+              <a:effectRef idx="0">
+                <a:schemeClr val="accent1"/>
+              </a:effectRef>
+              <a:fontRef idx="minor">
+                <a:schemeClr val="tx1"/>
+              </a:fontRef>
+            </p:style>
+          </p:cxnSp>
+        </p:grpSp>
+        <p:cxnSp>
+          <p:nvCxnSpPr>
+            <p:cNvPr id="41" name="Straight Connector 40">
+              <a:extLst>
+                <a:ext uri="{FF2B5EF4-FFF2-40B4-BE49-F238E27FC236}">
+                  <a16:creationId xmlns:a16="http://schemas.microsoft.com/office/drawing/2014/main" id="{A53F1A7A-EFBD-8E4A-B54D-7CB40FC3971D}"/>
+                </a:ext>
+              </a:extLst>
+            </p:cNvPr>
+            <p:cNvCxnSpPr>
+              <a:cxnSpLocks/>
+            </p:cNvCxnSpPr>
+            <p:nvPr/>
+          </p:nvCxnSpPr>
+          <p:spPr>
+            <a:xfrm>
+              <a:off x="2070816" y="5724939"/>
+              <a:ext cx="0" cy="282748"/>
+            </a:xfrm>
+            <a:prstGeom prst="line">
+              <a:avLst/>
+            </a:prstGeom>
+            <a:ln w="38100">
+              <a:solidFill>
+                <a:schemeClr val="tx1"/>
+              </a:solidFill>
+              <a:headEnd type="none"/>
             </a:ln>
           </p:spPr>
           <p:style>

</xml_diff>